<commit_message>
Added slides to powerpoint after 11am signup
</commit_message>
<xml_diff>
--- a/ConstableSoftwarePreso.pptx
+++ b/ConstableSoftwarePreso.pptx
@@ -5,12 +5,15 @@
     <p:sldMasterId id="2147483798" r:id="rId1"/>
   </p:sldMasterIdLst>
   <p:notesMasterIdLst>
-    <p:notesMasterId r:id="rId5"/>
+    <p:notesMasterId r:id="rId8"/>
   </p:notesMasterIdLst>
   <p:sldIdLst>
     <p:sldId id="256" r:id="rId2"/>
-    <p:sldId id="257" r:id="rId3"/>
-    <p:sldId id="258" r:id="rId4"/>
+    <p:sldId id="258" r:id="rId3"/>
+    <p:sldId id="257" r:id="rId4"/>
+    <p:sldId id="259" r:id="rId5"/>
+    <p:sldId id="261" r:id="rId6"/>
+    <p:sldId id="260" r:id="rId7"/>
   </p:sldIdLst>
   <p:sldSz cx="12192000" cy="6858000"/>
   <p:notesSz cx="6858000" cy="9144000"/>
@@ -109,13 +112,18 @@
       </a:defRPr>
     </a:lvl9pPr>
   </p:defaultTextStyle>
+  <p:extLst>
+    <p:ext uri="{EFAFB233-063F-42B5-8137-9DF3F51BA10A}">
+      <p15:sldGuideLst xmlns:p15="http://schemas.microsoft.com/office/powerpoint/2012/main"/>
+    </p:ext>
+  </p:extLst>
 </p:presentation>
 </file>
 
 <file path=ppt/revisionInfo.xml><?xml version="1.0" encoding="utf-8"?>
 <p1510:revInfo xmlns:a="http://schemas.openxmlformats.org/drawingml/2006/main" xmlns:r="http://schemas.openxmlformats.org/officeDocument/2006/relationships" xmlns:p1510="http://schemas.microsoft.com/office/powerpoint/2015/10/main">
   <p1510:revLst>
-    <p1510:client id="{6352DDA4-F683-4A38-9A2F-FE729A406D02}" v="521" dt="2024-06-21T07:05:16.730"/>
+    <p1510:client id="{6352DDA4-F683-4A38-9A2F-FE729A406D02}" v="530" dt="2024-06-22T03:12:40.226"/>
   </p1510:revLst>
 </p1510:revInfo>
 </file>
@@ -124,8 +132,8 @@
 <pc:chgInfo xmlns:a="http://schemas.openxmlformats.org/drawingml/2006/main" xmlns:r="http://schemas.openxmlformats.org/officeDocument/2006/relationships" xmlns:ac="http://schemas.microsoft.com/office/drawing/2013/main/command" xmlns:pc="http://schemas.microsoft.com/office/powerpoint/2013/main/command">
   <pc:docChgLst>
     <pc:chgData name="Saf Flatters" userId="ea85ab73683665f9" providerId="LiveId" clId="{6352DDA4-F683-4A38-9A2F-FE729A406D02}"/>
-    <pc:docChg chg="undo custSel addSld delSld modSld">
-      <pc:chgData name="Saf Flatters" userId="ea85ab73683665f9" providerId="LiveId" clId="{6352DDA4-F683-4A38-9A2F-FE729A406D02}" dt="2024-06-21T07:05:42.397" v="1870" actId="1076"/>
+    <pc:docChg chg="undo custSel addSld delSld modSld sldOrd">
+      <pc:chgData name="Saf Flatters" userId="ea85ab73683665f9" providerId="LiveId" clId="{6352DDA4-F683-4A38-9A2F-FE729A406D02}" dt="2024-06-22T03:14:02.742" v="2725" actId="1076"/>
       <pc:docMkLst>
         <pc:docMk/>
       </pc:docMkLst>
@@ -152,18 +160,34 @@
           </ac:picMkLst>
         </pc:picChg>
       </pc:sldChg>
-      <pc:sldChg chg="addSp delSp modSp mod">
-        <pc:chgData name="Saf Flatters" userId="ea85ab73683665f9" providerId="LiveId" clId="{6352DDA4-F683-4A38-9A2F-FE729A406D02}" dt="2024-06-21T07:05:42.397" v="1870" actId="1076"/>
+      <pc:sldChg chg="addSp delSp modSp mod ord">
+        <pc:chgData name="Saf Flatters" userId="ea85ab73683665f9" providerId="LiveId" clId="{6352DDA4-F683-4A38-9A2F-FE729A406D02}" dt="2024-06-22T03:14:02.742" v="2725" actId="1076"/>
         <pc:sldMkLst>
           <pc:docMk/>
           <pc:sldMk cId="3245596075" sldId="257"/>
         </pc:sldMkLst>
+        <pc:spChg chg="add mod">
+          <ac:chgData name="Saf Flatters" userId="ea85ab73683665f9" providerId="LiveId" clId="{6352DDA4-F683-4A38-9A2F-FE729A406D02}" dt="2024-06-22T02:57:58.988" v="2488" actId="255"/>
+          <ac:spMkLst>
+            <pc:docMk/>
+            <pc:sldMk cId="3245596075" sldId="257"/>
+            <ac:spMk id="2" creationId="{55DDFDEC-0443-CFAF-4A71-12BCFFC28514}"/>
+          </ac:spMkLst>
+        </pc:spChg>
         <pc:spChg chg="del">
           <ac:chgData name="Saf Flatters" userId="ea85ab73683665f9" providerId="LiveId" clId="{6352DDA4-F683-4A38-9A2F-FE729A406D02}" dt="2024-06-21T04:44:59.231" v="86" actId="478"/>
           <ac:spMkLst>
             <pc:docMk/>
             <pc:sldMk cId="3245596075" sldId="257"/>
             <ac:spMk id="2" creationId="{7BDFE67C-5CB9-53F4-2698-31DCBF697FE2}"/>
+          </ac:spMkLst>
+        </pc:spChg>
+        <pc:spChg chg="add mod">
+          <ac:chgData name="Saf Flatters" userId="ea85ab73683665f9" providerId="LiveId" clId="{6352DDA4-F683-4A38-9A2F-FE729A406D02}" dt="2024-06-22T03:14:02.742" v="2725" actId="1076"/>
+          <ac:spMkLst>
+            <pc:docMk/>
+            <pc:sldMk cId="3245596075" sldId="257"/>
+            <ac:spMk id="3" creationId="{2C80FFCE-9E61-779A-4B3A-E78B8A571889}"/>
           </ac:spMkLst>
         </pc:spChg>
         <pc:spChg chg="del">
@@ -263,7 +287,7 @@
           </ac:picMkLst>
         </pc:picChg>
         <pc:picChg chg="add mod ord">
-          <ac:chgData name="Saf Flatters" userId="ea85ab73683665f9" providerId="LiveId" clId="{6352DDA4-F683-4A38-9A2F-FE729A406D02}" dt="2024-06-21T06:53:43.355" v="1639" actId="14861"/>
+          <ac:chgData name="Saf Flatters" userId="ea85ab73683665f9" providerId="LiveId" clId="{6352DDA4-F683-4A38-9A2F-FE729A406D02}" dt="2024-06-22T03:13:58.486" v="2724" actId="1076"/>
           <ac:picMkLst>
             <pc:docMk/>
             <pc:sldMk cId="3245596075" sldId="257"/>
@@ -352,17 +376,41 @@
         </pc:picChg>
       </pc:sldChg>
       <pc:sldChg chg="addSp delSp modSp add mod setBg">
-        <pc:chgData name="Saf Flatters" userId="ea85ab73683665f9" providerId="LiveId" clId="{6352DDA4-F683-4A38-9A2F-FE729A406D02}" dt="2024-06-21T06:41:58.057" v="936" actId="207"/>
+        <pc:chgData name="Saf Flatters" userId="ea85ab73683665f9" providerId="LiveId" clId="{6352DDA4-F683-4A38-9A2F-FE729A406D02}" dt="2024-06-22T02:36:47.728" v="2273" actId="114"/>
         <pc:sldMkLst>
           <pc:docMk/>
           <pc:sldMk cId="468884825" sldId="258"/>
         </pc:sldMkLst>
+        <pc:spChg chg="add del mod">
+          <ac:chgData name="Saf Flatters" userId="ea85ab73683665f9" providerId="LiveId" clId="{6352DDA4-F683-4A38-9A2F-FE729A406D02}" dt="2024-06-22T02:22:58.859" v="2252"/>
+          <ac:spMkLst>
+            <pc:docMk/>
+            <pc:sldMk cId="468884825" sldId="258"/>
+            <ac:spMk id="3" creationId="{685E489D-A2CA-8114-72E4-B3D39A37AAFF}"/>
+          </ac:spMkLst>
+        </pc:spChg>
         <pc:spChg chg="mod">
-          <ac:chgData name="Saf Flatters" userId="ea85ab73683665f9" providerId="LiveId" clId="{6352DDA4-F683-4A38-9A2F-FE729A406D02}" dt="2024-06-21T06:41:58.057" v="936" actId="207"/>
+          <ac:chgData name="Saf Flatters" userId="ea85ab73683665f9" providerId="LiveId" clId="{6352DDA4-F683-4A38-9A2F-FE729A406D02}" dt="2024-06-22T02:17:34.295" v="2135" actId="207"/>
           <ac:spMkLst>
             <pc:docMk/>
             <pc:sldMk cId="468884825" sldId="258"/>
             <ac:spMk id="4" creationId="{6E2A7F2C-1078-6D76-16B9-A4CFBE9E18A6}"/>
+          </ac:spMkLst>
+        </pc:spChg>
+        <pc:spChg chg="add mod">
+          <ac:chgData name="Saf Flatters" userId="ea85ab73683665f9" providerId="LiveId" clId="{6352DDA4-F683-4A38-9A2F-FE729A406D02}" dt="2024-06-22T02:22:30.510" v="2239" actId="20577"/>
+          <ac:spMkLst>
+            <pc:docMk/>
+            <pc:sldMk cId="468884825" sldId="258"/>
+            <ac:spMk id="5" creationId="{A7159774-B73E-3B53-5B9B-CA8E635AECF0}"/>
+          </ac:spMkLst>
+        </pc:spChg>
+        <pc:spChg chg="add mod">
+          <ac:chgData name="Saf Flatters" userId="ea85ab73683665f9" providerId="LiveId" clId="{6352DDA4-F683-4A38-9A2F-FE729A406D02}" dt="2024-06-22T02:36:47.728" v="2273" actId="114"/>
+          <ac:spMkLst>
+            <pc:docMk/>
+            <pc:sldMk cId="468884825" sldId="258"/>
+            <ac:spMk id="8" creationId="{45FEFE0A-BB4F-C972-4BD6-0962B40B10B1}"/>
           </ac:spMkLst>
         </pc:spChg>
         <pc:picChg chg="add mod">
@@ -379,6 +427,85 @@
             <pc:docMk/>
             <pc:sldMk cId="468884825" sldId="258"/>
             <ac:picMk id="6" creationId="{2AC86F77-9B01-84BD-3CD1-9C7D7163F33D}"/>
+          </ac:picMkLst>
+        </pc:picChg>
+        <pc:picChg chg="add mod">
+          <ac:chgData name="Saf Flatters" userId="ea85ab73683665f9" providerId="LiveId" clId="{6352DDA4-F683-4A38-9A2F-FE729A406D02}" dt="2024-06-22T02:22:34.793" v="2241" actId="1076"/>
+          <ac:picMkLst>
+            <pc:docMk/>
+            <pc:sldMk cId="468884825" sldId="258"/>
+            <ac:picMk id="7" creationId="{2053E5A1-3D9B-18FE-BF2F-3445A0CA7C2A}"/>
+          </ac:picMkLst>
+        </pc:picChg>
+      </pc:sldChg>
+      <pc:sldChg chg="delSp modSp add mod">
+        <pc:chgData name="Saf Flatters" userId="ea85ab73683665f9" providerId="LiveId" clId="{6352DDA4-F683-4A38-9A2F-FE729A406D02}" dt="2024-06-22T03:07:47.464" v="2642" actId="20577"/>
+        <pc:sldMkLst>
+          <pc:docMk/>
+          <pc:sldMk cId="1760221263" sldId="259"/>
+        </pc:sldMkLst>
+        <pc:spChg chg="mod">
+          <ac:chgData name="Saf Flatters" userId="ea85ab73683665f9" providerId="LiveId" clId="{6352DDA4-F683-4A38-9A2F-FE729A406D02}" dt="2024-06-22T03:07:47.464" v="2642" actId="20577"/>
+          <ac:spMkLst>
+            <pc:docMk/>
+            <pc:sldMk cId="1760221263" sldId="259"/>
+            <ac:spMk id="2" creationId="{55DDFDEC-0443-CFAF-4A71-12BCFFC28514}"/>
+          </ac:spMkLst>
+        </pc:spChg>
+        <pc:spChg chg="mod">
+          <ac:chgData name="Saf Flatters" userId="ea85ab73683665f9" providerId="LiveId" clId="{6352DDA4-F683-4A38-9A2F-FE729A406D02}" dt="2024-06-22T02:23:19.127" v="2255" actId="207"/>
+          <ac:spMkLst>
+            <pc:docMk/>
+            <pc:sldMk cId="1760221263" sldId="259"/>
+            <ac:spMk id="5" creationId="{1D613CEF-257B-B686-4999-8D4FF50EC036}"/>
+          </ac:spMkLst>
+        </pc:spChg>
+        <pc:grpChg chg="del">
+          <ac:chgData name="Saf Flatters" userId="ea85ab73683665f9" providerId="LiveId" clId="{6352DDA4-F683-4A38-9A2F-FE729A406D02}" dt="2024-06-22T02:22:44.432" v="2243" actId="478"/>
+          <ac:grpSpMkLst>
+            <pc:docMk/>
+            <pc:sldMk cId="1760221263" sldId="259"/>
+            <ac:grpSpMk id="25" creationId="{15FC9000-2F3D-411C-FA3A-3E1B671F3A13}"/>
+          </ac:grpSpMkLst>
+        </pc:grpChg>
+        <pc:picChg chg="del">
+          <ac:chgData name="Saf Flatters" userId="ea85ab73683665f9" providerId="LiveId" clId="{6352DDA4-F683-4A38-9A2F-FE729A406D02}" dt="2024-06-22T02:22:46.205" v="2244" actId="478"/>
+          <ac:picMkLst>
+            <pc:docMk/>
+            <pc:sldMk cId="1760221263" sldId="259"/>
+            <ac:picMk id="21" creationId="{6A6C6AE7-9D05-2EC0-B678-44D8463DBCC1}"/>
+          </ac:picMkLst>
+        </pc:picChg>
+        <pc:picChg chg="del">
+          <ac:chgData name="Saf Flatters" userId="ea85ab73683665f9" providerId="LiveId" clId="{6352DDA4-F683-4A38-9A2F-FE729A406D02}" dt="2024-06-22T02:22:46.896" v="2245" actId="478"/>
+          <ac:picMkLst>
+            <pc:docMk/>
+            <pc:sldMk cId="1760221263" sldId="259"/>
+            <ac:picMk id="27" creationId="{597529BA-E9A6-C88C-257A-C4FF4DB1C0C5}"/>
+          </ac:picMkLst>
+        </pc:picChg>
+        <pc:picChg chg="del mod">
+          <ac:chgData name="Saf Flatters" userId="ea85ab73683665f9" providerId="LiveId" clId="{6352DDA4-F683-4A38-9A2F-FE729A406D02}" dt="2024-06-22T02:22:49.029" v="2249" actId="478"/>
+          <ac:picMkLst>
+            <pc:docMk/>
+            <pc:sldMk cId="1760221263" sldId="259"/>
+            <ac:picMk id="1032" creationId="{84B59277-225B-42C9-8089-B269ED3333B3}"/>
+          </ac:picMkLst>
+        </pc:picChg>
+        <pc:picChg chg="del">
+          <ac:chgData name="Saf Flatters" userId="ea85ab73683665f9" providerId="LiveId" clId="{6352DDA4-F683-4A38-9A2F-FE729A406D02}" dt="2024-06-22T02:22:47.429" v="2246" actId="478"/>
+          <ac:picMkLst>
+            <pc:docMk/>
+            <pc:sldMk cId="1760221263" sldId="259"/>
+            <ac:picMk id="1034" creationId="{49A59273-97F6-0054-1489-E61A57599CDE}"/>
+          </ac:picMkLst>
+        </pc:picChg>
+        <pc:picChg chg="del">
+          <ac:chgData name="Saf Flatters" userId="ea85ab73683665f9" providerId="LiveId" clId="{6352DDA4-F683-4A38-9A2F-FE729A406D02}" dt="2024-06-22T02:22:48.231" v="2247" actId="478"/>
+          <ac:picMkLst>
+            <pc:docMk/>
+            <pc:sldMk cId="1760221263" sldId="259"/>
+            <ac:picMk id="1036" creationId="{8E1F1AFD-24E3-2F11-937F-0435C6D65A33}"/>
           </ac:picMkLst>
         </pc:picChg>
       </pc:sldChg>
@@ -405,6 +532,13 @@
           </ac:picMkLst>
         </pc:picChg>
       </pc:sldChg>
+      <pc:sldChg chg="new">
+        <pc:chgData name="Saf Flatters" userId="ea85ab73683665f9" providerId="LiveId" clId="{6352DDA4-F683-4A38-9A2F-FE729A406D02}" dt="2024-06-22T02:45:43.492" v="2274" actId="680"/>
+        <pc:sldMkLst>
+          <pc:docMk/>
+          <pc:sldMk cId="236815795" sldId="260"/>
+        </pc:sldMkLst>
+      </pc:sldChg>
       <pc:sldChg chg="addSp delSp modSp add del mod setBg">
         <pc:chgData name="Saf Flatters" userId="ea85ab73683665f9" providerId="LiveId" clId="{6352DDA4-F683-4A38-9A2F-FE729A406D02}" dt="2024-06-21T06:42:02.264" v="938" actId="47"/>
         <pc:sldMkLst>
@@ -427,6 +561,21 @@
             <ac:picMk id="6" creationId="{2AC86F77-9B01-84BD-3CD1-9C7D7163F33D}"/>
           </ac:picMkLst>
         </pc:picChg>
+      </pc:sldChg>
+      <pc:sldChg chg="modSp add mod">
+        <pc:chgData name="Saf Flatters" userId="ea85ab73683665f9" providerId="LiveId" clId="{6352DDA4-F683-4A38-9A2F-FE729A406D02}" dt="2024-06-22T03:09:05.529" v="2677" actId="20577"/>
+        <pc:sldMkLst>
+          <pc:docMk/>
+          <pc:sldMk cId="535619648" sldId="261"/>
+        </pc:sldMkLst>
+        <pc:spChg chg="mod">
+          <ac:chgData name="Saf Flatters" userId="ea85ab73683665f9" providerId="LiveId" clId="{6352DDA4-F683-4A38-9A2F-FE729A406D02}" dt="2024-06-22T03:09:05.529" v="2677" actId="20577"/>
+          <ac:spMkLst>
+            <pc:docMk/>
+            <pc:sldMk cId="535619648" sldId="261"/>
+            <ac:spMk id="2" creationId="{55DDFDEC-0443-CFAF-4A71-12BCFFC28514}"/>
+          </ac:spMkLst>
+        </pc:spChg>
       </pc:sldChg>
     </pc:docChg>
   </pc:docChgLst>
@@ -848,7 +997,7 @@
           <a:p>
             <a:fld id="{40410EAA-151D-407D-8FFE-35A692A9E3B4}" type="slidenum">
               <a:rPr lang="en-AU" smtClean="0"/>
-              <a:t>2</a:t>
+              <a:t>3</a:t>
             </a:fld>
             <a:endParaRPr lang="en-AU"/>
           </a:p>
@@ -858,6 +1007,174 @@
     <p:extLst>
       <p:ext uri="{BB962C8B-B14F-4D97-AF65-F5344CB8AC3E}">
         <p14:creationId xmlns:p14="http://schemas.microsoft.com/office/powerpoint/2010/main" val="1759756670"/>
+      </p:ext>
+    </p:extLst>
+  </p:cSld>
+  <p:clrMapOvr>
+    <a:masterClrMapping/>
+  </p:clrMapOvr>
+</p:notes>
+</file>
+
+<file path=ppt/notesSlides/notesSlide2.xml><?xml version="1.0" encoding="utf-8"?>
+<p:notes xmlns:a="http://schemas.openxmlformats.org/drawingml/2006/main" xmlns:r="http://schemas.openxmlformats.org/officeDocument/2006/relationships" xmlns:p="http://schemas.openxmlformats.org/presentationml/2006/main">
+  <p:cSld>
+    <p:spTree>
+      <p:nvGrpSpPr>
+        <p:cNvPr id="1" name=""/>
+        <p:cNvGrpSpPr/>
+        <p:nvPr/>
+      </p:nvGrpSpPr>
+      <p:grpSpPr>
+        <a:xfrm>
+          <a:off x="0" y="0"/>
+          <a:ext cx="0" cy="0"/>
+          <a:chOff x="0" y="0"/>
+          <a:chExt cx="0" cy="0"/>
+        </a:xfrm>
+      </p:grpSpPr>
+      <p:sp>
+        <p:nvSpPr>
+          <p:cNvPr id="2" name="Slide Image Placeholder 1"/>
+          <p:cNvSpPr>
+            <a:spLocks noGrp="1" noRot="1" noChangeAspect="1"/>
+          </p:cNvSpPr>
+          <p:nvPr>
+            <p:ph type="sldImg"/>
+          </p:nvPr>
+        </p:nvSpPr>
+        <p:spPr/>
+      </p:sp>
+      <p:sp>
+        <p:nvSpPr>
+          <p:cNvPr id="3" name="Notes Placeholder 2"/>
+          <p:cNvSpPr>
+            <a:spLocks noGrp="1"/>
+          </p:cNvSpPr>
+          <p:nvPr>
+            <p:ph type="body" idx="1"/>
+          </p:nvPr>
+        </p:nvSpPr>
+        <p:spPr/>
+        <p:txBody>
+          <a:bodyPr/>
+          <a:lstStyle/>
+          <a:p>
+            <a:endParaRPr lang="en-AU" dirty="0"/>
+          </a:p>
+        </p:txBody>
+      </p:sp>
+      <p:sp>
+        <p:nvSpPr>
+          <p:cNvPr id="4" name="Slide Number Placeholder 3"/>
+          <p:cNvSpPr>
+            <a:spLocks noGrp="1"/>
+          </p:cNvSpPr>
+          <p:nvPr>
+            <p:ph type="sldNum" sz="quarter" idx="5"/>
+          </p:nvPr>
+        </p:nvSpPr>
+        <p:spPr/>
+        <p:txBody>
+          <a:bodyPr/>
+          <a:lstStyle/>
+          <a:p>
+            <a:fld id="{40410EAA-151D-407D-8FFE-35A692A9E3B4}" type="slidenum">
+              <a:rPr lang="en-AU" smtClean="0"/>
+              <a:t>4</a:t>
+            </a:fld>
+            <a:endParaRPr lang="en-AU"/>
+          </a:p>
+        </p:txBody>
+      </p:sp>
+    </p:spTree>
+    <p:extLst>
+      <p:ext uri="{BB962C8B-B14F-4D97-AF65-F5344CB8AC3E}">
+        <p14:creationId xmlns:p14="http://schemas.microsoft.com/office/powerpoint/2010/main" val="1553410444"/>
+      </p:ext>
+    </p:extLst>
+  </p:cSld>
+  <p:clrMapOvr>
+    <a:masterClrMapping/>
+  </p:clrMapOvr>
+</p:notes>
+</file>
+
+<file path=ppt/notesSlides/notesSlide3.xml><?xml version="1.0" encoding="utf-8"?>
+<p:notes xmlns:a="http://schemas.openxmlformats.org/drawingml/2006/main" xmlns:r="http://schemas.openxmlformats.org/officeDocument/2006/relationships" xmlns:p="http://schemas.openxmlformats.org/presentationml/2006/main">
+  <p:cSld>
+    <p:spTree>
+      <p:nvGrpSpPr>
+        <p:cNvPr id="1" name=""/>
+        <p:cNvGrpSpPr/>
+        <p:nvPr/>
+      </p:nvGrpSpPr>
+      <p:grpSpPr>
+        <a:xfrm>
+          <a:off x="0" y="0"/>
+          <a:ext cx="0" cy="0"/>
+          <a:chOff x="0" y="0"/>
+          <a:chExt cx="0" cy="0"/>
+        </a:xfrm>
+      </p:grpSpPr>
+      <p:sp>
+        <p:nvSpPr>
+          <p:cNvPr id="2" name="Slide Image Placeholder 1"/>
+          <p:cNvSpPr>
+            <a:spLocks noGrp="1" noRot="1" noChangeAspect="1"/>
+          </p:cNvSpPr>
+          <p:nvPr>
+            <p:ph type="sldImg"/>
+          </p:nvPr>
+        </p:nvSpPr>
+        <p:spPr/>
+      </p:sp>
+      <p:sp>
+        <p:nvSpPr>
+          <p:cNvPr id="3" name="Notes Placeholder 2"/>
+          <p:cNvSpPr>
+            <a:spLocks noGrp="1"/>
+          </p:cNvSpPr>
+          <p:nvPr>
+            <p:ph type="body" idx="1"/>
+          </p:nvPr>
+        </p:nvSpPr>
+        <p:spPr/>
+        <p:txBody>
+          <a:bodyPr/>
+          <a:lstStyle/>
+          <a:p>
+            <a:endParaRPr lang="en-AU" dirty="0"/>
+          </a:p>
+        </p:txBody>
+      </p:sp>
+      <p:sp>
+        <p:nvSpPr>
+          <p:cNvPr id="4" name="Slide Number Placeholder 3"/>
+          <p:cNvSpPr>
+            <a:spLocks noGrp="1"/>
+          </p:cNvSpPr>
+          <p:nvPr>
+            <p:ph type="sldNum" sz="quarter" idx="5"/>
+          </p:nvPr>
+        </p:nvSpPr>
+        <p:spPr/>
+        <p:txBody>
+          <a:bodyPr/>
+          <a:lstStyle/>
+          <a:p>
+            <a:fld id="{40410EAA-151D-407D-8FFE-35A692A9E3B4}" type="slidenum">
+              <a:rPr lang="en-AU" smtClean="0"/>
+              <a:t>5</a:t>
+            </a:fld>
+            <a:endParaRPr lang="en-AU"/>
+          </a:p>
+        </p:txBody>
+      </p:sp>
+    </p:spTree>
+    <p:extLst>
+      <p:ext uri="{BB962C8B-B14F-4D97-AF65-F5344CB8AC3E}">
+        <p14:creationId xmlns:p14="http://schemas.microsoft.com/office/powerpoint/2010/main" val="307586708"/>
       </p:ext>
     </p:extLst>
   </p:cSld>
@@ -998,7 +1315,7 @@
           <a:p>
             <a:fld id="{B186AA7B-B86A-4BB4-AD78-26B66DBC9543}" type="datetimeFigureOut">
               <a:rPr lang="en-AU" smtClean="0"/>
-              <a:t>20/06/2024</a:t>
+              <a:t>21/06/2024</a:t>
             </a:fld>
             <a:endParaRPr lang="en-AU"/>
           </a:p>
@@ -1168,7 +1485,7 @@
           <a:p>
             <a:fld id="{B186AA7B-B86A-4BB4-AD78-26B66DBC9543}" type="datetimeFigureOut">
               <a:rPr lang="en-AU" smtClean="0"/>
-              <a:t>20/06/2024</a:t>
+              <a:t>21/06/2024</a:t>
             </a:fld>
             <a:endParaRPr lang="en-AU"/>
           </a:p>
@@ -1348,7 +1665,7 @@
           <a:p>
             <a:fld id="{B186AA7B-B86A-4BB4-AD78-26B66DBC9543}" type="datetimeFigureOut">
               <a:rPr lang="en-AU" smtClean="0"/>
-              <a:t>20/06/2024</a:t>
+              <a:t>21/06/2024</a:t>
             </a:fld>
             <a:endParaRPr lang="en-AU"/>
           </a:p>
@@ -1518,7 +1835,7 @@
           <a:p>
             <a:fld id="{B186AA7B-B86A-4BB4-AD78-26B66DBC9543}" type="datetimeFigureOut">
               <a:rPr lang="en-AU" smtClean="0"/>
-              <a:t>20/06/2024</a:t>
+              <a:t>21/06/2024</a:t>
             </a:fld>
             <a:endParaRPr lang="en-AU"/>
           </a:p>
@@ -1764,7 +2081,7 @@
           <a:p>
             <a:fld id="{B186AA7B-B86A-4BB4-AD78-26B66DBC9543}" type="datetimeFigureOut">
               <a:rPr lang="en-AU" smtClean="0"/>
-              <a:t>20/06/2024</a:t>
+              <a:t>21/06/2024</a:t>
             </a:fld>
             <a:endParaRPr lang="en-AU"/>
           </a:p>
@@ -1996,7 +2313,7 @@
           <a:p>
             <a:fld id="{B186AA7B-B86A-4BB4-AD78-26B66DBC9543}" type="datetimeFigureOut">
               <a:rPr lang="en-AU" smtClean="0"/>
-              <a:t>20/06/2024</a:t>
+              <a:t>21/06/2024</a:t>
             </a:fld>
             <a:endParaRPr lang="en-AU"/>
           </a:p>
@@ -2363,7 +2680,7 @@
           <a:p>
             <a:fld id="{B186AA7B-B86A-4BB4-AD78-26B66DBC9543}" type="datetimeFigureOut">
               <a:rPr lang="en-AU" smtClean="0"/>
-              <a:t>20/06/2024</a:t>
+              <a:t>21/06/2024</a:t>
             </a:fld>
             <a:endParaRPr lang="en-AU"/>
           </a:p>
@@ -2481,7 +2798,7 @@
           <a:p>
             <a:fld id="{B186AA7B-B86A-4BB4-AD78-26B66DBC9543}" type="datetimeFigureOut">
               <a:rPr lang="en-AU" smtClean="0"/>
-              <a:t>20/06/2024</a:t>
+              <a:t>21/06/2024</a:t>
             </a:fld>
             <a:endParaRPr lang="en-AU"/>
           </a:p>
@@ -2576,7 +2893,7 @@
           <a:p>
             <a:fld id="{B186AA7B-B86A-4BB4-AD78-26B66DBC9543}" type="datetimeFigureOut">
               <a:rPr lang="en-AU" smtClean="0"/>
-              <a:t>20/06/2024</a:t>
+              <a:t>21/06/2024</a:t>
             </a:fld>
             <a:endParaRPr lang="en-AU"/>
           </a:p>
@@ -2853,7 +3170,7 @@
           <a:p>
             <a:fld id="{B186AA7B-B86A-4BB4-AD78-26B66DBC9543}" type="datetimeFigureOut">
               <a:rPr lang="en-AU" smtClean="0"/>
-              <a:t>20/06/2024</a:t>
+              <a:t>21/06/2024</a:t>
             </a:fld>
             <a:endParaRPr lang="en-AU"/>
           </a:p>
@@ -3110,7 +3427,7 @@
           <a:p>
             <a:fld id="{B186AA7B-B86A-4BB4-AD78-26B66DBC9543}" type="datetimeFigureOut">
               <a:rPr lang="en-AU" smtClean="0"/>
-              <a:t>20/06/2024</a:t>
+              <a:t>21/06/2024</a:t>
             </a:fld>
             <a:endParaRPr lang="en-AU"/>
           </a:p>
@@ -3323,7 +3640,7 @@
           <a:p>
             <a:fld id="{B186AA7B-B86A-4BB4-AD78-26B66DBC9543}" type="datetimeFigureOut">
               <a:rPr lang="en-AU" smtClean="0"/>
-              <a:t>20/06/2024</a:t>
+              <a:t>21/06/2024</a:t>
             </a:fld>
             <a:endParaRPr lang="en-AU"/>
           </a:p>
@@ -3852,6 +4169,265 @@
       </p:grpSpPr>
       <p:sp>
         <p:nvSpPr>
+          <p:cNvPr id="4" name="TextBox 3">
+            <a:extLst>
+              <a:ext uri="{FF2B5EF4-FFF2-40B4-BE49-F238E27FC236}">
+                <a16:creationId xmlns:a16="http://schemas.microsoft.com/office/drawing/2014/main" id="{6E2A7F2C-1078-6D76-16B9-A4CFBE9E18A6}"/>
+              </a:ext>
+            </a:extLst>
+          </p:cNvPr>
+          <p:cNvSpPr txBox="1"/>
+          <p:nvPr/>
+        </p:nvSpPr>
+        <p:spPr>
+          <a:xfrm>
+            <a:off x="0" y="0"/>
+            <a:ext cx="12192000" cy="5464234"/>
+          </a:xfrm>
+          <a:prstGeom prst="rect">
+            <a:avLst/>
+          </a:prstGeom>
+          <a:noFill/>
+        </p:spPr>
+        <p:txBody>
+          <a:bodyPr wrap="square" rtlCol="0">
+            <a:prstTxWarp prst="textInflateBottom">
+              <a:avLst/>
+            </a:prstTxWarp>
+            <a:spAutoFit/>
+          </a:bodyPr>
+          <a:lstStyle/>
+          <a:p>
+            <a:r>
+              <a:rPr lang="en-AU" dirty="0">
+                <a:blipFill dpi="0" rotWithShape="1">
+                  <a:blip r:embed="rId2">
+                    <a:alphaModFix amt="20000"/>
+                  </a:blip>
+                  <a:srcRect/>
+                  <a:stretch>
+                    <a:fillRect/>
+                  </a:stretch>
+                </a:blipFill>
+              </a:rPr>
+              <a:t>---------------</a:t>
+            </a:r>
+          </a:p>
+        </p:txBody>
+      </p:sp>
+      <p:pic>
+        <p:nvPicPr>
+          <p:cNvPr id="2" name="Content Placeholder 3" descr="A person wearing sunglasses and a hat&#10;&#10;Description automatically generated">
+            <a:extLst>
+              <a:ext uri="{FF2B5EF4-FFF2-40B4-BE49-F238E27FC236}">
+                <a16:creationId xmlns:a16="http://schemas.microsoft.com/office/drawing/2014/main" id="{D093D009-568A-2661-D3CD-84A32BB75D99}"/>
+              </a:ext>
+            </a:extLst>
+          </p:cNvPr>
+          <p:cNvPicPr>
+            <a:picLocks noChangeAspect="1"/>
+          </p:cNvPicPr>
+          <p:nvPr/>
+        </p:nvPicPr>
+        <p:blipFill>
+          <a:blip r:embed="rId3"/>
+          <a:stretch>
+            <a:fillRect/>
+          </a:stretch>
+        </p:blipFill>
+        <p:spPr>
+          <a:xfrm>
+            <a:off x="302722" y="5719227"/>
+            <a:ext cx="963262" cy="997665"/>
+          </a:xfrm>
+          <a:prstGeom prst="rect">
+            <a:avLst/>
+          </a:prstGeom>
+          <a:effectLst>
+            <a:softEdge rad="50800"/>
+          </a:effectLst>
+        </p:spPr>
+      </p:pic>
+      <p:sp>
+        <p:nvSpPr>
+          <p:cNvPr id="5" name="TextBox 4">
+            <a:extLst>
+              <a:ext uri="{FF2B5EF4-FFF2-40B4-BE49-F238E27FC236}">
+                <a16:creationId xmlns:a16="http://schemas.microsoft.com/office/drawing/2014/main" id="{A7159774-B73E-3B53-5B9B-CA8E635AECF0}"/>
+              </a:ext>
+            </a:extLst>
+          </p:cNvPr>
+          <p:cNvSpPr txBox="1"/>
+          <p:nvPr/>
+        </p:nvSpPr>
+        <p:spPr>
+          <a:xfrm>
+            <a:off x="241905" y="464458"/>
+            <a:ext cx="10609943" cy="3108543"/>
+          </a:xfrm>
+          <a:prstGeom prst="rect">
+            <a:avLst/>
+          </a:prstGeom>
+          <a:noFill/>
+        </p:spPr>
+        <p:txBody>
+          <a:bodyPr wrap="square" rtlCol="0">
+            <a:spAutoFit/>
+          </a:bodyPr>
+          <a:lstStyle/>
+          <a:p>
+            <a:pPr algn="ctr"/>
+            <a:r>
+              <a:rPr lang="en-AU" sz="4400" b="1" dirty="0"/>
+              <a:t>Challenge: </a:t>
+            </a:r>
+          </a:p>
+          <a:p>
+            <a:pPr algn="ctr"/>
+            <a:r>
+              <a:rPr lang="en-AU" sz="4400" b="1" dirty="0"/>
+              <a:t>Optimising Emergency Response</a:t>
+            </a:r>
+          </a:p>
+          <a:p>
+            <a:endParaRPr lang="en-AU" dirty="0"/>
+          </a:p>
+          <a:p>
+            <a:endParaRPr lang="en-AU" dirty="0"/>
+          </a:p>
+          <a:p>
+            <a:r>
+              <a:rPr lang="en-AU" b="1" dirty="0"/>
+              <a:t>Our system improves </a:t>
+            </a:r>
+            <a:r>
+              <a:rPr lang="en-AU" b="1" dirty="0">
+                <a:solidFill>
+                  <a:srgbClr val="FFFF00"/>
+                </a:solidFill>
+              </a:rPr>
+              <a:t>WAPOL Response time</a:t>
+            </a:r>
+            <a:r>
+              <a:rPr lang="en-AU" b="1" dirty="0"/>
+              <a:t>:</a:t>
+            </a:r>
+          </a:p>
+          <a:p>
+            <a:endParaRPr lang="en-AU" b="1" dirty="0"/>
+          </a:p>
+          <a:p>
+            <a:r>
+              <a:rPr lang="en-AU" b="1" dirty="0"/>
+              <a:t>Achieve 12min Attendance KPI for Priority 1 &amp; 2 incidents</a:t>
+            </a:r>
+          </a:p>
+          <a:p>
+            <a:r>
+              <a:rPr lang="en-AU" b="1" dirty="0"/>
+              <a:t>Achieve Community expectation</a:t>
+            </a:r>
+          </a:p>
+        </p:txBody>
+      </p:sp>
+      <p:pic>
+        <p:nvPicPr>
+          <p:cNvPr id="7" name="Picture 6">
+            <a:extLst>
+              <a:ext uri="{FF2B5EF4-FFF2-40B4-BE49-F238E27FC236}">
+                <a16:creationId xmlns:a16="http://schemas.microsoft.com/office/drawing/2014/main" id="{2053E5A1-3D9B-18FE-BF2F-3445A0CA7C2A}"/>
+              </a:ext>
+            </a:extLst>
+          </p:cNvPr>
+          <p:cNvPicPr>
+            <a:picLocks noChangeAspect="1"/>
+          </p:cNvPicPr>
+          <p:nvPr/>
+        </p:nvPicPr>
+        <p:blipFill>
+          <a:blip r:embed="rId4"/>
+          <a:stretch>
+            <a:fillRect/>
+          </a:stretch>
+        </p:blipFill>
+        <p:spPr>
+          <a:xfrm>
+            <a:off x="6473614" y="2518251"/>
+            <a:ext cx="5132849" cy="3683044"/>
+          </a:xfrm>
+          <a:prstGeom prst="rect">
+            <a:avLst/>
+          </a:prstGeom>
+        </p:spPr>
+      </p:pic>
+      <p:sp>
+        <p:nvSpPr>
+          <p:cNvPr id="8" name="TextBox 7">
+            <a:extLst>
+              <a:ext uri="{FF2B5EF4-FFF2-40B4-BE49-F238E27FC236}">
+                <a16:creationId xmlns:a16="http://schemas.microsoft.com/office/drawing/2014/main" id="{45FEFE0A-BB4F-C972-4BD6-0962B40B10B1}"/>
+              </a:ext>
+            </a:extLst>
+          </p:cNvPr>
+          <p:cNvSpPr txBox="1"/>
+          <p:nvPr/>
+        </p:nvSpPr>
+        <p:spPr>
+          <a:xfrm>
+            <a:off x="5885411" y="6225184"/>
+            <a:ext cx="6777643" cy="369332"/>
+          </a:xfrm>
+          <a:prstGeom prst="rect">
+            <a:avLst/>
+          </a:prstGeom>
+          <a:noFill/>
+        </p:spPr>
+        <p:txBody>
+          <a:bodyPr wrap="square" rtlCol="0">
+            <a:spAutoFit/>
+          </a:bodyPr>
+          <a:lstStyle/>
+          <a:p>
+            <a:r>
+              <a:rPr lang="en-US" i="1" dirty="0"/>
+              <a:t>WESTERN AUSTRALIA POLICE FORCE ANNUAL REPORT 2023</a:t>
+            </a:r>
+            <a:endParaRPr lang="en-AU" i="1" dirty="0"/>
+          </a:p>
+        </p:txBody>
+      </p:sp>
+    </p:spTree>
+    <p:extLst>
+      <p:ext uri="{BB962C8B-B14F-4D97-AF65-F5344CB8AC3E}">
+        <p14:creationId xmlns:p14="http://schemas.microsoft.com/office/powerpoint/2010/main" val="468884825"/>
+      </p:ext>
+    </p:extLst>
+  </p:cSld>
+  <p:clrMapOvr>
+    <a:masterClrMapping/>
+  </p:clrMapOvr>
+</p:sld>
+</file>
+
+<file path=ppt/slides/slide3.xml><?xml version="1.0" encoding="utf-8"?>
+<p:sld xmlns:a="http://schemas.openxmlformats.org/drawingml/2006/main" xmlns:r="http://schemas.openxmlformats.org/officeDocument/2006/relationships" xmlns:p="http://schemas.openxmlformats.org/presentationml/2006/main">
+  <p:cSld>
+    <p:spTree>
+      <p:nvGrpSpPr>
+        <p:cNvPr id="1" name=""/>
+        <p:cNvGrpSpPr/>
+        <p:nvPr/>
+      </p:nvGrpSpPr>
+      <p:grpSpPr>
+        <a:xfrm>
+          <a:off x="0" y="0"/>
+          <a:ext cx="0" cy="0"/>
+          <a:chOff x="0" y="0"/>
+          <a:chExt cx="0" cy="0"/>
+        </a:xfrm>
+      </p:grpSpPr>
+      <p:sp>
+        <p:nvSpPr>
           <p:cNvPr id="5" name="TextBox 4">
             <a:extLst>
               <a:ext uri="{FF2B5EF4-FFF2-40B4-BE49-F238E27FC236}">
@@ -4045,7 +4621,7 @@
         </p:blipFill>
         <p:spPr>
           <a:xfrm>
-            <a:off x="7447493" y="2534628"/>
+            <a:off x="7358824" y="2542706"/>
             <a:ext cx="4889647" cy="1652247"/>
           </a:xfrm>
           <a:prstGeom prst="rect">
@@ -4528,6 +5104,81 @@
           </a:extLst>
         </p:spPr>
       </p:pic>
+      <p:sp>
+        <p:nvSpPr>
+          <p:cNvPr id="2" name="TextBox 1">
+            <a:extLst>
+              <a:ext uri="{FF2B5EF4-FFF2-40B4-BE49-F238E27FC236}">
+                <a16:creationId xmlns:a16="http://schemas.microsoft.com/office/drawing/2014/main" id="{55DDFDEC-0443-CFAF-4A71-12BCFFC28514}"/>
+              </a:ext>
+            </a:extLst>
+          </p:cNvPr>
+          <p:cNvSpPr txBox="1"/>
+          <p:nvPr/>
+        </p:nvSpPr>
+        <p:spPr>
+          <a:xfrm>
+            <a:off x="381395" y="221012"/>
+            <a:ext cx="3730171" cy="523220"/>
+          </a:xfrm>
+          <a:prstGeom prst="rect">
+            <a:avLst/>
+          </a:prstGeom>
+          <a:noFill/>
+        </p:spPr>
+        <p:txBody>
+          <a:bodyPr wrap="square" rtlCol="0">
+            <a:spAutoFit/>
+          </a:bodyPr>
+          <a:lstStyle/>
+          <a:p>
+            <a:r>
+              <a:rPr lang="en-AU" sz="2800" b="1" dirty="0"/>
+              <a:t>Introducing…</a:t>
+            </a:r>
+          </a:p>
+        </p:txBody>
+      </p:sp>
+      <p:sp>
+        <p:nvSpPr>
+          <p:cNvPr id="3" name="TextBox 2">
+            <a:extLst>
+              <a:ext uri="{FF2B5EF4-FFF2-40B4-BE49-F238E27FC236}">
+                <a16:creationId xmlns:a16="http://schemas.microsoft.com/office/drawing/2014/main" id="{2C80FFCE-9E61-779A-4B3A-E78B8A571889}"/>
+              </a:ext>
+            </a:extLst>
+          </p:cNvPr>
+          <p:cNvSpPr txBox="1"/>
+          <p:nvPr/>
+        </p:nvSpPr>
+        <p:spPr>
+          <a:xfrm>
+            <a:off x="8405619" y="4007888"/>
+            <a:ext cx="2942706" cy="646331"/>
+          </a:xfrm>
+          <a:prstGeom prst="rect">
+            <a:avLst/>
+          </a:prstGeom>
+          <a:noFill/>
+        </p:spPr>
+        <p:txBody>
+          <a:bodyPr wrap="square" rtlCol="0">
+            <a:spAutoFit/>
+          </a:bodyPr>
+          <a:lstStyle/>
+          <a:p>
+            <a:pPr algn="ctr"/>
+            <a:r>
+              <a:rPr lang="en-AU" b="1" dirty="0">
+                <a:solidFill>
+                  <a:schemeClr val="accent1"/>
+                </a:solidFill>
+              </a:rPr>
+              <a:t>Traffic Signal Optimised routing</a:t>
+            </a:r>
+          </a:p>
+        </p:txBody>
+      </p:sp>
     </p:spTree>
     <p:extLst>
       <p:ext uri="{BB962C8B-B14F-4D97-AF65-F5344CB8AC3E}">
@@ -4541,7 +5192,7 @@
 </p:sld>
 </file>
 
-<file path=ppt/slides/slide3.xml><?xml version="1.0" encoding="utf-8"?>
+<file path=ppt/slides/slide4.xml><?xml version="1.0" encoding="utf-8"?>
 <p:sld xmlns:a="http://schemas.openxmlformats.org/drawingml/2006/main" xmlns:r="http://schemas.openxmlformats.org/officeDocument/2006/relationships" xmlns:p="http://schemas.openxmlformats.org/presentationml/2006/main">
   <p:cSld>
     <p:spTree>
@@ -4560,10 +5211,10 @@
       </p:grpSpPr>
       <p:sp>
         <p:nvSpPr>
-          <p:cNvPr id="4" name="TextBox 3">
+          <p:cNvPr id="5" name="TextBox 4">
             <a:extLst>
               <a:ext uri="{FF2B5EF4-FFF2-40B4-BE49-F238E27FC236}">
-                <a16:creationId xmlns:a16="http://schemas.microsoft.com/office/drawing/2014/main" id="{6E2A7F2C-1078-6D76-16B9-A4CFBE9E18A6}"/>
+                <a16:creationId xmlns:a16="http://schemas.microsoft.com/office/drawing/2014/main" id="{1D613CEF-257B-B686-4999-8D4FF50EC036}"/>
               </a:ext>
             </a:extLst>
           </p:cNvPr>
@@ -4592,8 +5243,8 @@
             <a:r>
               <a:rPr lang="en-AU" dirty="0">
                 <a:blipFill dpi="0" rotWithShape="1">
-                  <a:blip r:embed="rId2">
-                    <a:alphaModFix amt="40000"/>
+                  <a:blip r:embed="rId3">
+                    <a:alphaModFix amt="20000"/>
                   </a:blip>
                   <a:srcRect/>
                   <a:stretch>
@@ -4608,27 +5259,74 @@
       </p:sp>
       <p:pic>
         <p:nvPicPr>
-          <p:cNvPr id="2" name="Content Placeholder 3" descr="A person wearing sunglasses and a hat&#10;&#10;Description automatically generated">
+          <p:cNvPr id="1026" name="Picture 2" descr="Premium Photo | A black phone with a black background with a black  background with flowers.">
             <a:extLst>
               <a:ext uri="{FF2B5EF4-FFF2-40B4-BE49-F238E27FC236}">
-                <a16:creationId xmlns:a16="http://schemas.microsoft.com/office/drawing/2014/main" id="{D093D009-568A-2661-D3CD-84A32BB75D99}"/>
+                <a16:creationId xmlns:a16="http://schemas.microsoft.com/office/drawing/2014/main" id="{B07670B7-3924-072E-F46E-E0F97E133332}"/>
               </a:ext>
             </a:extLst>
           </p:cNvPr>
           <p:cNvPicPr>
-            <a:picLocks noChangeAspect="1"/>
+            <a:picLocks noChangeAspect="1" noChangeArrowheads="1"/>
           </p:cNvPicPr>
           <p:nvPr/>
         </p:nvPicPr>
+        <p:blipFill rotWithShape="1">
+          <a:blip r:embed="rId4">
+            <a:extLst>
+              <a:ext uri="{28A0092B-C50C-407E-A947-70E740481C1C}">
+                <a14:useLocalDpi xmlns:a14="http://schemas.microsoft.com/office/drawing/2010/main" val="0"/>
+              </a:ext>
+            </a:extLst>
+          </a:blip>
+          <a:srcRect l="39974" t="19705" r="38239" b="13620"/>
+          <a:stretch/>
+        </p:blipFill>
+        <p:spPr bwMode="auto">
+          <a:xfrm>
+            <a:off x="-3462157" y="337871"/>
+            <a:ext cx="3032676" cy="6182258"/>
+          </a:xfrm>
+          <a:prstGeom prst="rect">
+            <a:avLst/>
+          </a:prstGeom>
+          <a:noFill/>
+          <a:extLst>
+            <a:ext uri="{909E8E84-426E-40DD-AFC4-6F175D3DCCD1}">
+              <a14:hiddenFill xmlns:a14="http://schemas.microsoft.com/office/drawing/2010/main">
+                <a:solidFill>
+                  <a:srgbClr val="FFFFFF"/>
+                </a:solidFill>
+              </a14:hiddenFill>
+            </a:ext>
+          </a:extLst>
+        </p:spPr>
+      </p:pic>
+      <p:pic>
+        <p:nvPicPr>
+          <p:cNvPr id="4" name="Content Placeholder 3" descr="A person wearing sunglasses and a hat&#10;&#10;Description automatically generated">
+            <a:extLst>
+              <a:ext uri="{FF2B5EF4-FFF2-40B4-BE49-F238E27FC236}">
+                <a16:creationId xmlns:a16="http://schemas.microsoft.com/office/drawing/2014/main" id="{DC1882F4-AD2B-FC4A-5C52-30198FC44914}"/>
+              </a:ext>
+            </a:extLst>
+          </p:cNvPr>
+          <p:cNvPicPr>
+            <a:picLocks noGrp="1" noChangeAspect="1"/>
+          </p:cNvPicPr>
+          <p:nvPr>
+            <p:ph idx="1"/>
+          </p:nvPr>
+        </p:nvPicPr>
         <p:blipFill>
-          <a:blip r:embed="rId3"/>
+          <a:blip r:embed="rId5"/>
           <a:stretch>
             <a:fillRect/>
           </a:stretch>
         </p:blipFill>
         <p:spPr>
           <a:xfrm>
-            <a:off x="302722" y="5719227"/>
+            <a:off x="11014377" y="5736433"/>
             <a:ext cx="963262" cy="997665"/>
           </a:xfrm>
           <a:prstGeom prst="rect">
@@ -4639,10 +5337,505 @@
           </a:effectLst>
         </p:spPr>
       </p:pic>
+      <p:pic>
+        <p:nvPicPr>
+          <p:cNvPr id="22" name="Picture 21" descr="A blue text with a black background&#10;&#10;Description automatically generated">
+            <a:extLst>
+              <a:ext uri="{FF2B5EF4-FFF2-40B4-BE49-F238E27FC236}">
+                <a16:creationId xmlns:a16="http://schemas.microsoft.com/office/drawing/2014/main" id="{00EB3552-9139-0801-0400-B08EA7F3F645}"/>
+              </a:ext>
+            </a:extLst>
+          </p:cNvPr>
+          <p:cNvPicPr>
+            <a:picLocks noChangeAspect="1"/>
+          </p:cNvPicPr>
+          <p:nvPr/>
+        </p:nvPicPr>
+        <p:blipFill>
+          <a:blip r:embed="rId6">
+            <a:extLst>
+              <a:ext uri="{28A0092B-C50C-407E-A947-70E740481C1C}">
+                <a14:useLocalDpi xmlns:a14="http://schemas.microsoft.com/office/drawing/2010/main" val="0"/>
+              </a:ext>
+            </a:extLst>
+          </a:blip>
+          <a:stretch>
+            <a:fillRect/>
+          </a:stretch>
+        </p:blipFill>
+        <p:spPr>
+          <a:xfrm>
+            <a:off x="9348505" y="4660340"/>
+            <a:ext cx="692267" cy="233922"/>
+          </a:xfrm>
+          <a:prstGeom prst="rect">
+            <a:avLst/>
+          </a:prstGeom>
+          <a:effectLst>
+            <a:softEdge rad="228600"/>
+          </a:effectLst>
+        </p:spPr>
+      </p:pic>
+      <p:pic>
+        <p:nvPicPr>
+          <p:cNvPr id="11" name="Picture 10" descr="A bright light in a circle&#10;&#10;Description automatically generated">
+            <a:extLst>
+              <a:ext uri="{FF2B5EF4-FFF2-40B4-BE49-F238E27FC236}">
+                <a16:creationId xmlns:a16="http://schemas.microsoft.com/office/drawing/2014/main" id="{AA0DB806-23A1-A355-EE05-A30C77DC6942}"/>
+              </a:ext>
+            </a:extLst>
+          </p:cNvPr>
+          <p:cNvPicPr>
+            <a:picLocks noChangeAspect="1"/>
+          </p:cNvPicPr>
+          <p:nvPr/>
+        </p:nvPicPr>
+        <p:blipFill>
+          <a:blip r:embed="rId7">
+            <a:extLst>
+              <a:ext uri="{28A0092B-C50C-407E-A947-70E740481C1C}">
+                <a14:useLocalDpi xmlns:a14="http://schemas.microsoft.com/office/drawing/2010/main" val="0"/>
+              </a:ext>
+            </a:extLst>
+          </a:blip>
+          <a:stretch>
+            <a:fillRect/>
+          </a:stretch>
+        </p:blipFill>
+        <p:spPr>
+          <a:xfrm>
+            <a:off x="-3945000" y="2449515"/>
+            <a:ext cx="2158439" cy="1652247"/>
+          </a:xfrm>
+          <a:prstGeom prst="rect">
+            <a:avLst/>
+          </a:prstGeom>
+        </p:spPr>
+      </p:pic>
+      <p:sp>
+        <p:nvSpPr>
+          <p:cNvPr id="2" name="TextBox 1">
+            <a:extLst>
+              <a:ext uri="{FF2B5EF4-FFF2-40B4-BE49-F238E27FC236}">
+                <a16:creationId xmlns:a16="http://schemas.microsoft.com/office/drawing/2014/main" id="{55DDFDEC-0443-CFAF-4A71-12BCFFC28514}"/>
+              </a:ext>
+            </a:extLst>
+          </p:cNvPr>
+          <p:cNvSpPr txBox="1"/>
+          <p:nvPr/>
+        </p:nvSpPr>
+        <p:spPr>
+          <a:xfrm>
+            <a:off x="381395" y="221012"/>
+            <a:ext cx="8884525" cy="1200329"/>
+          </a:xfrm>
+          <a:prstGeom prst="rect">
+            <a:avLst/>
+          </a:prstGeom>
+          <a:noFill/>
+        </p:spPr>
+        <p:txBody>
+          <a:bodyPr wrap="square" rtlCol="0">
+            <a:spAutoFit/>
+          </a:bodyPr>
+          <a:lstStyle/>
+          <a:p>
+            <a:r>
+              <a:rPr lang="en-AU" dirty="0" err="1"/>
+              <a:t>Blueflare</a:t>
+            </a:r>
+            <a:r>
+              <a:rPr lang="en-AU" dirty="0"/>
+              <a:t> takes traffic data from Apple Maps, Google Maps, Waze, SCAT </a:t>
+            </a:r>
+          </a:p>
+          <a:p>
+            <a:endParaRPr lang="en-AU" dirty="0"/>
+          </a:p>
+          <a:p>
+            <a:r>
+              <a:rPr lang="en-AU" dirty="0"/>
+              <a:t>Available car – route calculation</a:t>
+            </a:r>
+          </a:p>
+          <a:p>
+            <a:r>
+              <a:rPr lang="en-AU" dirty="0"/>
+              <a:t>Control intersection Traffic Lights</a:t>
+            </a:r>
+          </a:p>
+        </p:txBody>
+      </p:sp>
     </p:spTree>
     <p:extLst>
       <p:ext uri="{BB962C8B-B14F-4D97-AF65-F5344CB8AC3E}">
-        <p14:creationId xmlns:p14="http://schemas.microsoft.com/office/powerpoint/2010/main" val="468884825"/>
+        <p14:creationId xmlns:p14="http://schemas.microsoft.com/office/powerpoint/2010/main" val="1760221263"/>
+      </p:ext>
+    </p:extLst>
+  </p:cSld>
+  <p:clrMapOvr>
+    <a:masterClrMapping/>
+  </p:clrMapOvr>
+</p:sld>
+</file>
+
+<file path=ppt/slides/slide5.xml><?xml version="1.0" encoding="utf-8"?>
+<p:sld xmlns:a="http://schemas.openxmlformats.org/drawingml/2006/main" xmlns:r="http://schemas.openxmlformats.org/officeDocument/2006/relationships" xmlns:p="http://schemas.openxmlformats.org/presentationml/2006/main">
+  <p:cSld>
+    <p:spTree>
+      <p:nvGrpSpPr>
+        <p:cNvPr id="1" name=""/>
+        <p:cNvGrpSpPr/>
+        <p:nvPr/>
+      </p:nvGrpSpPr>
+      <p:grpSpPr>
+        <a:xfrm>
+          <a:off x="0" y="0"/>
+          <a:ext cx="0" cy="0"/>
+          <a:chOff x="0" y="0"/>
+          <a:chExt cx="0" cy="0"/>
+        </a:xfrm>
+      </p:grpSpPr>
+      <p:sp>
+        <p:nvSpPr>
+          <p:cNvPr id="5" name="TextBox 4">
+            <a:extLst>
+              <a:ext uri="{FF2B5EF4-FFF2-40B4-BE49-F238E27FC236}">
+                <a16:creationId xmlns:a16="http://schemas.microsoft.com/office/drawing/2014/main" id="{1D613CEF-257B-B686-4999-8D4FF50EC036}"/>
+              </a:ext>
+            </a:extLst>
+          </p:cNvPr>
+          <p:cNvSpPr txBox="1"/>
+          <p:nvPr/>
+        </p:nvSpPr>
+        <p:spPr>
+          <a:xfrm>
+            <a:off x="0" y="-1"/>
+            <a:ext cx="12192000" cy="5464234"/>
+          </a:xfrm>
+          <a:prstGeom prst="rect">
+            <a:avLst/>
+          </a:prstGeom>
+          <a:noFill/>
+        </p:spPr>
+        <p:txBody>
+          <a:bodyPr wrap="square" rtlCol="0">
+            <a:prstTxWarp prst="textInflateBottom">
+              <a:avLst/>
+            </a:prstTxWarp>
+            <a:spAutoFit/>
+          </a:bodyPr>
+          <a:lstStyle/>
+          <a:p>
+            <a:r>
+              <a:rPr lang="en-AU" dirty="0">
+                <a:blipFill dpi="0" rotWithShape="1">
+                  <a:blip r:embed="rId3">
+                    <a:alphaModFix amt="20000"/>
+                  </a:blip>
+                  <a:srcRect/>
+                  <a:stretch>
+                    <a:fillRect/>
+                  </a:stretch>
+                </a:blipFill>
+              </a:rPr>
+              <a:t>---------------</a:t>
+            </a:r>
+          </a:p>
+        </p:txBody>
+      </p:sp>
+      <p:pic>
+        <p:nvPicPr>
+          <p:cNvPr id="1026" name="Picture 2" descr="Premium Photo | A black phone with a black background with a black  background with flowers.">
+            <a:extLst>
+              <a:ext uri="{FF2B5EF4-FFF2-40B4-BE49-F238E27FC236}">
+                <a16:creationId xmlns:a16="http://schemas.microsoft.com/office/drawing/2014/main" id="{B07670B7-3924-072E-F46E-E0F97E133332}"/>
+              </a:ext>
+            </a:extLst>
+          </p:cNvPr>
+          <p:cNvPicPr>
+            <a:picLocks noChangeAspect="1" noChangeArrowheads="1"/>
+          </p:cNvPicPr>
+          <p:nvPr/>
+        </p:nvPicPr>
+        <p:blipFill rotWithShape="1">
+          <a:blip r:embed="rId4">
+            <a:extLst>
+              <a:ext uri="{28A0092B-C50C-407E-A947-70E740481C1C}">
+                <a14:useLocalDpi xmlns:a14="http://schemas.microsoft.com/office/drawing/2010/main" val="0"/>
+              </a:ext>
+            </a:extLst>
+          </a:blip>
+          <a:srcRect l="39974" t="19705" r="38239" b="13620"/>
+          <a:stretch/>
+        </p:blipFill>
+        <p:spPr bwMode="auto">
+          <a:xfrm>
+            <a:off x="-3462157" y="337871"/>
+            <a:ext cx="3032676" cy="6182258"/>
+          </a:xfrm>
+          <a:prstGeom prst="rect">
+            <a:avLst/>
+          </a:prstGeom>
+          <a:noFill/>
+          <a:extLst>
+            <a:ext uri="{909E8E84-426E-40DD-AFC4-6F175D3DCCD1}">
+              <a14:hiddenFill xmlns:a14="http://schemas.microsoft.com/office/drawing/2010/main">
+                <a:solidFill>
+                  <a:srgbClr val="FFFFFF"/>
+                </a:solidFill>
+              </a14:hiddenFill>
+            </a:ext>
+          </a:extLst>
+        </p:spPr>
+      </p:pic>
+      <p:pic>
+        <p:nvPicPr>
+          <p:cNvPr id="4" name="Content Placeholder 3" descr="A person wearing sunglasses and a hat&#10;&#10;Description automatically generated">
+            <a:extLst>
+              <a:ext uri="{FF2B5EF4-FFF2-40B4-BE49-F238E27FC236}">
+                <a16:creationId xmlns:a16="http://schemas.microsoft.com/office/drawing/2014/main" id="{DC1882F4-AD2B-FC4A-5C52-30198FC44914}"/>
+              </a:ext>
+            </a:extLst>
+          </p:cNvPr>
+          <p:cNvPicPr>
+            <a:picLocks noGrp="1" noChangeAspect="1"/>
+          </p:cNvPicPr>
+          <p:nvPr>
+            <p:ph idx="1"/>
+          </p:nvPr>
+        </p:nvPicPr>
+        <p:blipFill>
+          <a:blip r:embed="rId5"/>
+          <a:stretch>
+            <a:fillRect/>
+          </a:stretch>
+        </p:blipFill>
+        <p:spPr>
+          <a:xfrm>
+            <a:off x="11014377" y="5736433"/>
+            <a:ext cx="963262" cy="997665"/>
+          </a:xfrm>
+          <a:prstGeom prst="rect">
+            <a:avLst/>
+          </a:prstGeom>
+          <a:effectLst>
+            <a:softEdge rad="50800"/>
+          </a:effectLst>
+        </p:spPr>
+      </p:pic>
+      <p:pic>
+        <p:nvPicPr>
+          <p:cNvPr id="22" name="Picture 21" descr="A blue text with a black background&#10;&#10;Description automatically generated">
+            <a:extLst>
+              <a:ext uri="{FF2B5EF4-FFF2-40B4-BE49-F238E27FC236}">
+                <a16:creationId xmlns:a16="http://schemas.microsoft.com/office/drawing/2014/main" id="{00EB3552-9139-0801-0400-B08EA7F3F645}"/>
+              </a:ext>
+            </a:extLst>
+          </p:cNvPr>
+          <p:cNvPicPr>
+            <a:picLocks noChangeAspect="1"/>
+          </p:cNvPicPr>
+          <p:nvPr/>
+        </p:nvPicPr>
+        <p:blipFill>
+          <a:blip r:embed="rId6">
+            <a:extLst>
+              <a:ext uri="{28A0092B-C50C-407E-A947-70E740481C1C}">
+                <a14:useLocalDpi xmlns:a14="http://schemas.microsoft.com/office/drawing/2010/main" val="0"/>
+              </a:ext>
+            </a:extLst>
+          </a:blip>
+          <a:stretch>
+            <a:fillRect/>
+          </a:stretch>
+        </p:blipFill>
+        <p:spPr>
+          <a:xfrm>
+            <a:off x="9348505" y="4660340"/>
+            <a:ext cx="692267" cy="233922"/>
+          </a:xfrm>
+          <a:prstGeom prst="rect">
+            <a:avLst/>
+          </a:prstGeom>
+          <a:effectLst>
+            <a:softEdge rad="228600"/>
+          </a:effectLst>
+        </p:spPr>
+      </p:pic>
+      <p:pic>
+        <p:nvPicPr>
+          <p:cNvPr id="11" name="Picture 10" descr="A bright light in a circle&#10;&#10;Description automatically generated">
+            <a:extLst>
+              <a:ext uri="{FF2B5EF4-FFF2-40B4-BE49-F238E27FC236}">
+                <a16:creationId xmlns:a16="http://schemas.microsoft.com/office/drawing/2014/main" id="{AA0DB806-23A1-A355-EE05-A30C77DC6942}"/>
+              </a:ext>
+            </a:extLst>
+          </p:cNvPr>
+          <p:cNvPicPr>
+            <a:picLocks noChangeAspect="1"/>
+          </p:cNvPicPr>
+          <p:nvPr/>
+        </p:nvPicPr>
+        <p:blipFill>
+          <a:blip r:embed="rId7">
+            <a:extLst>
+              <a:ext uri="{28A0092B-C50C-407E-A947-70E740481C1C}">
+                <a14:useLocalDpi xmlns:a14="http://schemas.microsoft.com/office/drawing/2010/main" val="0"/>
+              </a:ext>
+            </a:extLst>
+          </a:blip>
+          <a:stretch>
+            <a:fillRect/>
+          </a:stretch>
+        </p:blipFill>
+        <p:spPr>
+          <a:xfrm>
+            <a:off x="-3945000" y="2449515"/>
+            <a:ext cx="2158439" cy="1652247"/>
+          </a:xfrm>
+          <a:prstGeom prst="rect">
+            <a:avLst/>
+          </a:prstGeom>
+        </p:spPr>
+      </p:pic>
+      <p:sp>
+        <p:nvSpPr>
+          <p:cNvPr id="2" name="TextBox 1">
+            <a:extLst>
+              <a:ext uri="{FF2B5EF4-FFF2-40B4-BE49-F238E27FC236}">
+                <a16:creationId xmlns:a16="http://schemas.microsoft.com/office/drawing/2014/main" id="{55DDFDEC-0443-CFAF-4A71-12BCFFC28514}"/>
+              </a:ext>
+            </a:extLst>
+          </p:cNvPr>
+          <p:cNvSpPr txBox="1"/>
+          <p:nvPr/>
+        </p:nvSpPr>
+        <p:spPr>
+          <a:xfrm>
+            <a:off x="381395" y="221011"/>
+            <a:ext cx="10430692" cy="1754326"/>
+          </a:xfrm>
+          <a:prstGeom prst="rect">
+            <a:avLst/>
+          </a:prstGeom>
+          <a:noFill/>
+        </p:spPr>
+        <p:txBody>
+          <a:bodyPr wrap="square" rtlCol="0">
+            <a:spAutoFit/>
+          </a:bodyPr>
+          <a:lstStyle/>
+          <a:p>
+            <a:r>
+              <a:rPr lang="en-AU" dirty="0"/>
+              <a:t>What we can do</a:t>
+            </a:r>
+          </a:p>
+          <a:p>
+            <a:endParaRPr lang="en-AU" dirty="0"/>
+          </a:p>
+          <a:p>
+            <a:r>
+              <a:rPr lang="en-AU" dirty="0"/>
+              <a:t>Future Opportunities:</a:t>
+            </a:r>
+          </a:p>
+          <a:p>
+            <a:endParaRPr lang="en-AU" dirty="0"/>
+          </a:p>
+          <a:p>
+            <a:r>
+              <a:rPr lang="en-AU" dirty="0"/>
+              <a:t>Machine Learning to optimise all available resources and intersection manipulation – looking at every available resources and determine which resource </a:t>
+            </a:r>
+          </a:p>
+        </p:txBody>
+      </p:sp>
+    </p:spTree>
+    <p:extLst>
+      <p:ext uri="{BB962C8B-B14F-4D97-AF65-F5344CB8AC3E}">
+        <p14:creationId xmlns:p14="http://schemas.microsoft.com/office/powerpoint/2010/main" val="535619648"/>
+      </p:ext>
+    </p:extLst>
+  </p:cSld>
+  <p:clrMapOvr>
+    <a:masterClrMapping/>
+  </p:clrMapOvr>
+</p:sld>
+</file>
+
+<file path=ppt/slides/slide6.xml><?xml version="1.0" encoding="utf-8"?>
+<p:sld xmlns:a="http://schemas.openxmlformats.org/drawingml/2006/main" xmlns:r="http://schemas.openxmlformats.org/officeDocument/2006/relationships" xmlns:p="http://schemas.openxmlformats.org/presentationml/2006/main">
+  <p:cSld>
+    <p:spTree>
+      <p:nvGrpSpPr>
+        <p:cNvPr id="1" name=""/>
+        <p:cNvGrpSpPr/>
+        <p:nvPr/>
+      </p:nvGrpSpPr>
+      <p:grpSpPr>
+        <a:xfrm>
+          <a:off x="0" y="0"/>
+          <a:ext cx="0" cy="0"/>
+          <a:chOff x="0" y="0"/>
+          <a:chExt cx="0" cy="0"/>
+        </a:xfrm>
+      </p:grpSpPr>
+      <p:sp>
+        <p:nvSpPr>
+          <p:cNvPr id="2" name="Title 1">
+            <a:extLst>
+              <a:ext uri="{FF2B5EF4-FFF2-40B4-BE49-F238E27FC236}">
+                <a16:creationId xmlns:a16="http://schemas.microsoft.com/office/drawing/2014/main" id="{FF07256C-90A9-A089-110C-211D080C9F00}"/>
+              </a:ext>
+            </a:extLst>
+          </p:cNvPr>
+          <p:cNvSpPr>
+            <a:spLocks noGrp="1"/>
+          </p:cNvSpPr>
+          <p:nvPr>
+            <p:ph type="title"/>
+          </p:nvPr>
+        </p:nvSpPr>
+        <p:spPr/>
+        <p:txBody>
+          <a:bodyPr/>
+          <a:lstStyle/>
+          <a:p>
+            <a:endParaRPr lang="en-AU"/>
+          </a:p>
+        </p:txBody>
+      </p:sp>
+      <p:sp>
+        <p:nvSpPr>
+          <p:cNvPr id="3" name="Content Placeholder 2">
+            <a:extLst>
+              <a:ext uri="{FF2B5EF4-FFF2-40B4-BE49-F238E27FC236}">
+                <a16:creationId xmlns:a16="http://schemas.microsoft.com/office/drawing/2014/main" id="{8D60A84C-2AD1-98BD-CE44-C5A74769A422}"/>
+              </a:ext>
+            </a:extLst>
+          </p:cNvPr>
+          <p:cNvSpPr>
+            <a:spLocks noGrp="1"/>
+          </p:cNvSpPr>
+          <p:nvPr>
+            <p:ph idx="1"/>
+          </p:nvPr>
+        </p:nvSpPr>
+        <p:spPr/>
+        <p:txBody>
+          <a:bodyPr/>
+          <a:lstStyle/>
+          <a:p>
+            <a:endParaRPr lang="en-AU"/>
+          </a:p>
+        </p:txBody>
+      </p:sp>
+    </p:spTree>
+    <p:extLst>
+      <p:ext uri="{BB962C8B-B14F-4D97-AF65-F5344CB8AC3E}">
+        <p14:creationId xmlns:p14="http://schemas.microsoft.com/office/powerpoint/2010/main" val="236815795"/>
       </p:ext>
     </p:extLst>
   </p:cSld>

</xml_diff>

<commit_message>
Altered slides with wording and iphone instead of ipad
</commit_message>
<xml_diff>
--- a/ConstableSoftwarePreso.pptx
+++ b/ConstableSoftwarePreso.pptx
@@ -5,15 +5,17 @@
     <p:sldMasterId id="2147483798" r:id="rId1"/>
   </p:sldMasterIdLst>
   <p:notesMasterIdLst>
-    <p:notesMasterId r:id="rId8"/>
+    <p:notesMasterId r:id="rId10"/>
   </p:notesMasterIdLst>
   <p:sldIdLst>
     <p:sldId id="256" r:id="rId2"/>
-    <p:sldId id="258" r:id="rId3"/>
-    <p:sldId id="257" r:id="rId4"/>
+    <p:sldId id="257" r:id="rId3"/>
+    <p:sldId id="262" r:id="rId4"/>
     <p:sldId id="259" r:id="rId5"/>
-    <p:sldId id="261" r:id="rId6"/>
-    <p:sldId id="260" r:id="rId7"/>
+    <p:sldId id="258" r:id="rId6"/>
+    <p:sldId id="263" r:id="rId7"/>
+    <p:sldId id="261" r:id="rId8"/>
+    <p:sldId id="260" r:id="rId9"/>
   </p:sldIdLst>
   <p:sldSz cx="12192000" cy="6858000"/>
   <p:notesSz cx="6858000" cy="9144000"/>
@@ -123,7 +125,7 @@
 <file path=ppt/revisionInfo.xml><?xml version="1.0" encoding="utf-8"?>
 <p1510:revInfo xmlns:a="http://schemas.openxmlformats.org/drawingml/2006/main" xmlns:r="http://schemas.openxmlformats.org/officeDocument/2006/relationships" xmlns:p1510="http://schemas.microsoft.com/office/powerpoint/2015/10/main">
   <p1510:revLst>
-    <p1510:client id="{6352DDA4-F683-4A38-9A2F-FE729A406D02}" v="530" dt="2024-06-22T03:12:40.226"/>
+    <p1510:client id="{6352DDA4-F683-4A38-9A2F-FE729A406D02}" v="637" dt="2024-06-22T06:25:30.427"/>
   </p1510:revLst>
 </p1510:revInfo>
 </file>
@@ -133,16 +135,24 @@
   <pc:docChgLst>
     <pc:chgData name="Saf Flatters" userId="ea85ab73683665f9" providerId="LiveId" clId="{6352DDA4-F683-4A38-9A2F-FE729A406D02}"/>
     <pc:docChg chg="undo custSel addSld delSld modSld sldOrd">
-      <pc:chgData name="Saf Flatters" userId="ea85ab73683665f9" providerId="LiveId" clId="{6352DDA4-F683-4A38-9A2F-FE729A406D02}" dt="2024-06-22T03:14:02.742" v="2725" actId="1076"/>
+      <pc:chgData name="Saf Flatters" userId="ea85ab73683665f9" providerId="LiveId" clId="{6352DDA4-F683-4A38-9A2F-FE729A406D02}" dt="2024-06-22T06:27:10.155" v="3975" actId="1076"/>
       <pc:docMkLst>
         <pc:docMk/>
       </pc:docMkLst>
-      <pc:sldChg chg="modSp mod">
-        <pc:chgData name="Saf Flatters" userId="ea85ab73683665f9" providerId="LiveId" clId="{6352DDA4-F683-4A38-9A2F-FE729A406D02}" dt="2024-06-21T06:41:35.525" v="934" actId="207"/>
+      <pc:sldChg chg="addSp modSp mod">
+        <pc:chgData name="Saf Flatters" userId="ea85ab73683665f9" providerId="LiveId" clId="{6352DDA4-F683-4A38-9A2F-FE729A406D02}" dt="2024-06-22T05:47:06.700" v="3037" actId="20577"/>
         <pc:sldMkLst>
           <pc:docMk/>
           <pc:sldMk cId="3943192000" sldId="256"/>
         </pc:sldMkLst>
+        <pc:spChg chg="add mod">
+          <ac:chgData name="Saf Flatters" userId="ea85ab73683665f9" providerId="LiveId" clId="{6352DDA4-F683-4A38-9A2F-FE729A406D02}" dt="2024-06-22T05:47:06.700" v="3037" actId="20577"/>
+          <ac:spMkLst>
+            <pc:docMk/>
+            <pc:sldMk cId="3943192000" sldId="256"/>
+            <ac:spMk id="3" creationId="{089EC698-01F8-0A3C-869E-DCD3A08323AC}"/>
+          </ac:spMkLst>
+        </pc:spChg>
         <pc:spChg chg="mod">
           <ac:chgData name="Saf Flatters" userId="ea85ab73683665f9" providerId="LiveId" clId="{6352DDA4-F683-4A38-9A2F-FE729A406D02}" dt="2024-06-21T06:41:35.525" v="934" actId="207"/>
           <ac:spMkLst>
@@ -152,7 +162,7 @@
           </ac:spMkLst>
         </pc:spChg>
         <pc:picChg chg="mod">
-          <ac:chgData name="Saf Flatters" userId="ea85ab73683665f9" providerId="LiveId" clId="{6352DDA4-F683-4A38-9A2F-FE729A406D02}" dt="2024-06-21T04:45:25.195" v="88" actId="1076"/>
+          <ac:chgData name="Saf Flatters" userId="ea85ab73683665f9" providerId="LiveId" clId="{6352DDA4-F683-4A38-9A2F-FE729A406D02}" dt="2024-06-22T05:47:00.451" v="3033" actId="1076"/>
           <ac:picMkLst>
             <pc:docMk/>
             <pc:sldMk cId="3943192000" sldId="256"/>
@@ -161,7 +171,7 @@
         </pc:picChg>
       </pc:sldChg>
       <pc:sldChg chg="addSp delSp modSp mod ord">
-        <pc:chgData name="Saf Flatters" userId="ea85ab73683665f9" providerId="LiveId" clId="{6352DDA4-F683-4A38-9A2F-FE729A406D02}" dt="2024-06-22T03:14:02.742" v="2725" actId="1076"/>
+        <pc:chgData name="Saf Flatters" userId="ea85ab73683665f9" providerId="LiveId" clId="{6352DDA4-F683-4A38-9A2F-FE729A406D02}" dt="2024-06-22T06:26:20.368" v="3971" actId="207"/>
         <pc:sldMkLst>
           <pc:docMk/>
           <pc:sldMk cId="3245596075" sldId="257"/>
@@ -183,7 +193,7 @@
           </ac:spMkLst>
         </pc:spChg>
         <pc:spChg chg="add mod">
-          <ac:chgData name="Saf Flatters" userId="ea85ab73683665f9" providerId="LiveId" clId="{6352DDA4-F683-4A38-9A2F-FE729A406D02}" dt="2024-06-22T03:14:02.742" v="2725" actId="1076"/>
+          <ac:chgData name="Saf Flatters" userId="ea85ab73683665f9" providerId="LiveId" clId="{6352DDA4-F683-4A38-9A2F-FE729A406D02}" dt="2024-06-22T06:26:20.368" v="3971" actId="207"/>
           <ac:spMkLst>
             <pc:docMk/>
             <pc:sldMk cId="3245596075" sldId="257"/>
@@ -215,7 +225,7 @@
           </ac:grpSpMkLst>
         </pc:grpChg>
         <pc:grpChg chg="add mod">
-          <ac:chgData name="Saf Flatters" userId="ea85ab73683665f9" providerId="LiveId" clId="{6352DDA4-F683-4A38-9A2F-FE729A406D02}" dt="2024-06-21T06:55:00" v="1640" actId="164"/>
+          <ac:chgData name="Saf Flatters" userId="ea85ab73683665f9" providerId="LiveId" clId="{6352DDA4-F683-4A38-9A2F-FE729A406D02}" dt="2024-06-22T06:23:54.993" v="3862" actId="1076"/>
           <ac:grpSpMkLst>
             <pc:docMk/>
             <pc:sldMk cId="3245596075" sldId="257"/>
@@ -287,7 +297,7 @@
           </ac:picMkLst>
         </pc:picChg>
         <pc:picChg chg="add mod ord">
-          <ac:chgData name="Saf Flatters" userId="ea85ab73683665f9" providerId="LiveId" clId="{6352DDA4-F683-4A38-9A2F-FE729A406D02}" dt="2024-06-22T03:13:58.486" v="2724" actId="1076"/>
+          <ac:chgData name="Saf Flatters" userId="ea85ab73683665f9" providerId="LiveId" clId="{6352DDA4-F683-4A38-9A2F-FE729A406D02}" dt="2024-06-22T06:25:55.492" v="3969" actId="1076"/>
           <ac:picMkLst>
             <pc:docMk/>
             <pc:sldMk cId="3245596075" sldId="257"/>
@@ -310,8 +320,8 @@
             <ac:picMk id="24" creationId="{2A647EF8-B32B-8E0E-366F-9ADED1F03937}"/>
           </ac:picMkLst>
         </pc:picChg>
-        <pc:picChg chg="add mod modCrop">
-          <ac:chgData name="Saf Flatters" userId="ea85ab73683665f9" providerId="LiveId" clId="{6352DDA4-F683-4A38-9A2F-FE729A406D02}" dt="2024-06-21T07:02:14.503" v="1809" actId="1076"/>
+        <pc:picChg chg="add del mod modCrop">
+          <ac:chgData name="Saf Flatters" userId="ea85ab73683665f9" providerId="LiveId" clId="{6352DDA4-F683-4A38-9A2F-FE729A406D02}" dt="2024-06-22T06:24:02.538" v="3864" actId="478"/>
           <ac:picMkLst>
             <pc:docMk/>
             <pc:sldMk cId="3245596075" sldId="257"/>
@@ -327,7 +337,7 @@
           </ac:picMkLst>
         </pc:picChg>
         <pc:picChg chg="add mod">
-          <ac:chgData name="Saf Flatters" userId="ea85ab73683665f9" providerId="LiveId" clId="{6352DDA4-F683-4A38-9A2F-FE729A406D02}" dt="2024-06-21T05:13:23.154" v="115" actId="1076"/>
+          <ac:chgData name="Saf Flatters" userId="ea85ab73683665f9" providerId="LiveId" clId="{6352DDA4-F683-4A38-9A2F-FE729A406D02}" dt="2024-06-22T06:25:30.427" v="3965" actId="1076"/>
           <ac:picMkLst>
             <pc:docMk/>
             <pc:sldMk cId="3245596075" sldId="257"/>
@@ -350,24 +360,24 @@
             <ac:picMk id="1030" creationId="{AA1D6EFF-87AB-F757-2232-F3311B37A978}"/>
           </ac:picMkLst>
         </pc:picChg>
-        <pc:picChg chg="add mod">
-          <ac:chgData name="Saf Flatters" userId="ea85ab73683665f9" providerId="LiveId" clId="{6352DDA4-F683-4A38-9A2F-FE729A406D02}" dt="2024-06-21T07:02:16.651" v="1810" actId="1076"/>
+        <pc:picChg chg="add del mod">
+          <ac:chgData name="Saf Flatters" userId="ea85ab73683665f9" providerId="LiveId" clId="{6352DDA4-F683-4A38-9A2F-FE729A406D02}" dt="2024-06-22T06:24:03.511" v="3865" actId="478"/>
           <ac:picMkLst>
             <pc:docMk/>
             <pc:sldMk cId="3245596075" sldId="257"/>
             <ac:picMk id="1032" creationId="{84B59277-225B-42C9-8089-B269ED3333B3}"/>
           </ac:picMkLst>
         </pc:picChg>
-        <pc:picChg chg="add mod">
-          <ac:chgData name="Saf Flatters" userId="ea85ab73683665f9" providerId="LiveId" clId="{6352DDA4-F683-4A38-9A2F-FE729A406D02}" dt="2024-06-21T07:03:56.252" v="1822" actId="732"/>
+        <pc:picChg chg="add del mod">
+          <ac:chgData name="Saf Flatters" userId="ea85ab73683665f9" providerId="LiveId" clId="{6352DDA4-F683-4A38-9A2F-FE729A406D02}" dt="2024-06-22T06:24:04.296" v="3866" actId="478"/>
           <ac:picMkLst>
             <pc:docMk/>
             <pc:sldMk cId="3245596075" sldId="257"/>
             <ac:picMk id="1034" creationId="{49A59273-97F6-0054-1489-E61A57599CDE}"/>
           </ac:picMkLst>
         </pc:picChg>
-        <pc:picChg chg="add mod">
-          <ac:chgData name="Saf Flatters" userId="ea85ab73683665f9" providerId="LiveId" clId="{6352DDA4-F683-4A38-9A2F-FE729A406D02}" dt="2024-06-21T07:04:57.272" v="1831" actId="1076"/>
+        <pc:picChg chg="add del mod">
+          <ac:chgData name="Saf Flatters" userId="ea85ab73683665f9" providerId="LiveId" clId="{6352DDA4-F683-4A38-9A2F-FE729A406D02}" dt="2024-06-22T06:24:04.924" v="3867" actId="478"/>
           <ac:picMkLst>
             <pc:docMk/>
             <pc:sldMk cId="3245596075" sldId="257"/>
@@ -376,7 +386,7 @@
         </pc:picChg>
       </pc:sldChg>
       <pc:sldChg chg="addSp delSp modSp add mod setBg">
-        <pc:chgData name="Saf Flatters" userId="ea85ab73683665f9" providerId="LiveId" clId="{6352DDA4-F683-4A38-9A2F-FE729A406D02}" dt="2024-06-22T02:36:47.728" v="2273" actId="114"/>
+        <pc:chgData name="Saf Flatters" userId="ea85ab73683665f9" providerId="LiveId" clId="{6352DDA4-F683-4A38-9A2F-FE729A406D02}" dt="2024-06-22T06:27:10.155" v="3975" actId="1076"/>
         <pc:sldMkLst>
           <pc:docMk/>
           <pc:sldMk cId="468884825" sldId="258"/>
@@ -390,7 +400,7 @@
           </ac:spMkLst>
         </pc:spChg>
         <pc:spChg chg="mod">
-          <ac:chgData name="Saf Flatters" userId="ea85ab73683665f9" providerId="LiveId" clId="{6352DDA4-F683-4A38-9A2F-FE729A406D02}" dt="2024-06-22T02:17:34.295" v="2135" actId="207"/>
+          <ac:chgData name="Saf Flatters" userId="ea85ab73683665f9" providerId="LiveId" clId="{6352DDA4-F683-4A38-9A2F-FE729A406D02}" dt="2024-06-22T06:22:39.645" v="3854" actId="207"/>
           <ac:spMkLst>
             <pc:docMk/>
             <pc:sldMk cId="468884825" sldId="258"/>
@@ -398,7 +408,7 @@
           </ac:spMkLst>
         </pc:spChg>
         <pc:spChg chg="add mod">
-          <ac:chgData name="Saf Flatters" userId="ea85ab73683665f9" providerId="LiveId" clId="{6352DDA4-F683-4A38-9A2F-FE729A406D02}" dt="2024-06-22T02:22:30.510" v="2239" actId="20577"/>
+          <ac:chgData name="Saf Flatters" userId="ea85ab73683665f9" providerId="LiveId" clId="{6352DDA4-F683-4A38-9A2F-FE729A406D02}" dt="2024-06-22T06:20:55.401" v="3829" actId="14100"/>
           <ac:spMkLst>
             <pc:docMk/>
             <pc:sldMk cId="468884825" sldId="258"/>
@@ -406,7 +416,7 @@
           </ac:spMkLst>
         </pc:spChg>
         <pc:spChg chg="add mod">
-          <ac:chgData name="Saf Flatters" userId="ea85ab73683665f9" providerId="LiveId" clId="{6352DDA4-F683-4A38-9A2F-FE729A406D02}" dt="2024-06-22T02:36:47.728" v="2273" actId="114"/>
+          <ac:chgData name="Saf Flatters" userId="ea85ab73683665f9" providerId="LiveId" clId="{6352DDA4-F683-4A38-9A2F-FE729A406D02}" dt="2024-06-22T06:17:40.046" v="3793" actId="1076"/>
           <ac:spMkLst>
             <pc:docMk/>
             <pc:sldMk cId="468884825" sldId="258"/>
@@ -414,11 +424,19 @@
           </ac:spMkLst>
         </pc:spChg>
         <pc:picChg chg="add mod">
-          <ac:chgData name="Saf Flatters" userId="ea85ab73683665f9" providerId="LiveId" clId="{6352DDA4-F683-4A38-9A2F-FE729A406D02}" dt="2024-06-21T05:39:24.510" v="801"/>
+          <ac:chgData name="Saf Flatters" userId="ea85ab73683665f9" providerId="LiveId" clId="{6352DDA4-F683-4A38-9A2F-FE729A406D02}" dt="2024-06-22T06:27:10.155" v="3975" actId="1076"/>
           <ac:picMkLst>
             <pc:docMk/>
             <pc:sldMk cId="468884825" sldId="258"/>
             <ac:picMk id="2" creationId="{D093D009-568A-2661-D3CD-84A32BB75D99}"/>
+          </ac:picMkLst>
+        </pc:picChg>
+        <pc:picChg chg="add mod">
+          <ac:chgData name="Saf Flatters" userId="ea85ab73683665f9" providerId="LiveId" clId="{6352DDA4-F683-4A38-9A2F-FE729A406D02}" dt="2024-06-22T06:23:12.967" v="3859" actId="14861"/>
+          <ac:picMkLst>
+            <pc:docMk/>
+            <pc:sldMk cId="468884825" sldId="258"/>
+            <ac:picMk id="3" creationId="{8617F069-2B35-14C1-BC6F-117D0DED8F24}"/>
           </ac:picMkLst>
         </pc:picChg>
         <pc:picChg chg="del">
@@ -430,22 +448,46 @@
           </ac:picMkLst>
         </pc:picChg>
         <pc:picChg chg="add mod">
-          <ac:chgData name="Saf Flatters" userId="ea85ab73683665f9" providerId="LiveId" clId="{6352DDA4-F683-4A38-9A2F-FE729A406D02}" dt="2024-06-22T02:22:34.793" v="2241" actId="1076"/>
+          <ac:chgData name="Saf Flatters" userId="ea85ab73683665f9" providerId="LiveId" clId="{6352DDA4-F683-4A38-9A2F-FE729A406D02}" dt="2024-06-22T06:17:35.562" v="3792" actId="14100"/>
           <ac:picMkLst>
             <pc:docMk/>
             <pc:sldMk cId="468884825" sldId="258"/>
             <ac:picMk id="7" creationId="{2053E5A1-3D9B-18FE-BF2F-3445A0CA7C2A}"/>
           </ac:picMkLst>
         </pc:picChg>
+        <pc:picChg chg="add del mod">
+          <ac:chgData name="Saf Flatters" userId="ea85ab73683665f9" providerId="LiveId" clId="{6352DDA4-F683-4A38-9A2F-FE729A406D02}" dt="2024-06-22T05:51:17.034" v="3133" actId="478"/>
+          <ac:picMkLst>
+            <pc:docMk/>
+            <pc:sldMk cId="468884825" sldId="258"/>
+            <ac:picMk id="10" creationId="{784446B1-8127-9419-8BFF-F6FA61FEACAD}"/>
+          </ac:picMkLst>
+        </pc:picChg>
+        <pc:picChg chg="add mod">
+          <ac:chgData name="Saf Flatters" userId="ea85ab73683665f9" providerId="LiveId" clId="{6352DDA4-F683-4A38-9A2F-FE729A406D02}" dt="2024-06-22T06:17:35.562" v="3792" actId="14100"/>
+          <ac:picMkLst>
+            <pc:docMk/>
+            <pc:sldMk cId="468884825" sldId="258"/>
+            <ac:picMk id="13" creationId="{0F41B0A1-335B-E5A9-E640-4F0E0CA5E107}"/>
+          </ac:picMkLst>
+        </pc:picChg>
+        <pc:picChg chg="add mod">
+          <ac:chgData name="Saf Flatters" userId="ea85ab73683665f9" providerId="LiveId" clId="{6352DDA4-F683-4A38-9A2F-FE729A406D02}" dt="2024-06-22T06:17:35.562" v="3792" actId="14100"/>
+          <ac:picMkLst>
+            <pc:docMk/>
+            <pc:sldMk cId="468884825" sldId="258"/>
+            <ac:picMk id="15" creationId="{3BE53ADF-D50F-6E13-8474-DAA8B26FD7AF}"/>
+          </ac:picMkLst>
+        </pc:picChg>
       </pc:sldChg>
-      <pc:sldChg chg="delSp modSp add mod">
-        <pc:chgData name="Saf Flatters" userId="ea85ab73683665f9" providerId="LiveId" clId="{6352DDA4-F683-4A38-9A2F-FE729A406D02}" dt="2024-06-22T03:07:47.464" v="2642" actId="20577"/>
+      <pc:sldChg chg="delSp modSp add mod ord">
+        <pc:chgData name="Saf Flatters" userId="ea85ab73683665f9" providerId="LiveId" clId="{6352DDA4-F683-4A38-9A2F-FE729A406D02}" dt="2024-06-22T05:59:27.642" v="3377" actId="20577"/>
         <pc:sldMkLst>
           <pc:docMk/>
           <pc:sldMk cId="1760221263" sldId="259"/>
         </pc:sldMkLst>
         <pc:spChg chg="mod">
-          <ac:chgData name="Saf Flatters" userId="ea85ab73683665f9" providerId="LiveId" clId="{6352DDA4-F683-4A38-9A2F-FE729A406D02}" dt="2024-06-22T03:07:47.464" v="2642" actId="20577"/>
+          <ac:chgData name="Saf Flatters" userId="ea85ab73683665f9" providerId="LiveId" clId="{6352DDA4-F683-4A38-9A2F-FE729A406D02}" dt="2024-06-22T05:59:27.642" v="3377" actId="20577"/>
           <ac:spMkLst>
             <pc:docMk/>
             <pc:sldMk cId="1760221263" sldId="259"/>
@@ -577,6 +619,92 @@
           </ac:spMkLst>
         </pc:spChg>
       </pc:sldChg>
+      <pc:sldChg chg="addSp delSp modSp add mod ord">
+        <pc:chgData name="Saf Flatters" userId="ea85ab73683665f9" providerId="LiveId" clId="{6352DDA4-F683-4A38-9A2F-FE729A406D02}" dt="2024-06-22T06:26:44.978" v="3974" actId="20577"/>
+        <pc:sldMkLst>
+          <pc:docMk/>
+          <pc:sldMk cId="2462211809" sldId="262"/>
+        </pc:sldMkLst>
+        <pc:spChg chg="del mod">
+          <ac:chgData name="Saf Flatters" userId="ea85ab73683665f9" providerId="LiveId" clId="{6352DDA4-F683-4A38-9A2F-FE729A406D02}" dt="2024-06-22T04:12:31.709" v="2730"/>
+          <ac:spMkLst>
+            <pc:docMk/>
+            <pc:sldMk cId="2462211809" sldId="262"/>
+            <ac:spMk id="2" creationId="{55DDFDEC-0443-CFAF-4A71-12BCFFC28514}"/>
+          </ac:spMkLst>
+        </pc:spChg>
+        <pc:spChg chg="add mod">
+          <ac:chgData name="Saf Flatters" userId="ea85ab73683665f9" providerId="LiveId" clId="{6352DDA4-F683-4A38-9A2F-FE729A406D02}" dt="2024-06-22T06:26:44.978" v="3974" actId="20577"/>
+          <ac:spMkLst>
+            <pc:docMk/>
+            <pc:sldMk cId="2462211809" sldId="262"/>
+            <ac:spMk id="3" creationId="{30F437BB-956D-2AF2-A483-F9CADBCBE9D2}"/>
+          </ac:spMkLst>
+        </pc:spChg>
+        <pc:spChg chg="mod">
+          <ac:chgData name="Saf Flatters" userId="ea85ab73683665f9" providerId="LiveId" clId="{6352DDA4-F683-4A38-9A2F-FE729A406D02}" dt="2024-06-22T06:21:52.305" v="3835" actId="207"/>
+          <ac:spMkLst>
+            <pc:docMk/>
+            <pc:sldMk cId="2462211809" sldId="262"/>
+            <ac:spMk id="5" creationId="{1D613CEF-257B-B686-4999-8D4FF50EC036}"/>
+          </ac:spMkLst>
+        </pc:spChg>
+      </pc:sldChg>
+      <pc:sldChg chg="addSp delSp modSp add mod">
+        <pc:chgData name="Saf Flatters" userId="ea85ab73683665f9" providerId="LiveId" clId="{6352DDA4-F683-4A38-9A2F-FE729A406D02}" dt="2024-06-22T05:49:29.989" v="3102" actId="21"/>
+        <pc:sldMkLst>
+          <pc:docMk/>
+          <pc:sldMk cId="3980594163" sldId="263"/>
+        </pc:sldMkLst>
+        <pc:spChg chg="del">
+          <ac:chgData name="Saf Flatters" userId="ea85ab73683665f9" providerId="LiveId" clId="{6352DDA4-F683-4A38-9A2F-FE729A406D02}" dt="2024-06-22T05:41:32.562" v="2997" actId="478"/>
+          <ac:spMkLst>
+            <pc:docMk/>
+            <pc:sldMk cId="3980594163" sldId="263"/>
+            <ac:spMk id="3" creationId="{30F437BB-956D-2AF2-A483-F9CADBCBE9D2}"/>
+          </ac:spMkLst>
+        </pc:spChg>
+        <pc:picChg chg="add del mod modCrop">
+          <ac:chgData name="Saf Flatters" userId="ea85ab73683665f9" providerId="LiveId" clId="{6352DDA4-F683-4A38-9A2F-FE729A406D02}" dt="2024-06-22T05:43:37.139" v="3009" actId="478"/>
+          <ac:picMkLst>
+            <pc:docMk/>
+            <pc:sldMk cId="3980594163" sldId="263"/>
+            <ac:picMk id="6" creationId="{01CFE872-1D14-78C8-8627-9FB9FD4BB833}"/>
+          </ac:picMkLst>
+        </pc:picChg>
+        <pc:picChg chg="add del mod">
+          <ac:chgData name="Saf Flatters" userId="ea85ab73683665f9" providerId="LiveId" clId="{6352DDA4-F683-4A38-9A2F-FE729A406D02}" dt="2024-06-22T05:43:37.691" v="3010" actId="478"/>
+          <ac:picMkLst>
+            <pc:docMk/>
+            <pc:sldMk cId="3980594163" sldId="263"/>
+            <ac:picMk id="8" creationId="{68EF1CBF-CFBB-E848-51EE-C6DBEAFAFF96}"/>
+          </ac:picMkLst>
+        </pc:picChg>
+        <pc:picChg chg="add del mod">
+          <ac:chgData name="Saf Flatters" userId="ea85ab73683665f9" providerId="LiveId" clId="{6352DDA4-F683-4A38-9A2F-FE729A406D02}" dt="2024-06-22T05:49:29.989" v="3102" actId="21"/>
+          <ac:picMkLst>
+            <pc:docMk/>
+            <pc:sldMk cId="3980594163" sldId="263"/>
+            <ac:picMk id="10" creationId="{784446B1-8127-9419-8BFF-F6FA61FEACAD}"/>
+          </ac:picMkLst>
+        </pc:picChg>
+        <pc:picChg chg="add del mod">
+          <ac:chgData name="Saf Flatters" userId="ea85ab73683665f9" providerId="LiveId" clId="{6352DDA4-F683-4A38-9A2F-FE729A406D02}" dt="2024-06-22T05:49:29.989" v="3102" actId="21"/>
+          <ac:picMkLst>
+            <pc:docMk/>
+            <pc:sldMk cId="3980594163" sldId="263"/>
+            <ac:picMk id="13" creationId="{0F41B0A1-335B-E5A9-E640-4F0E0CA5E107}"/>
+          </ac:picMkLst>
+        </pc:picChg>
+        <pc:picChg chg="add del mod">
+          <ac:chgData name="Saf Flatters" userId="ea85ab73683665f9" providerId="LiveId" clId="{6352DDA4-F683-4A38-9A2F-FE729A406D02}" dt="2024-06-22T05:49:29.989" v="3102" actId="21"/>
+          <ac:picMkLst>
+            <pc:docMk/>
+            <pc:sldMk cId="3980594163" sldId="263"/>
+            <ac:picMk id="15" creationId="{3BE53ADF-D50F-6E13-8474-DAA8B26FD7AF}"/>
+          </ac:picMkLst>
+        </pc:picChg>
+      </pc:sldChg>
     </pc:docChg>
   </pc:docChgLst>
 </pc:chgInfo>
@@ -664,7 +792,7 @@
           <a:p>
             <a:fld id="{C6E7CAE0-C41B-46FB-82E9-16938B38FC31}" type="datetimeFigureOut">
               <a:rPr lang="en-AU" smtClean="0"/>
-              <a:t>21/06/2024</a:t>
+              <a:t>22/06/2024</a:t>
             </a:fld>
             <a:endParaRPr lang="en-AU"/>
           </a:p>
@@ -997,7 +1125,7 @@
           <a:p>
             <a:fld id="{40410EAA-151D-407D-8FFE-35A692A9E3B4}" type="slidenum">
               <a:rPr lang="en-AU" smtClean="0"/>
-              <a:t>3</a:t>
+              <a:t>2</a:t>
             </a:fld>
             <a:endParaRPr lang="en-AU"/>
           </a:p>
@@ -1081,7 +1209,7 @@
           <a:p>
             <a:fld id="{40410EAA-151D-407D-8FFE-35A692A9E3B4}" type="slidenum">
               <a:rPr lang="en-AU" smtClean="0"/>
-              <a:t>4</a:t>
+              <a:t>3</a:t>
             </a:fld>
             <a:endParaRPr lang="en-AU"/>
           </a:p>
@@ -1090,7 +1218,7 @@
     </p:spTree>
     <p:extLst>
       <p:ext uri="{BB962C8B-B14F-4D97-AF65-F5344CB8AC3E}">
-        <p14:creationId xmlns:p14="http://schemas.microsoft.com/office/powerpoint/2010/main" val="1553410444"/>
+        <p14:creationId xmlns:p14="http://schemas.microsoft.com/office/powerpoint/2010/main" val="1646468701"/>
       </p:ext>
     </p:extLst>
   </p:cSld>
@@ -1165,7 +1293,259 @@
           <a:p>
             <a:fld id="{40410EAA-151D-407D-8FFE-35A692A9E3B4}" type="slidenum">
               <a:rPr lang="en-AU" smtClean="0"/>
+              <a:t>4</a:t>
+            </a:fld>
+            <a:endParaRPr lang="en-AU"/>
+          </a:p>
+        </p:txBody>
+      </p:sp>
+    </p:spTree>
+    <p:extLst>
+      <p:ext uri="{BB962C8B-B14F-4D97-AF65-F5344CB8AC3E}">
+        <p14:creationId xmlns:p14="http://schemas.microsoft.com/office/powerpoint/2010/main" val="1553410444"/>
+      </p:ext>
+    </p:extLst>
+  </p:cSld>
+  <p:clrMapOvr>
+    <a:masterClrMapping/>
+  </p:clrMapOvr>
+</p:notes>
+</file>
+
+<file path=ppt/notesSlides/notesSlide4.xml><?xml version="1.0" encoding="utf-8"?>
+<p:notes xmlns:a="http://schemas.openxmlformats.org/drawingml/2006/main" xmlns:r="http://schemas.openxmlformats.org/officeDocument/2006/relationships" xmlns:p="http://schemas.openxmlformats.org/presentationml/2006/main">
+  <p:cSld>
+    <p:spTree>
+      <p:nvGrpSpPr>
+        <p:cNvPr id="1" name=""/>
+        <p:cNvGrpSpPr/>
+        <p:nvPr/>
+      </p:nvGrpSpPr>
+      <p:grpSpPr>
+        <a:xfrm>
+          <a:off x="0" y="0"/>
+          <a:ext cx="0" cy="0"/>
+          <a:chOff x="0" y="0"/>
+          <a:chExt cx="0" cy="0"/>
+        </a:xfrm>
+      </p:grpSpPr>
+      <p:sp>
+        <p:nvSpPr>
+          <p:cNvPr id="2" name="Slide Image Placeholder 1"/>
+          <p:cNvSpPr>
+            <a:spLocks noGrp="1" noRot="1" noChangeAspect="1"/>
+          </p:cNvSpPr>
+          <p:nvPr>
+            <p:ph type="sldImg"/>
+          </p:nvPr>
+        </p:nvSpPr>
+        <p:spPr/>
+      </p:sp>
+      <p:sp>
+        <p:nvSpPr>
+          <p:cNvPr id="3" name="Notes Placeholder 2"/>
+          <p:cNvSpPr>
+            <a:spLocks noGrp="1"/>
+          </p:cNvSpPr>
+          <p:nvPr>
+            <p:ph type="body" idx="1"/>
+          </p:nvPr>
+        </p:nvSpPr>
+        <p:spPr/>
+        <p:txBody>
+          <a:bodyPr/>
+          <a:lstStyle/>
+          <a:p>
+            <a:endParaRPr lang="en-AU" dirty="0"/>
+          </a:p>
+        </p:txBody>
+      </p:sp>
+      <p:sp>
+        <p:nvSpPr>
+          <p:cNvPr id="4" name="Slide Number Placeholder 3"/>
+          <p:cNvSpPr>
+            <a:spLocks noGrp="1"/>
+          </p:cNvSpPr>
+          <p:nvPr>
+            <p:ph type="sldNum" sz="quarter" idx="5"/>
+          </p:nvPr>
+        </p:nvSpPr>
+        <p:spPr/>
+        <p:txBody>
+          <a:bodyPr/>
+          <a:lstStyle/>
+          <a:p>
+            <a:fld id="{40410EAA-151D-407D-8FFE-35A692A9E3B4}" type="slidenum">
+              <a:rPr lang="en-AU" smtClean="0"/>
               <a:t>5</a:t>
+            </a:fld>
+            <a:endParaRPr lang="en-AU"/>
+          </a:p>
+        </p:txBody>
+      </p:sp>
+    </p:spTree>
+    <p:extLst>
+      <p:ext uri="{BB962C8B-B14F-4D97-AF65-F5344CB8AC3E}">
+        <p14:creationId xmlns:p14="http://schemas.microsoft.com/office/powerpoint/2010/main" val="896258425"/>
+      </p:ext>
+    </p:extLst>
+  </p:cSld>
+  <p:clrMapOvr>
+    <a:masterClrMapping/>
+  </p:clrMapOvr>
+</p:notes>
+</file>
+
+<file path=ppt/notesSlides/notesSlide5.xml><?xml version="1.0" encoding="utf-8"?>
+<p:notes xmlns:a="http://schemas.openxmlformats.org/drawingml/2006/main" xmlns:r="http://schemas.openxmlformats.org/officeDocument/2006/relationships" xmlns:p="http://schemas.openxmlformats.org/presentationml/2006/main">
+  <p:cSld>
+    <p:spTree>
+      <p:nvGrpSpPr>
+        <p:cNvPr id="1" name=""/>
+        <p:cNvGrpSpPr/>
+        <p:nvPr/>
+      </p:nvGrpSpPr>
+      <p:grpSpPr>
+        <a:xfrm>
+          <a:off x="0" y="0"/>
+          <a:ext cx="0" cy="0"/>
+          <a:chOff x="0" y="0"/>
+          <a:chExt cx="0" cy="0"/>
+        </a:xfrm>
+      </p:grpSpPr>
+      <p:sp>
+        <p:nvSpPr>
+          <p:cNvPr id="2" name="Slide Image Placeholder 1"/>
+          <p:cNvSpPr>
+            <a:spLocks noGrp="1" noRot="1" noChangeAspect="1"/>
+          </p:cNvSpPr>
+          <p:nvPr>
+            <p:ph type="sldImg"/>
+          </p:nvPr>
+        </p:nvSpPr>
+        <p:spPr/>
+      </p:sp>
+      <p:sp>
+        <p:nvSpPr>
+          <p:cNvPr id="3" name="Notes Placeholder 2"/>
+          <p:cNvSpPr>
+            <a:spLocks noGrp="1"/>
+          </p:cNvSpPr>
+          <p:nvPr>
+            <p:ph type="body" idx="1"/>
+          </p:nvPr>
+        </p:nvSpPr>
+        <p:spPr/>
+        <p:txBody>
+          <a:bodyPr/>
+          <a:lstStyle/>
+          <a:p>
+            <a:endParaRPr lang="en-AU" dirty="0"/>
+          </a:p>
+        </p:txBody>
+      </p:sp>
+      <p:sp>
+        <p:nvSpPr>
+          <p:cNvPr id="4" name="Slide Number Placeholder 3"/>
+          <p:cNvSpPr>
+            <a:spLocks noGrp="1"/>
+          </p:cNvSpPr>
+          <p:nvPr>
+            <p:ph type="sldNum" sz="quarter" idx="5"/>
+          </p:nvPr>
+        </p:nvSpPr>
+        <p:spPr/>
+        <p:txBody>
+          <a:bodyPr/>
+          <a:lstStyle/>
+          <a:p>
+            <a:fld id="{40410EAA-151D-407D-8FFE-35A692A9E3B4}" type="slidenum">
+              <a:rPr lang="en-AU" smtClean="0"/>
+              <a:t>6</a:t>
+            </a:fld>
+            <a:endParaRPr lang="en-AU"/>
+          </a:p>
+        </p:txBody>
+      </p:sp>
+    </p:spTree>
+    <p:extLst>
+      <p:ext uri="{BB962C8B-B14F-4D97-AF65-F5344CB8AC3E}">
+        <p14:creationId xmlns:p14="http://schemas.microsoft.com/office/powerpoint/2010/main" val="2730497622"/>
+      </p:ext>
+    </p:extLst>
+  </p:cSld>
+  <p:clrMapOvr>
+    <a:masterClrMapping/>
+  </p:clrMapOvr>
+</p:notes>
+</file>
+
+<file path=ppt/notesSlides/notesSlide6.xml><?xml version="1.0" encoding="utf-8"?>
+<p:notes xmlns:a="http://schemas.openxmlformats.org/drawingml/2006/main" xmlns:r="http://schemas.openxmlformats.org/officeDocument/2006/relationships" xmlns:p="http://schemas.openxmlformats.org/presentationml/2006/main">
+  <p:cSld>
+    <p:spTree>
+      <p:nvGrpSpPr>
+        <p:cNvPr id="1" name=""/>
+        <p:cNvGrpSpPr/>
+        <p:nvPr/>
+      </p:nvGrpSpPr>
+      <p:grpSpPr>
+        <a:xfrm>
+          <a:off x="0" y="0"/>
+          <a:ext cx="0" cy="0"/>
+          <a:chOff x="0" y="0"/>
+          <a:chExt cx="0" cy="0"/>
+        </a:xfrm>
+      </p:grpSpPr>
+      <p:sp>
+        <p:nvSpPr>
+          <p:cNvPr id="2" name="Slide Image Placeholder 1"/>
+          <p:cNvSpPr>
+            <a:spLocks noGrp="1" noRot="1" noChangeAspect="1"/>
+          </p:cNvSpPr>
+          <p:nvPr>
+            <p:ph type="sldImg"/>
+          </p:nvPr>
+        </p:nvSpPr>
+        <p:spPr/>
+      </p:sp>
+      <p:sp>
+        <p:nvSpPr>
+          <p:cNvPr id="3" name="Notes Placeholder 2"/>
+          <p:cNvSpPr>
+            <a:spLocks noGrp="1"/>
+          </p:cNvSpPr>
+          <p:nvPr>
+            <p:ph type="body" idx="1"/>
+          </p:nvPr>
+        </p:nvSpPr>
+        <p:spPr/>
+        <p:txBody>
+          <a:bodyPr/>
+          <a:lstStyle/>
+          <a:p>
+            <a:endParaRPr lang="en-AU" dirty="0"/>
+          </a:p>
+        </p:txBody>
+      </p:sp>
+      <p:sp>
+        <p:nvSpPr>
+          <p:cNvPr id="4" name="Slide Number Placeholder 3"/>
+          <p:cNvSpPr>
+            <a:spLocks noGrp="1"/>
+          </p:cNvSpPr>
+          <p:nvPr>
+            <p:ph type="sldNum" sz="quarter" idx="5"/>
+          </p:nvPr>
+        </p:nvSpPr>
+        <p:spPr/>
+        <p:txBody>
+          <a:bodyPr/>
+          <a:lstStyle/>
+          <a:p>
+            <a:fld id="{40410EAA-151D-407D-8FFE-35A692A9E3B4}" type="slidenum">
+              <a:rPr lang="en-AU" smtClean="0"/>
+              <a:t>7</a:t>
             </a:fld>
             <a:endParaRPr lang="en-AU"/>
           </a:p>
@@ -1315,7 +1695,7 @@
           <a:p>
             <a:fld id="{B186AA7B-B86A-4BB4-AD78-26B66DBC9543}" type="datetimeFigureOut">
               <a:rPr lang="en-AU" smtClean="0"/>
-              <a:t>21/06/2024</a:t>
+              <a:t>22/06/2024</a:t>
             </a:fld>
             <a:endParaRPr lang="en-AU"/>
           </a:p>
@@ -1485,7 +1865,7 @@
           <a:p>
             <a:fld id="{B186AA7B-B86A-4BB4-AD78-26B66DBC9543}" type="datetimeFigureOut">
               <a:rPr lang="en-AU" smtClean="0"/>
-              <a:t>21/06/2024</a:t>
+              <a:t>22/06/2024</a:t>
             </a:fld>
             <a:endParaRPr lang="en-AU"/>
           </a:p>
@@ -1665,7 +2045,7 @@
           <a:p>
             <a:fld id="{B186AA7B-B86A-4BB4-AD78-26B66DBC9543}" type="datetimeFigureOut">
               <a:rPr lang="en-AU" smtClean="0"/>
-              <a:t>21/06/2024</a:t>
+              <a:t>22/06/2024</a:t>
             </a:fld>
             <a:endParaRPr lang="en-AU"/>
           </a:p>
@@ -1835,7 +2215,7 @@
           <a:p>
             <a:fld id="{B186AA7B-B86A-4BB4-AD78-26B66DBC9543}" type="datetimeFigureOut">
               <a:rPr lang="en-AU" smtClean="0"/>
-              <a:t>21/06/2024</a:t>
+              <a:t>22/06/2024</a:t>
             </a:fld>
             <a:endParaRPr lang="en-AU"/>
           </a:p>
@@ -2081,7 +2461,7 @@
           <a:p>
             <a:fld id="{B186AA7B-B86A-4BB4-AD78-26B66DBC9543}" type="datetimeFigureOut">
               <a:rPr lang="en-AU" smtClean="0"/>
-              <a:t>21/06/2024</a:t>
+              <a:t>22/06/2024</a:t>
             </a:fld>
             <a:endParaRPr lang="en-AU"/>
           </a:p>
@@ -2313,7 +2693,7 @@
           <a:p>
             <a:fld id="{B186AA7B-B86A-4BB4-AD78-26B66DBC9543}" type="datetimeFigureOut">
               <a:rPr lang="en-AU" smtClean="0"/>
-              <a:t>21/06/2024</a:t>
+              <a:t>22/06/2024</a:t>
             </a:fld>
             <a:endParaRPr lang="en-AU"/>
           </a:p>
@@ -2680,7 +3060,7 @@
           <a:p>
             <a:fld id="{B186AA7B-B86A-4BB4-AD78-26B66DBC9543}" type="datetimeFigureOut">
               <a:rPr lang="en-AU" smtClean="0"/>
-              <a:t>21/06/2024</a:t>
+              <a:t>22/06/2024</a:t>
             </a:fld>
             <a:endParaRPr lang="en-AU"/>
           </a:p>
@@ -2798,7 +3178,7 @@
           <a:p>
             <a:fld id="{B186AA7B-B86A-4BB4-AD78-26B66DBC9543}" type="datetimeFigureOut">
               <a:rPr lang="en-AU" smtClean="0"/>
-              <a:t>21/06/2024</a:t>
+              <a:t>22/06/2024</a:t>
             </a:fld>
             <a:endParaRPr lang="en-AU"/>
           </a:p>
@@ -2893,7 +3273,7 @@
           <a:p>
             <a:fld id="{B186AA7B-B86A-4BB4-AD78-26B66DBC9543}" type="datetimeFigureOut">
               <a:rPr lang="en-AU" smtClean="0"/>
-              <a:t>21/06/2024</a:t>
+              <a:t>22/06/2024</a:t>
             </a:fld>
             <a:endParaRPr lang="en-AU"/>
           </a:p>
@@ -3170,7 +3550,7 @@
           <a:p>
             <a:fld id="{B186AA7B-B86A-4BB4-AD78-26B66DBC9543}" type="datetimeFigureOut">
               <a:rPr lang="en-AU" smtClean="0"/>
-              <a:t>21/06/2024</a:t>
+              <a:t>22/06/2024</a:t>
             </a:fld>
             <a:endParaRPr lang="en-AU"/>
           </a:p>
@@ -3427,7 +3807,7 @@
           <a:p>
             <a:fld id="{B186AA7B-B86A-4BB4-AD78-26B66DBC9543}" type="datetimeFigureOut">
               <a:rPr lang="en-AU" smtClean="0"/>
-              <a:t>21/06/2024</a:t>
+              <a:t>22/06/2024</a:t>
             </a:fld>
             <a:endParaRPr lang="en-AU"/>
           </a:p>
@@ -3640,7 +4020,7 @@
           <a:p>
             <a:fld id="{B186AA7B-B86A-4BB4-AD78-26B66DBC9543}" type="datetimeFigureOut">
               <a:rPr lang="en-AU" smtClean="0"/>
-              <a:t>21/06/2024</a:t>
+              <a:t>22/06/2024</a:t>
             </a:fld>
             <a:endParaRPr lang="en-AU"/>
           </a:p>
@@ -4126,7 +4506,7 @@
         </p:blipFill>
         <p:spPr>
           <a:xfrm>
-            <a:off x="3283527" y="516082"/>
+            <a:off x="3128707" y="133872"/>
             <a:ext cx="5624946" cy="5825836"/>
           </a:xfrm>
           <a:prstGeom prst="rect">
@@ -4137,6 +4517,49 @@
           </a:effectLst>
         </p:spPr>
       </p:pic>
+      <p:sp>
+        <p:nvSpPr>
+          <p:cNvPr id="3" name="TextBox 2">
+            <a:extLst>
+              <a:ext uri="{FF2B5EF4-FFF2-40B4-BE49-F238E27FC236}">
+                <a16:creationId xmlns:a16="http://schemas.microsoft.com/office/drawing/2014/main" id="{089EC698-01F8-0A3C-869E-DCD3A08323AC}"/>
+              </a:ext>
+            </a:extLst>
+          </p:cNvPr>
+          <p:cNvSpPr txBox="1"/>
+          <p:nvPr/>
+        </p:nvSpPr>
+        <p:spPr>
+          <a:xfrm>
+            <a:off x="2893180" y="5959708"/>
+            <a:ext cx="6096000" cy="646331"/>
+          </a:xfrm>
+          <a:prstGeom prst="rect">
+            <a:avLst/>
+          </a:prstGeom>
+          <a:noFill/>
+        </p:spPr>
+        <p:txBody>
+          <a:bodyPr wrap="square">
+            <a:spAutoFit/>
+          </a:bodyPr>
+          <a:lstStyle/>
+          <a:p>
+            <a:pPr algn="ctr"/>
+            <a:r>
+              <a:rPr lang="en-AU" sz="1800" b="1" dirty="0"/>
+              <a:t>Challenge 1: </a:t>
+            </a:r>
+          </a:p>
+          <a:p>
+            <a:pPr algn="ctr"/>
+            <a:r>
+              <a:rPr lang="en-AU" sz="1800" b="1" dirty="0"/>
+              <a:t>Optimising Emergency Response</a:t>
+            </a:r>
+          </a:p>
+        </p:txBody>
+      </p:sp>
     </p:spTree>
     <p:extLst>
       <p:ext uri="{BB962C8B-B14F-4D97-AF65-F5344CB8AC3E}">
@@ -4169,265 +4592,6 @@
       </p:grpSpPr>
       <p:sp>
         <p:nvSpPr>
-          <p:cNvPr id="4" name="TextBox 3">
-            <a:extLst>
-              <a:ext uri="{FF2B5EF4-FFF2-40B4-BE49-F238E27FC236}">
-                <a16:creationId xmlns:a16="http://schemas.microsoft.com/office/drawing/2014/main" id="{6E2A7F2C-1078-6D76-16B9-A4CFBE9E18A6}"/>
-              </a:ext>
-            </a:extLst>
-          </p:cNvPr>
-          <p:cNvSpPr txBox="1"/>
-          <p:nvPr/>
-        </p:nvSpPr>
-        <p:spPr>
-          <a:xfrm>
-            <a:off x="0" y="0"/>
-            <a:ext cx="12192000" cy="5464234"/>
-          </a:xfrm>
-          <a:prstGeom prst="rect">
-            <a:avLst/>
-          </a:prstGeom>
-          <a:noFill/>
-        </p:spPr>
-        <p:txBody>
-          <a:bodyPr wrap="square" rtlCol="0">
-            <a:prstTxWarp prst="textInflateBottom">
-              <a:avLst/>
-            </a:prstTxWarp>
-            <a:spAutoFit/>
-          </a:bodyPr>
-          <a:lstStyle/>
-          <a:p>
-            <a:r>
-              <a:rPr lang="en-AU" dirty="0">
-                <a:blipFill dpi="0" rotWithShape="1">
-                  <a:blip r:embed="rId2">
-                    <a:alphaModFix amt="20000"/>
-                  </a:blip>
-                  <a:srcRect/>
-                  <a:stretch>
-                    <a:fillRect/>
-                  </a:stretch>
-                </a:blipFill>
-              </a:rPr>
-              <a:t>---------------</a:t>
-            </a:r>
-          </a:p>
-        </p:txBody>
-      </p:sp>
-      <p:pic>
-        <p:nvPicPr>
-          <p:cNvPr id="2" name="Content Placeholder 3" descr="A person wearing sunglasses and a hat&#10;&#10;Description automatically generated">
-            <a:extLst>
-              <a:ext uri="{FF2B5EF4-FFF2-40B4-BE49-F238E27FC236}">
-                <a16:creationId xmlns:a16="http://schemas.microsoft.com/office/drawing/2014/main" id="{D093D009-568A-2661-D3CD-84A32BB75D99}"/>
-              </a:ext>
-            </a:extLst>
-          </p:cNvPr>
-          <p:cNvPicPr>
-            <a:picLocks noChangeAspect="1"/>
-          </p:cNvPicPr>
-          <p:nvPr/>
-        </p:nvPicPr>
-        <p:blipFill>
-          <a:blip r:embed="rId3"/>
-          <a:stretch>
-            <a:fillRect/>
-          </a:stretch>
-        </p:blipFill>
-        <p:spPr>
-          <a:xfrm>
-            <a:off x="302722" y="5719227"/>
-            <a:ext cx="963262" cy="997665"/>
-          </a:xfrm>
-          <a:prstGeom prst="rect">
-            <a:avLst/>
-          </a:prstGeom>
-          <a:effectLst>
-            <a:softEdge rad="50800"/>
-          </a:effectLst>
-        </p:spPr>
-      </p:pic>
-      <p:sp>
-        <p:nvSpPr>
-          <p:cNvPr id="5" name="TextBox 4">
-            <a:extLst>
-              <a:ext uri="{FF2B5EF4-FFF2-40B4-BE49-F238E27FC236}">
-                <a16:creationId xmlns:a16="http://schemas.microsoft.com/office/drawing/2014/main" id="{A7159774-B73E-3B53-5B9B-CA8E635AECF0}"/>
-              </a:ext>
-            </a:extLst>
-          </p:cNvPr>
-          <p:cNvSpPr txBox="1"/>
-          <p:nvPr/>
-        </p:nvSpPr>
-        <p:spPr>
-          <a:xfrm>
-            <a:off x="241905" y="464458"/>
-            <a:ext cx="10609943" cy="3108543"/>
-          </a:xfrm>
-          <a:prstGeom prst="rect">
-            <a:avLst/>
-          </a:prstGeom>
-          <a:noFill/>
-        </p:spPr>
-        <p:txBody>
-          <a:bodyPr wrap="square" rtlCol="0">
-            <a:spAutoFit/>
-          </a:bodyPr>
-          <a:lstStyle/>
-          <a:p>
-            <a:pPr algn="ctr"/>
-            <a:r>
-              <a:rPr lang="en-AU" sz="4400" b="1" dirty="0"/>
-              <a:t>Challenge: </a:t>
-            </a:r>
-          </a:p>
-          <a:p>
-            <a:pPr algn="ctr"/>
-            <a:r>
-              <a:rPr lang="en-AU" sz="4400" b="1" dirty="0"/>
-              <a:t>Optimising Emergency Response</a:t>
-            </a:r>
-          </a:p>
-          <a:p>
-            <a:endParaRPr lang="en-AU" dirty="0"/>
-          </a:p>
-          <a:p>
-            <a:endParaRPr lang="en-AU" dirty="0"/>
-          </a:p>
-          <a:p>
-            <a:r>
-              <a:rPr lang="en-AU" b="1" dirty="0"/>
-              <a:t>Our system improves </a:t>
-            </a:r>
-            <a:r>
-              <a:rPr lang="en-AU" b="1" dirty="0">
-                <a:solidFill>
-                  <a:srgbClr val="FFFF00"/>
-                </a:solidFill>
-              </a:rPr>
-              <a:t>WAPOL Response time</a:t>
-            </a:r>
-            <a:r>
-              <a:rPr lang="en-AU" b="1" dirty="0"/>
-              <a:t>:</a:t>
-            </a:r>
-          </a:p>
-          <a:p>
-            <a:endParaRPr lang="en-AU" b="1" dirty="0"/>
-          </a:p>
-          <a:p>
-            <a:r>
-              <a:rPr lang="en-AU" b="1" dirty="0"/>
-              <a:t>Achieve 12min Attendance KPI for Priority 1 &amp; 2 incidents</a:t>
-            </a:r>
-          </a:p>
-          <a:p>
-            <a:r>
-              <a:rPr lang="en-AU" b="1" dirty="0"/>
-              <a:t>Achieve Community expectation</a:t>
-            </a:r>
-          </a:p>
-        </p:txBody>
-      </p:sp>
-      <p:pic>
-        <p:nvPicPr>
-          <p:cNvPr id="7" name="Picture 6">
-            <a:extLst>
-              <a:ext uri="{FF2B5EF4-FFF2-40B4-BE49-F238E27FC236}">
-                <a16:creationId xmlns:a16="http://schemas.microsoft.com/office/drawing/2014/main" id="{2053E5A1-3D9B-18FE-BF2F-3445A0CA7C2A}"/>
-              </a:ext>
-            </a:extLst>
-          </p:cNvPr>
-          <p:cNvPicPr>
-            <a:picLocks noChangeAspect="1"/>
-          </p:cNvPicPr>
-          <p:nvPr/>
-        </p:nvPicPr>
-        <p:blipFill>
-          <a:blip r:embed="rId4"/>
-          <a:stretch>
-            <a:fillRect/>
-          </a:stretch>
-        </p:blipFill>
-        <p:spPr>
-          <a:xfrm>
-            <a:off x="6473614" y="2518251"/>
-            <a:ext cx="5132849" cy="3683044"/>
-          </a:xfrm>
-          <a:prstGeom prst="rect">
-            <a:avLst/>
-          </a:prstGeom>
-        </p:spPr>
-      </p:pic>
-      <p:sp>
-        <p:nvSpPr>
-          <p:cNvPr id="8" name="TextBox 7">
-            <a:extLst>
-              <a:ext uri="{FF2B5EF4-FFF2-40B4-BE49-F238E27FC236}">
-                <a16:creationId xmlns:a16="http://schemas.microsoft.com/office/drawing/2014/main" id="{45FEFE0A-BB4F-C972-4BD6-0962B40B10B1}"/>
-              </a:ext>
-            </a:extLst>
-          </p:cNvPr>
-          <p:cNvSpPr txBox="1"/>
-          <p:nvPr/>
-        </p:nvSpPr>
-        <p:spPr>
-          <a:xfrm>
-            <a:off x="5885411" y="6225184"/>
-            <a:ext cx="6777643" cy="369332"/>
-          </a:xfrm>
-          <a:prstGeom prst="rect">
-            <a:avLst/>
-          </a:prstGeom>
-          <a:noFill/>
-        </p:spPr>
-        <p:txBody>
-          <a:bodyPr wrap="square" rtlCol="0">
-            <a:spAutoFit/>
-          </a:bodyPr>
-          <a:lstStyle/>
-          <a:p>
-            <a:r>
-              <a:rPr lang="en-US" i="1" dirty="0"/>
-              <a:t>WESTERN AUSTRALIA POLICE FORCE ANNUAL REPORT 2023</a:t>
-            </a:r>
-            <a:endParaRPr lang="en-AU" i="1" dirty="0"/>
-          </a:p>
-        </p:txBody>
-      </p:sp>
-    </p:spTree>
-    <p:extLst>
-      <p:ext uri="{BB962C8B-B14F-4D97-AF65-F5344CB8AC3E}">
-        <p14:creationId xmlns:p14="http://schemas.microsoft.com/office/powerpoint/2010/main" val="468884825"/>
-      </p:ext>
-    </p:extLst>
-  </p:cSld>
-  <p:clrMapOvr>
-    <a:masterClrMapping/>
-  </p:clrMapOvr>
-</p:sld>
-</file>
-
-<file path=ppt/slides/slide3.xml><?xml version="1.0" encoding="utf-8"?>
-<p:sld xmlns:a="http://schemas.openxmlformats.org/drawingml/2006/main" xmlns:r="http://schemas.openxmlformats.org/officeDocument/2006/relationships" xmlns:p="http://schemas.openxmlformats.org/presentationml/2006/main">
-  <p:cSld>
-    <p:spTree>
-      <p:nvGrpSpPr>
-        <p:cNvPr id="1" name=""/>
-        <p:cNvGrpSpPr/>
-        <p:nvPr/>
-      </p:nvGrpSpPr>
-      <p:grpSpPr>
-        <a:xfrm>
-          <a:off x="0" y="0"/>
-          <a:ext cx="0" cy="0"/>
-          <a:chOff x="0" y="0"/>
-          <a:chExt cx="0" cy="0"/>
-        </a:xfrm>
-      </p:grpSpPr>
-      <p:sp>
-        <p:nvSpPr>
           <p:cNvPr id="5" name="TextBox 4">
             <a:extLst>
               <a:ext uri="{FF2B5EF4-FFF2-40B4-BE49-F238E27FC236}">
@@ -4501,13 +4665,16 @@
         </p:blipFill>
         <p:spPr bwMode="auto">
           <a:xfrm>
-            <a:off x="-3462157" y="337871"/>
+            <a:off x="3496947" y="176677"/>
             <a:ext cx="3032676" cy="6182258"/>
           </a:xfrm>
           <a:prstGeom prst="rect">
             <a:avLst/>
           </a:prstGeom>
           <a:noFill/>
+          <a:effectLst>
+            <a:reflection stA="72000" endPos="8000" dist="50800" dir="5400000" sy="-100000" algn="bl" rotWithShape="0"/>
+          </a:effectLst>
           <a:extLst>
             <a:ext uri="{909E8E84-426E-40DD-AFC4-6F175D3DCCD1}">
               <a14:hiddenFill xmlns:a14="http://schemas.microsoft.com/office/drawing/2010/main">
@@ -4621,8 +4788,8 @@
         </p:blipFill>
         <p:spPr>
           <a:xfrm>
-            <a:off x="7358824" y="2542706"/>
-            <a:ext cx="4889647" cy="1652247"/>
+            <a:off x="6466591" y="2329113"/>
+            <a:ext cx="5602275" cy="1893049"/>
           </a:xfrm>
           <a:prstGeom prst="rect">
             <a:avLst/>
@@ -4655,7 +4822,7 @@
         </p:nvGrpSpPr>
         <p:grpSpPr>
           <a:xfrm>
-            <a:off x="134112" y="946929"/>
+            <a:off x="-7699039" y="531293"/>
             <a:ext cx="7427831" cy="4873300"/>
             <a:chOff x="134112" y="946929"/>
             <a:chExt cx="7427831" cy="4873300"/>
@@ -4934,176 +5101,6 @@
           </a:prstGeom>
         </p:spPr>
       </p:pic>
-      <p:pic>
-        <p:nvPicPr>
-          <p:cNvPr id="27" name="Picture 26" descr="A traffic jam on the road&#10;&#10;Description automatically generated">
-            <a:extLst>
-              <a:ext uri="{FF2B5EF4-FFF2-40B4-BE49-F238E27FC236}">
-                <a16:creationId xmlns:a16="http://schemas.microsoft.com/office/drawing/2014/main" id="{597529BA-E9A6-C88C-257A-C4FF4DB1C0C5}"/>
-              </a:ext>
-            </a:extLst>
-          </p:cNvPr>
-          <p:cNvPicPr>
-            <a:picLocks noChangeAspect="1"/>
-          </p:cNvPicPr>
-          <p:nvPr/>
-        </p:nvPicPr>
-        <p:blipFill rotWithShape="1">
-          <a:blip r:embed="rId13">
-            <a:extLst>
-              <a:ext uri="{28A0092B-C50C-407E-A947-70E740481C1C}">
-                <a14:useLocalDpi xmlns:a14="http://schemas.microsoft.com/office/drawing/2010/main" val="0"/>
-              </a:ext>
-            </a:extLst>
-          </a:blip>
-          <a:srcRect l="64717" t="36845" r="640" b="-483"/>
-          <a:stretch/>
-        </p:blipFill>
-        <p:spPr>
-          <a:xfrm>
-            <a:off x="763062" y="2860019"/>
-            <a:ext cx="1315017" cy="1290366"/>
-          </a:xfrm>
-          <a:prstGeom prst="rect">
-            <a:avLst/>
-          </a:prstGeom>
-        </p:spPr>
-      </p:pic>
-      <p:pic>
-        <p:nvPicPr>
-          <p:cNvPr id="1032" name="Picture 8" descr="Western australia number plate hi-res stock photography and images - Alamy">
-            <a:extLst>
-              <a:ext uri="{FF2B5EF4-FFF2-40B4-BE49-F238E27FC236}">
-                <a16:creationId xmlns:a16="http://schemas.microsoft.com/office/drawing/2014/main" id="{84B59277-225B-42C9-8089-B269ED3333B3}"/>
-              </a:ext>
-            </a:extLst>
-          </p:cNvPr>
-          <p:cNvPicPr>
-            <a:picLocks noChangeAspect="1" noChangeArrowheads="1"/>
-          </p:cNvPicPr>
-          <p:nvPr/>
-        </p:nvPicPr>
-        <p:blipFill rotWithShape="1">
-          <a:blip r:embed="rId14">
-            <a:extLst>
-              <a:ext uri="{28A0092B-C50C-407E-A947-70E740481C1C}">
-                <a14:useLocalDpi xmlns:a14="http://schemas.microsoft.com/office/drawing/2010/main" val="0"/>
-              </a:ext>
-            </a:extLst>
-          </a:blip>
-          <a:srcRect b="17800"/>
-          <a:stretch/>
-        </p:blipFill>
-        <p:spPr bwMode="auto">
-          <a:xfrm>
-            <a:off x="1052464" y="3766920"/>
-            <a:ext cx="1027154" cy="368290"/>
-          </a:xfrm>
-          <a:prstGeom prst="rect">
-            <a:avLst/>
-          </a:prstGeom>
-          <a:noFill/>
-          <a:extLst>
-            <a:ext uri="{909E8E84-426E-40DD-AFC4-6F175D3DCCD1}">
-              <a14:hiddenFill xmlns:a14="http://schemas.microsoft.com/office/drawing/2010/main">
-                <a:solidFill>
-                  <a:srgbClr val="FFFFFF"/>
-                </a:solidFill>
-              </a14:hiddenFill>
-            </a:ext>
-          </a:extLst>
-        </p:spPr>
-      </p:pic>
-      <p:pic>
-        <p:nvPicPr>
-          <p:cNvPr id="1034" name="Picture 10" descr="Perth mystery billionaire's yellow Lamborghini is impounded on speeding  charges | Daily Mail Online">
-            <a:extLst>
-              <a:ext uri="{FF2B5EF4-FFF2-40B4-BE49-F238E27FC236}">
-                <a16:creationId xmlns:a16="http://schemas.microsoft.com/office/drawing/2014/main" id="{49A59273-97F6-0054-1489-E61A57599CDE}"/>
-              </a:ext>
-            </a:extLst>
-          </p:cNvPr>
-          <p:cNvPicPr>
-            <a:picLocks noChangeAspect="1" noChangeArrowheads="1"/>
-          </p:cNvPicPr>
-          <p:nvPr/>
-        </p:nvPicPr>
-        <p:blipFill rotWithShape="1">
-          <a:blip r:embed="rId15">
-            <a:extLst>
-              <a:ext uri="{28A0092B-C50C-407E-A947-70E740481C1C}">
-                <a14:useLocalDpi xmlns:a14="http://schemas.microsoft.com/office/drawing/2010/main" val="0"/>
-              </a:ext>
-            </a:extLst>
-          </a:blip>
-          <a:srcRect l="23723" t="51148" r="35937" b="-985"/>
-          <a:stretch/>
-        </p:blipFill>
-        <p:spPr bwMode="auto">
-          <a:xfrm>
-            <a:off x="759985" y="4150385"/>
-            <a:ext cx="1315017" cy="1394724"/>
-          </a:xfrm>
-          <a:prstGeom prst="rect">
-            <a:avLst/>
-          </a:prstGeom>
-          <a:noFill/>
-          <a:extLst>
-            <a:ext uri="{909E8E84-426E-40DD-AFC4-6F175D3DCCD1}">
-              <a14:hiddenFill xmlns:a14="http://schemas.microsoft.com/office/drawing/2010/main">
-                <a:solidFill>
-                  <a:srgbClr val="FFFFFF"/>
-                </a:solidFill>
-              </a14:hiddenFill>
-            </a:ext>
-          </a:extLst>
-        </p:spPr>
-      </p:pic>
-      <p:pic>
-        <p:nvPicPr>
-          <p:cNvPr id="1036" name="Picture 12" descr="Number plates – WA – black on yellow – PropCo">
-            <a:extLst>
-              <a:ext uri="{FF2B5EF4-FFF2-40B4-BE49-F238E27FC236}">
-                <a16:creationId xmlns:a16="http://schemas.microsoft.com/office/drawing/2014/main" id="{8E1F1AFD-24E3-2F11-937F-0435C6D65A33}"/>
-              </a:ext>
-            </a:extLst>
-          </p:cNvPr>
-          <p:cNvPicPr>
-            <a:picLocks noChangeAspect="1" noChangeArrowheads="1"/>
-          </p:cNvPicPr>
-          <p:nvPr/>
-        </p:nvPicPr>
-        <p:blipFill rotWithShape="1">
-          <a:blip r:embed="rId16">
-            <a:extLst>
-              <a:ext uri="{28A0092B-C50C-407E-A947-70E740481C1C}">
-                <a14:useLocalDpi xmlns:a14="http://schemas.microsoft.com/office/drawing/2010/main" val="0"/>
-              </a:ext>
-            </a:extLst>
-          </a:blip>
-          <a:srcRect l="22834" t="7631" r="4299" b="27587"/>
-          <a:stretch/>
-        </p:blipFill>
-        <p:spPr bwMode="auto">
-          <a:xfrm>
-            <a:off x="950743" y="5110001"/>
-            <a:ext cx="1125798" cy="402397"/>
-          </a:xfrm>
-          <a:prstGeom prst="rect">
-            <a:avLst/>
-          </a:prstGeom>
-          <a:noFill/>
-          <a:extLst>
-            <a:ext uri="{909E8E84-426E-40DD-AFC4-6F175D3DCCD1}">
-              <a14:hiddenFill xmlns:a14="http://schemas.microsoft.com/office/drawing/2010/main">
-                <a:solidFill>
-                  <a:srgbClr val="FFFFFF"/>
-                </a:solidFill>
-              </a14:hiddenFill>
-            </a:ext>
-          </a:extLst>
-        </p:spPr>
-      </p:pic>
       <p:sp>
         <p:nvSpPr>
           <p:cNvPr id="2" name="TextBox 1">
@@ -5153,8 +5150,8 @@
         </p:nvSpPr>
         <p:spPr>
           <a:xfrm>
-            <a:off x="8405619" y="4007888"/>
-            <a:ext cx="2942706" cy="646331"/>
+            <a:off x="8071671" y="4060603"/>
+            <a:ext cx="2942706" cy="1384995"/>
           </a:xfrm>
           <a:prstGeom prst="rect">
             <a:avLst/>
@@ -5169,12 +5166,12 @@
           <a:p>
             <a:pPr algn="ctr"/>
             <a:r>
-              <a:rPr lang="en-AU" b="1" dirty="0">
+              <a:rPr lang="en-AU" sz="2800" b="1" dirty="0">
                 <a:solidFill>
-                  <a:schemeClr val="accent1"/>
+                  <a:schemeClr val="tx2"/>
                 </a:solidFill>
               </a:rPr>
-              <a:t>Traffic Signal Optimised routing</a:t>
+              <a:t>Traffic Signal Optimised Routing</a:t>
             </a:r>
           </a:p>
         </p:txBody>
@@ -5192,7 +5189,7 @@
 </p:sld>
 </file>
 
-<file path=ppt/slides/slide4.xml><?xml version="1.0" encoding="utf-8"?>
+<file path=ppt/slides/slide3.xml><?xml version="1.0" encoding="utf-8"?>
 <p:sld xmlns:a="http://schemas.openxmlformats.org/drawingml/2006/main" xmlns:r="http://schemas.openxmlformats.org/officeDocument/2006/relationships" xmlns:p="http://schemas.openxmlformats.org/presentationml/2006/main">
   <p:cSld>
     <p:spTree>
@@ -5244,7 +5241,7 @@
               <a:rPr lang="en-AU" dirty="0">
                 <a:blipFill dpi="0" rotWithShape="1">
                   <a:blip r:embed="rId3">
-                    <a:alphaModFix amt="20000"/>
+                    <a:alphaModFix amt="8000"/>
                   </a:blip>
                   <a:srcRect/>
                   <a:stretch>
@@ -5414,10 +5411,10 @@
       </p:pic>
       <p:sp>
         <p:nvSpPr>
-          <p:cNvPr id="2" name="TextBox 1">
+          <p:cNvPr id="3" name="TextBox 2">
             <a:extLst>
               <a:ext uri="{FF2B5EF4-FFF2-40B4-BE49-F238E27FC236}">
-                <a16:creationId xmlns:a16="http://schemas.microsoft.com/office/drawing/2014/main" id="{55DDFDEC-0443-CFAF-4A71-12BCFFC28514}"/>
+                <a16:creationId xmlns:a16="http://schemas.microsoft.com/office/drawing/2014/main" id="{30F437BB-956D-2AF2-A483-F9CADBCBE9D2}"/>
               </a:ext>
             </a:extLst>
           </p:cNvPr>
@@ -5426,8 +5423,8 @@
         </p:nvSpPr>
         <p:spPr>
           <a:xfrm>
-            <a:off x="381395" y="221012"/>
-            <a:ext cx="8884525" cy="1200329"/>
+            <a:off x="833050" y="647489"/>
+            <a:ext cx="10848562" cy="6555641"/>
           </a:xfrm>
           <a:prstGeom prst="rect">
             <a:avLst/>
@@ -5441,35 +5438,135 @@
           <a:lstStyle/>
           <a:p>
             <a:r>
-              <a:rPr lang="en-AU" dirty="0" err="1"/>
-              <a:t>Blueflare</a:t>
-            </a:r>
-            <a:r>
-              <a:rPr lang="en-AU" dirty="0"/>
-              <a:t> takes traffic data from Apple Maps, Google Maps, Waze, SCAT </a:t>
+              <a:rPr lang="en-AU" sz="3000" b="1" dirty="0"/>
+              <a:t>WHAT</a:t>
+            </a:r>
+          </a:p>
+          <a:p>
+            <a:r>
+              <a:rPr lang="en-AU" sz="3000" dirty="0"/>
+              <a:t>Provides a SAFE and OPTIMISED route between responding Police Vehicle and Priority 1 or Priority 2 Incident Location. </a:t>
+            </a:r>
+          </a:p>
+          <a:p>
+            <a:endParaRPr lang="en-AU" sz="3000" dirty="0"/>
+          </a:p>
+          <a:p>
+            <a:r>
+              <a:rPr lang="en-AU" sz="3000" b="1" dirty="0"/>
+              <a:t>HOW</a:t>
+            </a:r>
+          </a:p>
+          <a:p>
+            <a:r>
+              <a:rPr lang="en-AU" sz="3000" dirty="0"/>
+              <a:t>Optimise fastest route by Controlling Traffic Signals using Main Roads SCATS System </a:t>
+            </a:r>
+          </a:p>
+          <a:p>
+            <a:endParaRPr lang="en-AU" sz="3000" dirty="0"/>
+          </a:p>
+          <a:p>
+            <a:pPr algn="ctr"/>
+            <a:r>
+              <a:rPr lang="en-US" b="1" i="0" dirty="0">
+                <a:effectLst/>
+                <a:latin typeface="Arial" panose="020B0604020202020204" pitchFamily="34" charset="0"/>
+              </a:rPr>
+              <a:t>SCATS</a:t>
+            </a:r>
+            <a:r>
+              <a:rPr lang="en-US" b="0" i="0" dirty="0">
+                <a:effectLst/>
+                <a:latin typeface="Arial" panose="020B0604020202020204" pitchFamily="34" charset="0"/>
+              </a:rPr>
+              <a:t>: A</a:t>
+            </a:r>
+            <a:r>
+              <a:rPr lang="en-US" dirty="0">
+                <a:latin typeface="Arial" panose="020B0604020202020204" pitchFamily="34" charset="0"/>
+              </a:rPr>
+              <a:t>n existing </a:t>
+            </a:r>
+            <a:r>
+              <a:rPr lang="en-US" b="0" i="0" u="none" strike="noStrike" dirty="0">
+                <a:effectLst/>
+                <a:latin typeface="Arial" panose="020B0604020202020204" pitchFamily="34" charset="0"/>
+                <a:hlinkClick r:id="rId8" tooltip="Intelligent transportation system">
+                  <a:extLst>
+                    <a:ext uri="{A12FA001-AC4F-418D-AE19-62706E023703}">
+                      <ahyp:hlinkClr xmlns:ahyp="http://schemas.microsoft.com/office/drawing/2018/hyperlinkcolor" val="tx"/>
+                    </a:ext>
+                  </a:extLst>
+                </a:hlinkClick>
+              </a:rPr>
+              <a:t>intelligent transportation system</a:t>
+            </a:r>
+            <a:r>
+              <a:rPr lang="en-US" b="0" i="0" dirty="0">
+                <a:effectLst/>
+                <a:latin typeface="Arial" panose="020B0604020202020204" pitchFamily="34" charset="0"/>
+              </a:rPr>
+              <a:t> that manages the dynamic (on-line, real-time) timing of signal phases at </a:t>
+            </a:r>
+            <a:r>
+              <a:rPr lang="en-US" b="0" i="0" u="none" strike="noStrike" dirty="0">
+                <a:effectLst/>
+                <a:latin typeface="Arial" panose="020B0604020202020204" pitchFamily="34" charset="0"/>
+                <a:hlinkClick r:id="rId9" tooltip="Traffic signal">
+                  <a:extLst>
+                    <a:ext uri="{A12FA001-AC4F-418D-AE19-62706E023703}">
+                      <ahyp:hlinkClr xmlns:ahyp="http://schemas.microsoft.com/office/drawing/2018/hyperlinkcolor" val="tx"/>
+                    </a:ext>
+                  </a:extLst>
+                </a:hlinkClick>
+              </a:rPr>
+              <a:t>traffic signals</a:t>
+            </a:r>
+            <a:r>
+              <a:rPr lang="en-US" u="none" strike="noStrike" dirty="0">
+                <a:latin typeface="Arial" panose="020B0604020202020204" pitchFamily="34" charset="0"/>
+              </a:rPr>
+              <a:t> dependent on the traffic s</a:t>
+            </a:r>
+            <a:r>
+              <a:rPr lang="en-US" dirty="0">
+                <a:latin typeface="Arial" panose="020B0604020202020204" pitchFamily="34" charset="0"/>
+              </a:rPr>
+              <a:t>ituation – it has the ability for manual operation</a:t>
+            </a:r>
+            <a:endParaRPr lang="en-AU" sz="3000" dirty="0"/>
+          </a:p>
+          <a:p>
+            <a:endParaRPr lang="en-AU" sz="3000" dirty="0"/>
+          </a:p>
+          <a:p>
+            <a:r>
+              <a:rPr lang="en-AU" sz="3000" b="1" dirty="0"/>
+              <a:t>RESULT</a:t>
+            </a:r>
+          </a:p>
+          <a:p>
+            <a:r>
+              <a:rPr lang="en-AU" sz="3000" dirty="0"/>
+              <a:t>Faster and Safer for Police and the Community</a:t>
             </a:r>
           </a:p>
           <a:p>
             <a:endParaRPr lang="en-AU" dirty="0"/>
           </a:p>
           <a:p>
-            <a:r>
-              <a:rPr lang="en-AU" dirty="0"/>
-              <a:t>Available car – route calculation</a:t>
-            </a:r>
-          </a:p>
-          <a:p>
-            <a:r>
-              <a:rPr lang="en-AU" dirty="0"/>
-              <a:t>Control intersection Traffic Lights</a:t>
-            </a:r>
+            <a:endParaRPr lang="en-AU" dirty="0"/>
+          </a:p>
+          <a:p>
+            <a:endParaRPr lang="en-AU" dirty="0"/>
           </a:p>
         </p:txBody>
       </p:sp>
     </p:spTree>
     <p:extLst>
       <p:ext uri="{BB962C8B-B14F-4D97-AF65-F5344CB8AC3E}">
-        <p14:creationId xmlns:p14="http://schemas.microsoft.com/office/powerpoint/2010/main" val="1760221263"/>
+        <p14:creationId xmlns:p14="http://schemas.microsoft.com/office/powerpoint/2010/main" val="2462211809"/>
       </p:ext>
     </p:extLst>
   </p:cSld>
@@ -5479,7 +5576,7 @@
 </p:sld>
 </file>
 
-<file path=ppt/slides/slide5.xml><?xml version="1.0" encoding="utf-8"?>
+<file path=ppt/slides/slide4.xml><?xml version="1.0" encoding="utf-8"?>
 <p:sld xmlns:a="http://schemas.openxmlformats.org/drawingml/2006/main" xmlns:r="http://schemas.openxmlformats.org/officeDocument/2006/relationships" xmlns:p="http://schemas.openxmlformats.org/presentationml/2006/main">
   <p:cSld>
     <p:spTree>
@@ -5713,6 +5810,926 @@
         </p:nvSpPr>
         <p:spPr>
           <a:xfrm>
+            <a:off x="381395" y="221012"/>
+            <a:ext cx="8884525" cy="369332"/>
+          </a:xfrm>
+          <a:prstGeom prst="rect">
+            <a:avLst/>
+          </a:prstGeom>
+          <a:noFill/>
+        </p:spPr>
+        <p:txBody>
+          <a:bodyPr wrap="square" rtlCol="0">
+            <a:spAutoFit/>
+          </a:bodyPr>
+          <a:lstStyle/>
+          <a:p>
+            <a:r>
+              <a:rPr lang="en-AU" dirty="0"/>
+              <a:t>APP info….</a:t>
+            </a:r>
+          </a:p>
+        </p:txBody>
+      </p:sp>
+    </p:spTree>
+    <p:extLst>
+      <p:ext uri="{BB962C8B-B14F-4D97-AF65-F5344CB8AC3E}">
+        <p14:creationId xmlns:p14="http://schemas.microsoft.com/office/powerpoint/2010/main" val="1760221263"/>
+      </p:ext>
+    </p:extLst>
+  </p:cSld>
+  <p:clrMapOvr>
+    <a:masterClrMapping/>
+  </p:clrMapOvr>
+</p:sld>
+</file>
+
+<file path=ppt/slides/slide5.xml><?xml version="1.0" encoding="utf-8"?>
+<p:sld xmlns:a="http://schemas.openxmlformats.org/drawingml/2006/main" xmlns:r="http://schemas.openxmlformats.org/officeDocument/2006/relationships" xmlns:p="http://schemas.openxmlformats.org/presentationml/2006/main">
+  <p:cSld>
+    <p:spTree>
+      <p:nvGrpSpPr>
+        <p:cNvPr id="1" name=""/>
+        <p:cNvGrpSpPr/>
+        <p:nvPr/>
+      </p:nvGrpSpPr>
+      <p:grpSpPr>
+        <a:xfrm>
+          <a:off x="0" y="0"/>
+          <a:ext cx="0" cy="0"/>
+          <a:chOff x="0" y="0"/>
+          <a:chExt cx="0" cy="0"/>
+        </a:xfrm>
+      </p:grpSpPr>
+      <p:sp>
+        <p:nvSpPr>
+          <p:cNvPr id="4" name="TextBox 3">
+            <a:extLst>
+              <a:ext uri="{FF2B5EF4-FFF2-40B4-BE49-F238E27FC236}">
+                <a16:creationId xmlns:a16="http://schemas.microsoft.com/office/drawing/2014/main" id="{6E2A7F2C-1078-6D76-16B9-A4CFBE9E18A6}"/>
+              </a:ext>
+            </a:extLst>
+          </p:cNvPr>
+          <p:cNvSpPr txBox="1"/>
+          <p:nvPr/>
+        </p:nvSpPr>
+        <p:spPr>
+          <a:xfrm>
+            <a:off x="0" y="28598"/>
+            <a:ext cx="12192000" cy="5464234"/>
+          </a:xfrm>
+          <a:prstGeom prst="rect">
+            <a:avLst/>
+          </a:prstGeom>
+          <a:noFill/>
+        </p:spPr>
+        <p:txBody>
+          <a:bodyPr wrap="square" rtlCol="0">
+            <a:prstTxWarp prst="textInflateBottom">
+              <a:avLst/>
+            </a:prstTxWarp>
+            <a:spAutoFit/>
+          </a:bodyPr>
+          <a:lstStyle/>
+          <a:p>
+            <a:r>
+              <a:rPr lang="en-AU" dirty="0">
+                <a:blipFill dpi="0" rotWithShape="1">
+                  <a:blip r:embed="rId3">
+                    <a:alphaModFix amt="5000"/>
+                  </a:blip>
+                  <a:srcRect/>
+                  <a:stretch>
+                    <a:fillRect/>
+                  </a:stretch>
+                </a:blipFill>
+              </a:rPr>
+              <a:t>---------------</a:t>
+            </a:r>
+          </a:p>
+        </p:txBody>
+      </p:sp>
+      <p:pic>
+        <p:nvPicPr>
+          <p:cNvPr id="2" name="Content Placeholder 3" descr="A person wearing sunglasses and a hat&#10;&#10;Description automatically generated">
+            <a:extLst>
+              <a:ext uri="{FF2B5EF4-FFF2-40B4-BE49-F238E27FC236}">
+                <a16:creationId xmlns:a16="http://schemas.microsoft.com/office/drawing/2014/main" id="{D093D009-568A-2661-D3CD-84A32BB75D99}"/>
+              </a:ext>
+            </a:extLst>
+          </p:cNvPr>
+          <p:cNvPicPr>
+            <a:picLocks noChangeAspect="1"/>
+          </p:cNvPicPr>
+          <p:nvPr/>
+        </p:nvPicPr>
+        <p:blipFill>
+          <a:blip r:embed="rId4"/>
+          <a:stretch>
+            <a:fillRect/>
+          </a:stretch>
+        </p:blipFill>
+        <p:spPr>
+          <a:xfrm>
+            <a:off x="11109267" y="5736390"/>
+            <a:ext cx="963262" cy="997665"/>
+          </a:xfrm>
+          <a:prstGeom prst="rect">
+            <a:avLst/>
+          </a:prstGeom>
+          <a:effectLst>
+            <a:softEdge rad="50800"/>
+          </a:effectLst>
+        </p:spPr>
+      </p:pic>
+      <p:sp>
+        <p:nvSpPr>
+          <p:cNvPr id="5" name="TextBox 4">
+            <a:extLst>
+              <a:ext uri="{FF2B5EF4-FFF2-40B4-BE49-F238E27FC236}">
+                <a16:creationId xmlns:a16="http://schemas.microsoft.com/office/drawing/2014/main" id="{A7159774-B73E-3B53-5B9B-CA8E635AECF0}"/>
+              </a:ext>
+            </a:extLst>
+          </p:cNvPr>
+          <p:cNvSpPr txBox="1"/>
+          <p:nvPr/>
+        </p:nvSpPr>
+        <p:spPr>
+          <a:xfrm>
+            <a:off x="547601" y="494635"/>
+            <a:ext cx="11356224" cy="4124206"/>
+          </a:xfrm>
+          <a:prstGeom prst="rect">
+            <a:avLst/>
+          </a:prstGeom>
+          <a:noFill/>
+        </p:spPr>
+        <p:txBody>
+          <a:bodyPr wrap="square" rtlCol="0">
+            <a:spAutoFit/>
+          </a:bodyPr>
+          <a:lstStyle/>
+          <a:p>
+            <a:endParaRPr lang="en-AU" dirty="0"/>
+          </a:p>
+          <a:p>
+            <a:r>
+              <a:rPr lang="en-AU" sz="2800" b="1" dirty="0" err="1">
+                <a:solidFill>
+                  <a:schemeClr val="bg1"/>
+                </a:solidFill>
+              </a:rPr>
+              <a:t>Blueflare</a:t>
+            </a:r>
+            <a:r>
+              <a:rPr lang="en-AU" sz="2800" b="1" dirty="0">
+                <a:solidFill>
+                  <a:schemeClr val="bg1"/>
+                </a:solidFill>
+              </a:rPr>
+              <a:t>						</a:t>
+            </a:r>
+            <a:r>
+              <a:rPr lang="en-AU" sz="2800" b="1" dirty="0"/>
+              <a:t>aims to:</a:t>
+            </a:r>
+          </a:p>
+          <a:p>
+            <a:endParaRPr lang="en-AU" sz="2400" b="1" dirty="0"/>
+          </a:p>
+          <a:p>
+            <a:r>
+              <a:rPr lang="en-AU" sz="2400" b="1" dirty="0"/>
+              <a:t>Assist Police to achieve their </a:t>
+            </a:r>
+            <a:r>
+              <a:rPr lang="en-AU" sz="2400" b="1" dirty="0">
+                <a:solidFill>
+                  <a:srgbClr val="FFFF00"/>
+                </a:solidFill>
+              </a:rPr>
+              <a:t>12 minute Response KPI</a:t>
+            </a:r>
+            <a:r>
+              <a:rPr lang="en-AU" sz="2400" b="1" dirty="0"/>
+              <a:t> for Priority 1 &amp; 2 incidents</a:t>
+            </a:r>
+          </a:p>
+          <a:p>
+            <a:pPr lvl="1"/>
+            <a:r>
+              <a:rPr lang="en-AU" sz="2400" b="1" dirty="0"/>
+              <a:t>and,</a:t>
+            </a:r>
+          </a:p>
+          <a:p>
+            <a:r>
+              <a:rPr lang="en-AU" sz="2400" b="1" dirty="0"/>
+              <a:t>Meet </a:t>
+            </a:r>
+            <a:r>
+              <a:rPr lang="en-AU" sz="2400" b="1" dirty="0">
+                <a:solidFill>
+                  <a:srgbClr val="FFFF00"/>
+                </a:solidFill>
+              </a:rPr>
+              <a:t>Community Expectations </a:t>
+            </a:r>
+            <a:r>
+              <a:rPr lang="en-AU" sz="2400" b="1" dirty="0"/>
+              <a:t>by:</a:t>
+            </a:r>
+          </a:p>
+          <a:p>
+            <a:pPr marL="800100" lvl="1" indent="-342900">
+              <a:buFont typeface="Arial" panose="020B0604020202020204" pitchFamily="34" charset="0"/>
+              <a:buChar char="•"/>
+            </a:pPr>
+            <a:r>
+              <a:rPr lang="en-AU" sz="2400" b="1" dirty="0"/>
+              <a:t>Respond to where and when the community needs Police most</a:t>
+            </a:r>
+          </a:p>
+          <a:p>
+            <a:pPr marL="800100" lvl="1" indent="-342900">
+              <a:buFont typeface="Arial" panose="020B0604020202020204" pitchFamily="34" charset="0"/>
+              <a:buChar char="•"/>
+            </a:pPr>
+            <a:r>
+              <a:rPr lang="en-AU" sz="2400" b="1" dirty="0"/>
+              <a:t>Providing the community assurance of immediate safety and support</a:t>
+            </a:r>
+          </a:p>
+          <a:p>
+            <a:pPr lvl="1"/>
+            <a:endParaRPr lang="en-AU" b="1" dirty="0"/>
+          </a:p>
+          <a:p>
+            <a:pPr lvl="1"/>
+            <a:endParaRPr lang="en-AU" b="1" dirty="0"/>
+          </a:p>
+          <a:p>
+            <a:endParaRPr lang="en-AU" b="1" dirty="0"/>
+          </a:p>
+          <a:p>
+            <a:endParaRPr lang="en-AU" b="1" dirty="0"/>
+          </a:p>
+        </p:txBody>
+      </p:sp>
+      <p:pic>
+        <p:nvPicPr>
+          <p:cNvPr id="7" name="Picture 6">
+            <a:extLst>
+              <a:ext uri="{FF2B5EF4-FFF2-40B4-BE49-F238E27FC236}">
+                <a16:creationId xmlns:a16="http://schemas.microsoft.com/office/drawing/2014/main" id="{2053E5A1-3D9B-18FE-BF2F-3445A0CA7C2A}"/>
+              </a:ext>
+            </a:extLst>
+          </p:cNvPr>
+          <p:cNvPicPr>
+            <a:picLocks noChangeAspect="1"/>
+          </p:cNvPicPr>
+          <p:nvPr/>
+        </p:nvPicPr>
+        <p:blipFill>
+          <a:blip r:embed="rId5"/>
+          <a:stretch>
+            <a:fillRect/>
+          </a:stretch>
+        </p:blipFill>
+        <p:spPr>
+          <a:xfrm>
+            <a:off x="5962996" y="3734900"/>
+            <a:ext cx="3663142" cy="2628465"/>
+          </a:xfrm>
+          <a:prstGeom prst="rect">
+            <a:avLst/>
+          </a:prstGeom>
+        </p:spPr>
+      </p:pic>
+      <p:sp>
+        <p:nvSpPr>
+          <p:cNvPr id="8" name="TextBox 7">
+            <a:extLst>
+              <a:ext uri="{FF2B5EF4-FFF2-40B4-BE49-F238E27FC236}">
+                <a16:creationId xmlns:a16="http://schemas.microsoft.com/office/drawing/2014/main" id="{45FEFE0A-BB4F-C972-4BD6-0962B40B10B1}"/>
+              </a:ext>
+            </a:extLst>
+          </p:cNvPr>
+          <p:cNvSpPr txBox="1"/>
+          <p:nvPr/>
+        </p:nvSpPr>
+        <p:spPr>
+          <a:xfrm>
+            <a:off x="3191128" y="6364723"/>
+            <a:ext cx="6777643" cy="369332"/>
+          </a:xfrm>
+          <a:prstGeom prst="rect">
+            <a:avLst/>
+          </a:prstGeom>
+          <a:noFill/>
+        </p:spPr>
+        <p:txBody>
+          <a:bodyPr wrap="square" rtlCol="0">
+            <a:spAutoFit/>
+          </a:bodyPr>
+          <a:lstStyle/>
+          <a:p>
+            <a:r>
+              <a:rPr lang="en-US" i="1" dirty="0"/>
+              <a:t>WESTERN AUSTRALIA POLICE FORCE ANNUAL REPORT 2023</a:t>
+            </a:r>
+            <a:endParaRPr lang="en-AU" i="1" dirty="0"/>
+          </a:p>
+        </p:txBody>
+      </p:sp>
+      <p:pic>
+        <p:nvPicPr>
+          <p:cNvPr id="13" name="Picture 12">
+            <a:extLst>
+              <a:ext uri="{FF2B5EF4-FFF2-40B4-BE49-F238E27FC236}">
+                <a16:creationId xmlns:a16="http://schemas.microsoft.com/office/drawing/2014/main" id="{0F41B0A1-335B-E5A9-E640-4F0E0CA5E107}"/>
+              </a:ext>
+            </a:extLst>
+          </p:cNvPr>
+          <p:cNvPicPr>
+            <a:picLocks noChangeAspect="1"/>
+          </p:cNvPicPr>
+          <p:nvPr/>
+        </p:nvPicPr>
+        <p:blipFill>
+          <a:blip r:embed="rId6"/>
+          <a:stretch>
+            <a:fillRect/>
+          </a:stretch>
+        </p:blipFill>
+        <p:spPr>
+          <a:xfrm>
+            <a:off x="3191128" y="3703691"/>
+            <a:ext cx="961782" cy="2552730"/>
+          </a:xfrm>
+          <a:prstGeom prst="rect">
+            <a:avLst/>
+          </a:prstGeom>
+        </p:spPr>
+      </p:pic>
+      <p:pic>
+        <p:nvPicPr>
+          <p:cNvPr id="15" name="Picture 14">
+            <a:extLst>
+              <a:ext uri="{FF2B5EF4-FFF2-40B4-BE49-F238E27FC236}">
+                <a16:creationId xmlns:a16="http://schemas.microsoft.com/office/drawing/2014/main" id="{3BE53ADF-D50F-6E13-8474-DAA8B26FD7AF}"/>
+              </a:ext>
+            </a:extLst>
+          </p:cNvPr>
+          <p:cNvPicPr>
+            <a:picLocks noChangeAspect="1"/>
+          </p:cNvPicPr>
+          <p:nvPr/>
+        </p:nvPicPr>
+        <p:blipFill>
+          <a:blip r:embed="rId7"/>
+          <a:stretch>
+            <a:fillRect/>
+          </a:stretch>
+        </p:blipFill>
+        <p:spPr>
+          <a:xfrm>
+            <a:off x="4456759" y="3727624"/>
+            <a:ext cx="1006014" cy="2566363"/>
+          </a:xfrm>
+          <a:prstGeom prst="rect">
+            <a:avLst/>
+          </a:prstGeom>
+        </p:spPr>
+      </p:pic>
+      <p:pic>
+        <p:nvPicPr>
+          <p:cNvPr id="3" name="Picture 2" descr="A blue text with a black background&#10;&#10;Description automatically generated">
+            <a:extLst>
+              <a:ext uri="{FF2B5EF4-FFF2-40B4-BE49-F238E27FC236}">
+                <a16:creationId xmlns:a16="http://schemas.microsoft.com/office/drawing/2014/main" id="{8617F069-2B35-14C1-BC6F-117D0DED8F24}"/>
+              </a:ext>
+            </a:extLst>
+          </p:cNvPr>
+          <p:cNvPicPr>
+            <a:picLocks noChangeAspect="1"/>
+          </p:cNvPicPr>
+          <p:nvPr/>
+        </p:nvPicPr>
+        <p:blipFill>
+          <a:blip r:embed="rId8">
+            <a:extLst>
+              <a:ext uri="{28A0092B-C50C-407E-A947-70E740481C1C}">
+                <a14:useLocalDpi xmlns:a14="http://schemas.microsoft.com/office/drawing/2010/main" val="0"/>
+              </a:ext>
+            </a:extLst>
+          </a:blip>
+          <a:stretch>
+            <a:fillRect/>
+          </a:stretch>
+        </p:blipFill>
+        <p:spPr>
+          <a:xfrm>
+            <a:off x="-23127" y="180836"/>
+            <a:ext cx="4653246" cy="1572365"/>
+          </a:xfrm>
+          <a:prstGeom prst="rect">
+            <a:avLst/>
+          </a:prstGeom>
+          <a:effectLst>
+            <a:glow>
+              <a:srgbClr val="002060">
+                <a:alpha val="0"/>
+              </a:srgbClr>
+            </a:glow>
+            <a:outerShdw blurRad="50800" dist="88900" dir="6000000" algn="ctr" rotWithShape="0">
+              <a:srgbClr val="000000"/>
+            </a:outerShdw>
+            <a:reflection stA="45000" endPos="1000" dist="50800" dir="5400000" sy="-100000" algn="bl" rotWithShape="0"/>
+            <a:softEdge rad="368300"/>
+          </a:effectLst>
+        </p:spPr>
+      </p:pic>
+    </p:spTree>
+    <p:extLst>
+      <p:ext uri="{BB962C8B-B14F-4D97-AF65-F5344CB8AC3E}">
+        <p14:creationId xmlns:p14="http://schemas.microsoft.com/office/powerpoint/2010/main" val="468884825"/>
+      </p:ext>
+    </p:extLst>
+  </p:cSld>
+  <p:clrMapOvr>
+    <a:masterClrMapping/>
+  </p:clrMapOvr>
+</p:sld>
+</file>
+
+<file path=ppt/slides/slide6.xml><?xml version="1.0" encoding="utf-8"?>
+<p:sld xmlns:a="http://schemas.openxmlformats.org/drawingml/2006/main" xmlns:r="http://schemas.openxmlformats.org/officeDocument/2006/relationships" xmlns:p="http://schemas.openxmlformats.org/presentationml/2006/main">
+  <p:cSld>
+    <p:spTree>
+      <p:nvGrpSpPr>
+        <p:cNvPr id="1" name=""/>
+        <p:cNvGrpSpPr/>
+        <p:nvPr/>
+      </p:nvGrpSpPr>
+      <p:grpSpPr>
+        <a:xfrm>
+          <a:off x="0" y="0"/>
+          <a:ext cx="0" cy="0"/>
+          <a:chOff x="0" y="0"/>
+          <a:chExt cx="0" cy="0"/>
+        </a:xfrm>
+      </p:grpSpPr>
+      <p:sp>
+        <p:nvSpPr>
+          <p:cNvPr id="5" name="TextBox 4">
+            <a:extLst>
+              <a:ext uri="{FF2B5EF4-FFF2-40B4-BE49-F238E27FC236}">
+                <a16:creationId xmlns:a16="http://schemas.microsoft.com/office/drawing/2014/main" id="{1D613CEF-257B-B686-4999-8D4FF50EC036}"/>
+              </a:ext>
+            </a:extLst>
+          </p:cNvPr>
+          <p:cNvSpPr txBox="1"/>
+          <p:nvPr/>
+        </p:nvSpPr>
+        <p:spPr>
+          <a:xfrm>
+            <a:off x="0" y="-1"/>
+            <a:ext cx="12192000" cy="5464234"/>
+          </a:xfrm>
+          <a:prstGeom prst="rect">
+            <a:avLst/>
+          </a:prstGeom>
+          <a:noFill/>
+        </p:spPr>
+        <p:txBody>
+          <a:bodyPr wrap="square" rtlCol="0">
+            <a:prstTxWarp prst="textInflateBottom">
+              <a:avLst/>
+            </a:prstTxWarp>
+            <a:spAutoFit/>
+          </a:bodyPr>
+          <a:lstStyle/>
+          <a:p>
+            <a:r>
+              <a:rPr lang="en-AU" dirty="0">
+                <a:blipFill dpi="0" rotWithShape="1">
+                  <a:blip r:embed="rId3">
+                    <a:alphaModFix amt="20000"/>
+                  </a:blip>
+                  <a:srcRect/>
+                  <a:stretch>
+                    <a:fillRect/>
+                  </a:stretch>
+                </a:blipFill>
+              </a:rPr>
+              <a:t>---------------</a:t>
+            </a:r>
+          </a:p>
+        </p:txBody>
+      </p:sp>
+      <p:pic>
+        <p:nvPicPr>
+          <p:cNvPr id="1026" name="Picture 2" descr="Premium Photo | A black phone with a black background with a black  background with flowers.">
+            <a:extLst>
+              <a:ext uri="{FF2B5EF4-FFF2-40B4-BE49-F238E27FC236}">
+                <a16:creationId xmlns:a16="http://schemas.microsoft.com/office/drawing/2014/main" id="{B07670B7-3924-072E-F46E-E0F97E133332}"/>
+              </a:ext>
+            </a:extLst>
+          </p:cNvPr>
+          <p:cNvPicPr>
+            <a:picLocks noChangeAspect="1" noChangeArrowheads="1"/>
+          </p:cNvPicPr>
+          <p:nvPr/>
+        </p:nvPicPr>
+        <p:blipFill rotWithShape="1">
+          <a:blip r:embed="rId4">
+            <a:extLst>
+              <a:ext uri="{28A0092B-C50C-407E-A947-70E740481C1C}">
+                <a14:useLocalDpi xmlns:a14="http://schemas.microsoft.com/office/drawing/2010/main" val="0"/>
+              </a:ext>
+            </a:extLst>
+          </a:blip>
+          <a:srcRect l="39974" t="19705" r="38239" b="13620"/>
+          <a:stretch/>
+        </p:blipFill>
+        <p:spPr bwMode="auto">
+          <a:xfrm>
+            <a:off x="-3462157" y="337871"/>
+            <a:ext cx="3032676" cy="6182258"/>
+          </a:xfrm>
+          <a:prstGeom prst="rect">
+            <a:avLst/>
+          </a:prstGeom>
+          <a:noFill/>
+          <a:extLst>
+            <a:ext uri="{909E8E84-426E-40DD-AFC4-6F175D3DCCD1}">
+              <a14:hiddenFill xmlns:a14="http://schemas.microsoft.com/office/drawing/2010/main">
+                <a:solidFill>
+                  <a:srgbClr val="FFFFFF"/>
+                </a:solidFill>
+              </a14:hiddenFill>
+            </a:ext>
+          </a:extLst>
+        </p:spPr>
+      </p:pic>
+      <p:pic>
+        <p:nvPicPr>
+          <p:cNvPr id="4" name="Content Placeholder 3" descr="A person wearing sunglasses and a hat&#10;&#10;Description automatically generated">
+            <a:extLst>
+              <a:ext uri="{FF2B5EF4-FFF2-40B4-BE49-F238E27FC236}">
+                <a16:creationId xmlns:a16="http://schemas.microsoft.com/office/drawing/2014/main" id="{DC1882F4-AD2B-FC4A-5C52-30198FC44914}"/>
+              </a:ext>
+            </a:extLst>
+          </p:cNvPr>
+          <p:cNvPicPr>
+            <a:picLocks noGrp="1" noChangeAspect="1"/>
+          </p:cNvPicPr>
+          <p:nvPr>
+            <p:ph idx="1"/>
+          </p:nvPr>
+        </p:nvPicPr>
+        <p:blipFill>
+          <a:blip r:embed="rId5"/>
+          <a:stretch>
+            <a:fillRect/>
+          </a:stretch>
+        </p:blipFill>
+        <p:spPr>
+          <a:xfrm>
+            <a:off x="11014377" y="5736433"/>
+            <a:ext cx="963262" cy="997665"/>
+          </a:xfrm>
+          <a:prstGeom prst="rect">
+            <a:avLst/>
+          </a:prstGeom>
+          <a:effectLst>
+            <a:softEdge rad="50800"/>
+          </a:effectLst>
+        </p:spPr>
+      </p:pic>
+      <p:pic>
+        <p:nvPicPr>
+          <p:cNvPr id="22" name="Picture 21" descr="A blue text with a black background&#10;&#10;Description automatically generated">
+            <a:extLst>
+              <a:ext uri="{FF2B5EF4-FFF2-40B4-BE49-F238E27FC236}">
+                <a16:creationId xmlns:a16="http://schemas.microsoft.com/office/drawing/2014/main" id="{00EB3552-9139-0801-0400-B08EA7F3F645}"/>
+              </a:ext>
+            </a:extLst>
+          </p:cNvPr>
+          <p:cNvPicPr>
+            <a:picLocks noChangeAspect="1"/>
+          </p:cNvPicPr>
+          <p:nvPr/>
+        </p:nvPicPr>
+        <p:blipFill>
+          <a:blip r:embed="rId6">
+            <a:extLst>
+              <a:ext uri="{28A0092B-C50C-407E-A947-70E740481C1C}">
+                <a14:useLocalDpi xmlns:a14="http://schemas.microsoft.com/office/drawing/2010/main" val="0"/>
+              </a:ext>
+            </a:extLst>
+          </a:blip>
+          <a:stretch>
+            <a:fillRect/>
+          </a:stretch>
+        </p:blipFill>
+        <p:spPr>
+          <a:xfrm>
+            <a:off x="9348505" y="4660340"/>
+            <a:ext cx="692267" cy="233922"/>
+          </a:xfrm>
+          <a:prstGeom prst="rect">
+            <a:avLst/>
+          </a:prstGeom>
+          <a:effectLst>
+            <a:softEdge rad="228600"/>
+          </a:effectLst>
+        </p:spPr>
+      </p:pic>
+      <p:pic>
+        <p:nvPicPr>
+          <p:cNvPr id="11" name="Picture 10" descr="A bright light in a circle&#10;&#10;Description automatically generated">
+            <a:extLst>
+              <a:ext uri="{FF2B5EF4-FFF2-40B4-BE49-F238E27FC236}">
+                <a16:creationId xmlns:a16="http://schemas.microsoft.com/office/drawing/2014/main" id="{AA0DB806-23A1-A355-EE05-A30C77DC6942}"/>
+              </a:ext>
+            </a:extLst>
+          </p:cNvPr>
+          <p:cNvPicPr>
+            <a:picLocks noChangeAspect="1"/>
+          </p:cNvPicPr>
+          <p:nvPr/>
+        </p:nvPicPr>
+        <p:blipFill>
+          <a:blip r:embed="rId7">
+            <a:extLst>
+              <a:ext uri="{28A0092B-C50C-407E-A947-70E740481C1C}">
+                <a14:useLocalDpi xmlns:a14="http://schemas.microsoft.com/office/drawing/2010/main" val="0"/>
+              </a:ext>
+            </a:extLst>
+          </a:blip>
+          <a:stretch>
+            <a:fillRect/>
+          </a:stretch>
+        </p:blipFill>
+        <p:spPr>
+          <a:xfrm>
+            <a:off x="-3945000" y="2449515"/>
+            <a:ext cx="2158439" cy="1652247"/>
+          </a:xfrm>
+          <a:prstGeom prst="rect">
+            <a:avLst/>
+          </a:prstGeom>
+        </p:spPr>
+      </p:pic>
+    </p:spTree>
+    <p:extLst>
+      <p:ext uri="{BB962C8B-B14F-4D97-AF65-F5344CB8AC3E}">
+        <p14:creationId xmlns:p14="http://schemas.microsoft.com/office/powerpoint/2010/main" val="3980594163"/>
+      </p:ext>
+    </p:extLst>
+  </p:cSld>
+  <p:clrMapOvr>
+    <a:masterClrMapping/>
+  </p:clrMapOvr>
+</p:sld>
+</file>
+
+<file path=ppt/slides/slide7.xml><?xml version="1.0" encoding="utf-8"?>
+<p:sld xmlns:a="http://schemas.openxmlformats.org/drawingml/2006/main" xmlns:r="http://schemas.openxmlformats.org/officeDocument/2006/relationships" xmlns:p="http://schemas.openxmlformats.org/presentationml/2006/main">
+  <p:cSld>
+    <p:spTree>
+      <p:nvGrpSpPr>
+        <p:cNvPr id="1" name=""/>
+        <p:cNvGrpSpPr/>
+        <p:nvPr/>
+      </p:nvGrpSpPr>
+      <p:grpSpPr>
+        <a:xfrm>
+          <a:off x="0" y="0"/>
+          <a:ext cx="0" cy="0"/>
+          <a:chOff x="0" y="0"/>
+          <a:chExt cx="0" cy="0"/>
+        </a:xfrm>
+      </p:grpSpPr>
+      <p:sp>
+        <p:nvSpPr>
+          <p:cNvPr id="5" name="TextBox 4">
+            <a:extLst>
+              <a:ext uri="{FF2B5EF4-FFF2-40B4-BE49-F238E27FC236}">
+                <a16:creationId xmlns:a16="http://schemas.microsoft.com/office/drawing/2014/main" id="{1D613CEF-257B-B686-4999-8D4FF50EC036}"/>
+              </a:ext>
+            </a:extLst>
+          </p:cNvPr>
+          <p:cNvSpPr txBox="1"/>
+          <p:nvPr/>
+        </p:nvSpPr>
+        <p:spPr>
+          <a:xfrm>
+            <a:off x="0" y="-1"/>
+            <a:ext cx="12192000" cy="5464234"/>
+          </a:xfrm>
+          <a:prstGeom prst="rect">
+            <a:avLst/>
+          </a:prstGeom>
+          <a:noFill/>
+        </p:spPr>
+        <p:txBody>
+          <a:bodyPr wrap="square" rtlCol="0">
+            <a:prstTxWarp prst="textInflateBottom">
+              <a:avLst/>
+            </a:prstTxWarp>
+            <a:spAutoFit/>
+          </a:bodyPr>
+          <a:lstStyle/>
+          <a:p>
+            <a:r>
+              <a:rPr lang="en-AU" dirty="0">
+                <a:blipFill dpi="0" rotWithShape="1">
+                  <a:blip r:embed="rId3">
+                    <a:alphaModFix amt="20000"/>
+                  </a:blip>
+                  <a:srcRect/>
+                  <a:stretch>
+                    <a:fillRect/>
+                  </a:stretch>
+                </a:blipFill>
+              </a:rPr>
+              <a:t>---------------</a:t>
+            </a:r>
+          </a:p>
+        </p:txBody>
+      </p:sp>
+      <p:pic>
+        <p:nvPicPr>
+          <p:cNvPr id="1026" name="Picture 2" descr="Premium Photo | A black phone with a black background with a black  background with flowers.">
+            <a:extLst>
+              <a:ext uri="{FF2B5EF4-FFF2-40B4-BE49-F238E27FC236}">
+                <a16:creationId xmlns:a16="http://schemas.microsoft.com/office/drawing/2014/main" id="{B07670B7-3924-072E-F46E-E0F97E133332}"/>
+              </a:ext>
+            </a:extLst>
+          </p:cNvPr>
+          <p:cNvPicPr>
+            <a:picLocks noChangeAspect="1" noChangeArrowheads="1"/>
+          </p:cNvPicPr>
+          <p:nvPr/>
+        </p:nvPicPr>
+        <p:blipFill rotWithShape="1">
+          <a:blip r:embed="rId4">
+            <a:extLst>
+              <a:ext uri="{28A0092B-C50C-407E-A947-70E740481C1C}">
+                <a14:useLocalDpi xmlns:a14="http://schemas.microsoft.com/office/drawing/2010/main" val="0"/>
+              </a:ext>
+            </a:extLst>
+          </a:blip>
+          <a:srcRect l="39974" t="19705" r="38239" b="13620"/>
+          <a:stretch/>
+        </p:blipFill>
+        <p:spPr bwMode="auto">
+          <a:xfrm>
+            <a:off x="-3462157" y="337871"/>
+            <a:ext cx="3032676" cy="6182258"/>
+          </a:xfrm>
+          <a:prstGeom prst="rect">
+            <a:avLst/>
+          </a:prstGeom>
+          <a:noFill/>
+          <a:extLst>
+            <a:ext uri="{909E8E84-426E-40DD-AFC4-6F175D3DCCD1}">
+              <a14:hiddenFill xmlns:a14="http://schemas.microsoft.com/office/drawing/2010/main">
+                <a:solidFill>
+                  <a:srgbClr val="FFFFFF"/>
+                </a:solidFill>
+              </a14:hiddenFill>
+            </a:ext>
+          </a:extLst>
+        </p:spPr>
+      </p:pic>
+      <p:pic>
+        <p:nvPicPr>
+          <p:cNvPr id="4" name="Content Placeholder 3" descr="A person wearing sunglasses and a hat&#10;&#10;Description automatically generated">
+            <a:extLst>
+              <a:ext uri="{FF2B5EF4-FFF2-40B4-BE49-F238E27FC236}">
+                <a16:creationId xmlns:a16="http://schemas.microsoft.com/office/drawing/2014/main" id="{DC1882F4-AD2B-FC4A-5C52-30198FC44914}"/>
+              </a:ext>
+            </a:extLst>
+          </p:cNvPr>
+          <p:cNvPicPr>
+            <a:picLocks noGrp="1" noChangeAspect="1"/>
+          </p:cNvPicPr>
+          <p:nvPr>
+            <p:ph idx="1"/>
+          </p:nvPr>
+        </p:nvPicPr>
+        <p:blipFill>
+          <a:blip r:embed="rId5"/>
+          <a:stretch>
+            <a:fillRect/>
+          </a:stretch>
+        </p:blipFill>
+        <p:spPr>
+          <a:xfrm>
+            <a:off x="11014377" y="5736433"/>
+            <a:ext cx="963262" cy="997665"/>
+          </a:xfrm>
+          <a:prstGeom prst="rect">
+            <a:avLst/>
+          </a:prstGeom>
+          <a:effectLst>
+            <a:softEdge rad="50800"/>
+          </a:effectLst>
+        </p:spPr>
+      </p:pic>
+      <p:pic>
+        <p:nvPicPr>
+          <p:cNvPr id="22" name="Picture 21" descr="A blue text with a black background&#10;&#10;Description automatically generated">
+            <a:extLst>
+              <a:ext uri="{FF2B5EF4-FFF2-40B4-BE49-F238E27FC236}">
+                <a16:creationId xmlns:a16="http://schemas.microsoft.com/office/drawing/2014/main" id="{00EB3552-9139-0801-0400-B08EA7F3F645}"/>
+              </a:ext>
+            </a:extLst>
+          </p:cNvPr>
+          <p:cNvPicPr>
+            <a:picLocks noChangeAspect="1"/>
+          </p:cNvPicPr>
+          <p:nvPr/>
+        </p:nvPicPr>
+        <p:blipFill>
+          <a:blip r:embed="rId6">
+            <a:extLst>
+              <a:ext uri="{28A0092B-C50C-407E-A947-70E740481C1C}">
+                <a14:useLocalDpi xmlns:a14="http://schemas.microsoft.com/office/drawing/2010/main" val="0"/>
+              </a:ext>
+            </a:extLst>
+          </a:blip>
+          <a:stretch>
+            <a:fillRect/>
+          </a:stretch>
+        </p:blipFill>
+        <p:spPr>
+          <a:xfrm>
+            <a:off x="9348505" y="4660340"/>
+            <a:ext cx="692267" cy="233922"/>
+          </a:xfrm>
+          <a:prstGeom prst="rect">
+            <a:avLst/>
+          </a:prstGeom>
+          <a:effectLst>
+            <a:softEdge rad="228600"/>
+          </a:effectLst>
+        </p:spPr>
+      </p:pic>
+      <p:pic>
+        <p:nvPicPr>
+          <p:cNvPr id="11" name="Picture 10" descr="A bright light in a circle&#10;&#10;Description automatically generated">
+            <a:extLst>
+              <a:ext uri="{FF2B5EF4-FFF2-40B4-BE49-F238E27FC236}">
+                <a16:creationId xmlns:a16="http://schemas.microsoft.com/office/drawing/2014/main" id="{AA0DB806-23A1-A355-EE05-A30C77DC6942}"/>
+              </a:ext>
+            </a:extLst>
+          </p:cNvPr>
+          <p:cNvPicPr>
+            <a:picLocks noChangeAspect="1"/>
+          </p:cNvPicPr>
+          <p:nvPr/>
+        </p:nvPicPr>
+        <p:blipFill>
+          <a:blip r:embed="rId7">
+            <a:extLst>
+              <a:ext uri="{28A0092B-C50C-407E-A947-70E740481C1C}">
+                <a14:useLocalDpi xmlns:a14="http://schemas.microsoft.com/office/drawing/2010/main" val="0"/>
+              </a:ext>
+            </a:extLst>
+          </a:blip>
+          <a:stretch>
+            <a:fillRect/>
+          </a:stretch>
+        </p:blipFill>
+        <p:spPr>
+          <a:xfrm>
+            <a:off x="-3945000" y="2449515"/>
+            <a:ext cx="2158439" cy="1652247"/>
+          </a:xfrm>
+          <a:prstGeom prst="rect">
+            <a:avLst/>
+          </a:prstGeom>
+        </p:spPr>
+      </p:pic>
+      <p:sp>
+        <p:nvSpPr>
+          <p:cNvPr id="2" name="TextBox 1">
+            <a:extLst>
+              <a:ext uri="{FF2B5EF4-FFF2-40B4-BE49-F238E27FC236}">
+                <a16:creationId xmlns:a16="http://schemas.microsoft.com/office/drawing/2014/main" id="{55DDFDEC-0443-CFAF-4A71-12BCFFC28514}"/>
+              </a:ext>
+            </a:extLst>
+          </p:cNvPr>
+          <p:cNvSpPr txBox="1"/>
+          <p:nvPr/>
+        </p:nvSpPr>
+        <p:spPr>
+          <a:xfrm>
             <a:off x="381395" y="221011"/>
             <a:ext cx="10430692" cy="1754326"/>
           </a:xfrm>
@@ -5765,7 +6782,7 @@
 </p:sld>
 </file>
 
-<file path=ppt/slides/slide6.xml><?xml version="1.0" encoding="utf-8"?>
+<file path=ppt/slides/slide8.xml><?xml version="1.0" encoding="utf-8"?>
 <p:sld xmlns:a="http://schemas.openxmlformats.org/drawingml/2006/main" xmlns:r="http://schemas.openxmlformats.org/officeDocument/2006/relationships" xmlns:p="http://schemas.openxmlformats.org/presentationml/2006/main">
   <p:cSld>
     <p:spTree>

</xml_diff>

<commit_message>
changed logo for clarity, fixed words
</commit_message>
<xml_diff>
--- a/ConstableSoftwarePreso.pptx
+++ b/ConstableSoftwarePreso.pptx
@@ -125,7 +125,7 @@
 <file path=ppt/revisionInfo.xml><?xml version="1.0" encoding="utf-8"?>
 <p1510:revInfo xmlns:a="http://schemas.openxmlformats.org/drawingml/2006/main" xmlns:r="http://schemas.openxmlformats.org/officeDocument/2006/relationships" xmlns:p1510="http://schemas.microsoft.com/office/powerpoint/2015/10/main">
   <p1510:revLst>
-    <p1510:client id="{6352DDA4-F683-4A38-9A2F-FE729A406D02}" v="637" dt="2024-06-22T06:25:30.427"/>
+    <p1510:client id="{6352DDA4-F683-4A38-9A2F-FE729A406D02}" v="640" dt="2024-06-22T06:47:24.908"/>
   </p1510:revLst>
 </p1510:revInfo>
 </file>
@@ -135,7 +135,7 @@
   <pc:docChgLst>
     <pc:chgData name="Saf Flatters" userId="ea85ab73683665f9" providerId="LiveId" clId="{6352DDA4-F683-4A38-9A2F-FE729A406D02}"/>
     <pc:docChg chg="undo custSel addSld delSld modSld sldOrd">
-      <pc:chgData name="Saf Flatters" userId="ea85ab73683665f9" providerId="LiveId" clId="{6352DDA4-F683-4A38-9A2F-FE729A406D02}" dt="2024-06-22T06:27:10.155" v="3975" actId="1076"/>
+      <pc:chgData name="Saf Flatters" userId="ea85ab73683665f9" providerId="LiveId" clId="{6352DDA4-F683-4A38-9A2F-FE729A406D02}" dt="2024-06-22T06:47:45.653" v="4310" actId="113"/>
       <pc:docMkLst>
         <pc:docMk/>
       </pc:docMkLst>
@@ -171,13 +171,13 @@
         </pc:picChg>
       </pc:sldChg>
       <pc:sldChg chg="addSp delSp modSp mod ord">
-        <pc:chgData name="Saf Flatters" userId="ea85ab73683665f9" providerId="LiveId" clId="{6352DDA4-F683-4A38-9A2F-FE729A406D02}" dt="2024-06-22T06:26:20.368" v="3971" actId="207"/>
+        <pc:chgData name="Saf Flatters" userId="ea85ab73683665f9" providerId="LiveId" clId="{6352DDA4-F683-4A38-9A2F-FE729A406D02}" dt="2024-06-22T06:47:45.653" v="4310" actId="113"/>
         <pc:sldMkLst>
           <pc:docMk/>
           <pc:sldMk cId="3245596075" sldId="257"/>
         </pc:sldMkLst>
         <pc:spChg chg="add mod">
-          <ac:chgData name="Saf Flatters" userId="ea85ab73683665f9" providerId="LiveId" clId="{6352DDA4-F683-4A38-9A2F-FE729A406D02}" dt="2024-06-22T02:57:58.988" v="2488" actId="255"/>
+          <ac:chgData name="Saf Flatters" userId="ea85ab73683665f9" providerId="LiveId" clId="{6352DDA4-F683-4A38-9A2F-FE729A406D02}" dt="2024-06-22T06:47:45.653" v="4310" actId="113"/>
           <ac:spMkLst>
             <pc:docMk/>
             <pc:sldMk cId="3245596075" sldId="257"/>
@@ -240,6 +240,14 @@
             <ac:picMk id="4" creationId="{DC1882F4-AD2B-FC4A-5C52-30198FC44914}"/>
           </ac:picMkLst>
         </pc:picChg>
+        <pc:picChg chg="add mod">
+          <ac:chgData name="Saf Flatters" userId="ea85ab73683665f9" providerId="LiveId" clId="{6352DDA4-F683-4A38-9A2F-FE729A406D02}" dt="2024-06-22T06:47:31.355" v="4309" actId="14100"/>
+          <ac:picMkLst>
+            <pc:docMk/>
+            <pc:sldMk cId="3245596075" sldId="257"/>
+            <ac:picMk id="6" creationId="{371F21E1-4AE3-51CB-32F4-F95CD3BF6BEB}"/>
+          </ac:picMkLst>
+        </pc:picChg>
         <pc:picChg chg="add del mod modCrop">
           <ac:chgData name="Saf Flatters" userId="ea85ab73683665f9" providerId="LiveId" clId="{6352DDA4-F683-4A38-9A2F-FE729A406D02}" dt="2024-06-21T05:12:29.993" v="103" actId="478"/>
           <ac:picMkLst>
@@ -296,8 +304,8 @@
             <ac:picMk id="19" creationId="{7B3ED0BA-5E96-64AC-FF9F-01C73423B8AD}"/>
           </ac:picMkLst>
         </pc:picChg>
-        <pc:picChg chg="add mod ord">
-          <ac:chgData name="Saf Flatters" userId="ea85ab73683665f9" providerId="LiveId" clId="{6352DDA4-F683-4A38-9A2F-FE729A406D02}" dt="2024-06-22T06:25:55.492" v="3969" actId="1076"/>
+        <pc:picChg chg="add del mod ord">
+          <ac:chgData name="Saf Flatters" userId="ea85ab73683665f9" providerId="LiveId" clId="{6352DDA4-F683-4A38-9A2F-FE729A406D02}" dt="2024-06-22T06:47:13.356" v="4303" actId="478"/>
           <ac:picMkLst>
             <pc:docMk/>
             <pc:sldMk cId="3245596075" sldId="257"/>
@@ -337,7 +345,7 @@
           </ac:picMkLst>
         </pc:picChg>
         <pc:picChg chg="add mod">
-          <ac:chgData name="Saf Flatters" userId="ea85ab73683665f9" providerId="LiveId" clId="{6352DDA4-F683-4A38-9A2F-FE729A406D02}" dt="2024-06-22T06:25:30.427" v="3965" actId="1076"/>
+          <ac:chgData name="Saf Flatters" userId="ea85ab73683665f9" providerId="LiveId" clId="{6352DDA4-F683-4A38-9A2F-FE729A406D02}" dt="2024-06-22T06:47:24.908" v="4307" actId="166"/>
           <ac:picMkLst>
             <pc:docMk/>
             <pc:sldMk cId="3245596075" sldId="257"/>
@@ -386,7 +394,7 @@
         </pc:picChg>
       </pc:sldChg>
       <pc:sldChg chg="addSp delSp modSp add mod setBg">
-        <pc:chgData name="Saf Flatters" userId="ea85ab73683665f9" providerId="LiveId" clId="{6352DDA4-F683-4A38-9A2F-FE729A406D02}" dt="2024-06-22T06:27:10.155" v="3975" actId="1076"/>
+        <pc:chgData name="Saf Flatters" userId="ea85ab73683665f9" providerId="LiveId" clId="{6352DDA4-F683-4A38-9A2F-FE729A406D02}" dt="2024-06-22T06:42:40.712" v="4300" actId="113"/>
         <pc:sldMkLst>
           <pc:docMk/>
           <pc:sldMk cId="468884825" sldId="258"/>
@@ -407,8 +415,8 @@
             <ac:spMk id="4" creationId="{6E2A7F2C-1078-6D76-16B9-A4CFBE9E18A6}"/>
           </ac:spMkLst>
         </pc:spChg>
-        <pc:spChg chg="add mod">
-          <ac:chgData name="Saf Flatters" userId="ea85ab73683665f9" providerId="LiveId" clId="{6352DDA4-F683-4A38-9A2F-FE729A406D02}" dt="2024-06-22T06:20:55.401" v="3829" actId="14100"/>
+        <pc:spChg chg="add mod ord">
+          <ac:chgData name="Saf Flatters" userId="ea85ab73683665f9" providerId="LiveId" clId="{6352DDA4-F683-4A38-9A2F-FE729A406D02}" dt="2024-06-22T06:42:40.712" v="4300" actId="113"/>
           <ac:spMkLst>
             <pc:docMk/>
             <pc:sldMk cId="468884825" sldId="258"/>
@@ -432,7 +440,7 @@
           </ac:picMkLst>
         </pc:picChg>
         <pc:picChg chg="add mod">
-          <ac:chgData name="Saf Flatters" userId="ea85ab73683665f9" providerId="LiveId" clId="{6352DDA4-F683-4A38-9A2F-FE729A406D02}" dt="2024-06-22T06:23:12.967" v="3859" actId="14861"/>
+          <ac:chgData name="Saf Flatters" userId="ea85ab73683665f9" providerId="LiveId" clId="{6352DDA4-F683-4A38-9A2F-FE729A406D02}" dt="2024-06-22T06:39:18.122" v="4265" actId="14100"/>
           <ac:picMkLst>
             <pc:docMk/>
             <pc:sldMk cId="468884825" sldId="258"/>
@@ -448,11 +456,19 @@
           </ac:picMkLst>
         </pc:picChg>
         <pc:picChg chg="add mod">
-          <ac:chgData name="Saf Flatters" userId="ea85ab73683665f9" providerId="LiveId" clId="{6352DDA4-F683-4A38-9A2F-FE729A406D02}" dt="2024-06-22T06:17:35.562" v="3792" actId="14100"/>
+          <ac:chgData name="Saf Flatters" userId="ea85ab73683665f9" providerId="LiveId" clId="{6352DDA4-F683-4A38-9A2F-FE729A406D02}" dt="2024-06-22T06:42:28.779" v="4298" actId="14100"/>
           <ac:picMkLst>
             <pc:docMk/>
             <pc:sldMk cId="468884825" sldId="258"/>
             <ac:picMk id="7" creationId="{2053E5A1-3D9B-18FE-BF2F-3445A0CA7C2A}"/>
+          </ac:picMkLst>
+        </pc:picChg>
+        <pc:picChg chg="add mod">
+          <ac:chgData name="Saf Flatters" userId="ea85ab73683665f9" providerId="LiveId" clId="{6352DDA4-F683-4A38-9A2F-FE729A406D02}" dt="2024-06-22T06:41:51.298" v="4293" actId="1076"/>
+          <ac:picMkLst>
+            <pc:docMk/>
+            <pc:sldMk cId="468884825" sldId="258"/>
+            <ac:picMk id="9" creationId="{C6DD11AF-719E-C372-E041-41C754945F98}"/>
           </ac:picMkLst>
         </pc:picChg>
         <pc:picChg chg="add del mod">
@@ -464,7 +480,7 @@
           </ac:picMkLst>
         </pc:picChg>
         <pc:picChg chg="add mod">
-          <ac:chgData name="Saf Flatters" userId="ea85ab73683665f9" providerId="LiveId" clId="{6352DDA4-F683-4A38-9A2F-FE729A406D02}" dt="2024-06-22T06:17:35.562" v="3792" actId="14100"/>
+          <ac:chgData name="Saf Flatters" userId="ea85ab73683665f9" providerId="LiveId" clId="{6352DDA4-F683-4A38-9A2F-FE729A406D02}" dt="2024-06-22T06:42:28.779" v="4298" actId="14100"/>
           <ac:picMkLst>
             <pc:docMk/>
             <pc:sldMk cId="468884825" sldId="258"/>
@@ -472,7 +488,7 @@
           </ac:picMkLst>
         </pc:picChg>
         <pc:picChg chg="add mod">
-          <ac:chgData name="Saf Flatters" userId="ea85ab73683665f9" providerId="LiveId" clId="{6352DDA4-F683-4A38-9A2F-FE729A406D02}" dt="2024-06-22T06:17:35.562" v="3792" actId="14100"/>
+          <ac:chgData name="Saf Flatters" userId="ea85ab73683665f9" providerId="LiveId" clId="{6352DDA4-F683-4A38-9A2F-FE729A406D02}" dt="2024-06-22T06:42:28.779" v="4298" actId="14100"/>
           <ac:picMkLst>
             <pc:docMk/>
             <pc:sldMk cId="468884825" sldId="258"/>
@@ -620,7 +636,7 @@
         </pc:spChg>
       </pc:sldChg>
       <pc:sldChg chg="addSp delSp modSp add mod ord">
-        <pc:chgData name="Saf Flatters" userId="ea85ab73683665f9" providerId="LiveId" clId="{6352DDA4-F683-4A38-9A2F-FE729A406D02}" dt="2024-06-22T06:26:44.978" v="3974" actId="20577"/>
+        <pc:chgData name="Saf Flatters" userId="ea85ab73683665f9" providerId="LiveId" clId="{6352DDA4-F683-4A38-9A2F-FE729A406D02}" dt="2024-06-22T06:42:11.589" v="4296" actId="113"/>
         <pc:sldMkLst>
           <pc:docMk/>
           <pc:sldMk cId="2462211809" sldId="262"/>
@@ -634,7 +650,7 @@
           </ac:spMkLst>
         </pc:spChg>
         <pc:spChg chg="add mod">
-          <ac:chgData name="Saf Flatters" userId="ea85ab73683665f9" providerId="LiveId" clId="{6352DDA4-F683-4A38-9A2F-FE729A406D02}" dt="2024-06-22T06:26:44.978" v="3974" actId="20577"/>
+          <ac:chgData name="Saf Flatters" userId="ea85ab73683665f9" providerId="LiveId" clId="{6352DDA4-F683-4A38-9A2F-FE729A406D02}" dt="2024-06-22T06:42:11.589" v="4296" actId="113"/>
           <ac:spMkLst>
             <pc:docMk/>
             <pc:sldMk cId="2462211809" sldId="262"/>
@@ -4640,54 +4656,6 @@
       </p:sp>
       <p:pic>
         <p:nvPicPr>
-          <p:cNvPr id="1026" name="Picture 2" descr="Premium Photo | A black phone with a black background with a black  background with flowers.">
-            <a:extLst>
-              <a:ext uri="{FF2B5EF4-FFF2-40B4-BE49-F238E27FC236}">
-                <a16:creationId xmlns:a16="http://schemas.microsoft.com/office/drawing/2014/main" id="{B07670B7-3924-072E-F46E-E0F97E133332}"/>
-              </a:ext>
-            </a:extLst>
-          </p:cNvPr>
-          <p:cNvPicPr>
-            <a:picLocks noChangeAspect="1" noChangeArrowheads="1"/>
-          </p:cNvPicPr>
-          <p:nvPr/>
-        </p:nvPicPr>
-        <p:blipFill rotWithShape="1">
-          <a:blip r:embed="rId4">
-            <a:extLst>
-              <a:ext uri="{28A0092B-C50C-407E-A947-70E740481C1C}">
-                <a14:useLocalDpi xmlns:a14="http://schemas.microsoft.com/office/drawing/2010/main" val="0"/>
-              </a:ext>
-            </a:extLst>
-          </a:blip>
-          <a:srcRect l="39974" t="19705" r="38239" b="13620"/>
-          <a:stretch/>
-        </p:blipFill>
-        <p:spPr bwMode="auto">
-          <a:xfrm>
-            <a:off x="3496947" y="176677"/>
-            <a:ext cx="3032676" cy="6182258"/>
-          </a:xfrm>
-          <a:prstGeom prst="rect">
-            <a:avLst/>
-          </a:prstGeom>
-          <a:noFill/>
-          <a:effectLst>
-            <a:reflection stA="72000" endPos="8000" dist="50800" dir="5400000" sy="-100000" algn="bl" rotWithShape="0"/>
-          </a:effectLst>
-          <a:extLst>
-            <a:ext uri="{909E8E84-426E-40DD-AFC4-6F175D3DCCD1}">
-              <a14:hiddenFill xmlns:a14="http://schemas.microsoft.com/office/drawing/2010/main">
-                <a:solidFill>
-                  <a:srgbClr val="FFFFFF"/>
-                </a:solidFill>
-              </a14:hiddenFill>
-            </a:ext>
-          </a:extLst>
-        </p:spPr>
-      </p:pic>
-      <p:pic>
-        <p:nvPicPr>
           <p:cNvPr id="4" name="Content Placeholder 3" descr="A person wearing sunglasses and a hat&#10;&#10;Description automatically generated">
             <a:extLst>
               <a:ext uri="{FF2B5EF4-FFF2-40B4-BE49-F238E27FC236}">
@@ -4703,7 +4671,7 @@
           </p:nvPr>
         </p:nvPicPr>
         <p:blipFill>
-          <a:blip r:embed="rId5"/>
+          <a:blip r:embed="rId4"/>
           <a:stretch>
             <a:fillRect/>
           </a:stretch>
@@ -4736,7 +4704,7 @@
           <p:nvPr/>
         </p:nvPicPr>
         <p:blipFill>
-          <a:blip r:embed="rId6">
+          <a:blip r:embed="rId5">
             <a:extLst>
               <a:ext uri="{28A0092B-C50C-407E-A947-70E740481C1C}">
                 <a14:useLocalDpi xmlns:a14="http://schemas.microsoft.com/office/drawing/2010/main" val="0"/>
@@ -4757,54 +4725,6 @@
           </a:prstGeom>
           <a:effectLst>
             <a:softEdge rad="228600"/>
-          </a:effectLst>
-        </p:spPr>
-      </p:pic>
-      <p:pic>
-        <p:nvPicPr>
-          <p:cNvPr id="21" name="Picture 20" descr="A blue text with a black background&#10;&#10;Description automatically generated">
-            <a:extLst>
-              <a:ext uri="{FF2B5EF4-FFF2-40B4-BE49-F238E27FC236}">
-                <a16:creationId xmlns:a16="http://schemas.microsoft.com/office/drawing/2014/main" id="{6A6C6AE7-9D05-2EC0-B678-44D8463DBCC1}"/>
-              </a:ext>
-            </a:extLst>
-          </p:cNvPr>
-          <p:cNvPicPr>
-            <a:picLocks noChangeAspect="1"/>
-          </p:cNvPicPr>
-          <p:nvPr/>
-        </p:nvPicPr>
-        <p:blipFill>
-          <a:blip r:embed="rId6">
-            <a:extLst>
-              <a:ext uri="{28A0092B-C50C-407E-A947-70E740481C1C}">
-                <a14:useLocalDpi xmlns:a14="http://schemas.microsoft.com/office/drawing/2010/main" val="0"/>
-              </a:ext>
-            </a:extLst>
-          </a:blip>
-          <a:stretch>
-            <a:fillRect/>
-          </a:stretch>
-        </p:blipFill>
-        <p:spPr>
-          <a:xfrm>
-            <a:off x="6466591" y="2329113"/>
-            <a:ext cx="5602275" cy="1893049"/>
-          </a:xfrm>
-          <a:prstGeom prst="rect">
-            <a:avLst/>
-          </a:prstGeom>
-          <a:effectLst>
-            <a:glow>
-              <a:srgbClr val="002060">
-                <a:alpha val="0"/>
-              </a:srgbClr>
-            </a:glow>
-            <a:outerShdw blurRad="50800" dist="88900" dir="6000000" algn="ctr" rotWithShape="0">
-              <a:srgbClr val="000000"/>
-            </a:outerShdw>
-            <a:reflection stA="45000" endPos="1000" dist="50800" dir="5400000" sy="-100000" algn="bl" rotWithShape="0"/>
-            <a:softEdge rad="177800"/>
           </a:effectLst>
         </p:spPr>
       </p:pic>
@@ -4863,7 +4783,7 @@
               <p:nvPr/>
             </p:nvPicPr>
             <p:blipFill rotWithShape="1">
-              <a:blip r:embed="rId7">
+              <a:blip r:embed="rId6">
                 <a:extLst>
                   <a:ext uri="{28A0092B-C50C-407E-A947-70E740481C1C}">
                     <a14:useLocalDpi xmlns:a14="http://schemas.microsoft.com/office/drawing/2010/main" val="0"/>
@@ -4931,7 +4851,7 @@
               <p:nvPr/>
             </p:nvPicPr>
             <p:blipFill rotWithShape="1">
-              <a:blip r:embed="rId8">
+              <a:blip r:embed="rId7">
                 <a:extLst>
                   <a:ext uri="{28A0092B-C50C-407E-A947-70E740481C1C}">
                     <a14:useLocalDpi xmlns:a14="http://schemas.microsoft.com/office/drawing/2010/main" val="0"/>
@@ -4966,7 +4886,7 @@
               <p:nvPr/>
             </p:nvPicPr>
             <p:blipFill rotWithShape="1">
-              <a:blip r:embed="rId9"/>
+              <a:blip r:embed="rId8"/>
               <a:srcRect r="30176"/>
               <a:stretch/>
             </p:blipFill>
@@ -4995,11 +4915,11 @@
               <p:nvPr/>
             </p:nvPicPr>
             <p:blipFill rotWithShape="1">
-              <a:blip r:embed="rId10">
+              <a:blip r:embed="rId9">
                 <a:extLst>
                   <a:ext uri="{BEBA8EAE-BF5A-486C-A8C5-ECC9F3942E4B}">
                     <a14:imgProps xmlns:a14="http://schemas.microsoft.com/office/drawing/2010/main">
-                      <a14:imgLayer r:embed="rId11">
+                      <a14:imgLayer r:embed="rId10">
                         <a14:imgEffect>
                           <a14:sharpenSoften amount="70000"/>
                         </a14:imgEffect>
@@ -5040,7 +4960,7 @@
             <p:nvPr/>
           </p:nvPicPr>
           <p:blipFill>
-            <a:blip r:embed="rId6">
+            <a:blip r:embed="rId5">
               <a:extLst>
                 <a:ext uri="{28A0092B-C50C-407E-A947-70E740481C1C}">
                   <a14:useLocalDpi xmlns:a14="http://schemas.microsoft.com/office/drawing/2010/main" val="0"/>
@@ -5080,7 +5000,7 @@
           <p:nvPr/>
         </p:nvPicPr>
         <p:blipFill>
-          <a:blip r:embed="rId12">
+          <a:blip r:embed="rId11">
             <a:extLst>
               <a:ext uri="{28A0092B-C50C-407E-A947-70E740481C1C}">
                 <a14:useLocalDpi xmlns:a14="http://schemas.microsoft.com/office/drawing/2010/main" val="0"/>
@@ -5130,7 +5050,7 @@
           <a:lstStyle/>
           <a:p>
             <a:r>
-              <a:rPr lang="en-AU" sz="2800" b="1" dirty="0"/>
+              <a:rPr lang="en-AU" sz="2800" dirty="0"/>
               <a:t>Introducing…</a:t>
             </a:r>
           </a:p>
@@ -5176,6 +5096,93 @@
           </a:p>
         </p:txBody>
       </p:sp>
+      <p:pic>
+        <p:nvPicPr>
+          <p:cNvPr id="6" name="Picture 5" descr="A blue text with a black background&#10;&#10;Description automatically generated">
+            <a:extLst>
+              <a:ext uri="{FF2B5EF4-FFF2-40B4-BE49-F238E27FC236}">
+                <a16:creationId xmlns:a16="http://schemas.microsoft.com/office/drawing/2014/main" id="{371F21E1-4AE3-51CB-32F4-F95CD3BF6BEB}"/>
+              </a:ext>
+            </a:extLst>
+          </p:cNvPr>
+          <p:cNvPicPr>
+            <a:picLocks noChangeAspect="1"/>
+          </p:cNvPicPr>
+          <p:nvPr/>
+        </p:nvPicPr>
+        <p:blipFill>
+          <a:blip r:embed="rId12">
+            <a:extLst>
+              <a:ext uri="{28A0092B-C50C-407E-A947-70E740481C1C}">
+                <a14:useLocalDpi xmlns:a14="http://schemas.microsoft.com/office/drawing/2010/main" val="0"/>
+              </a:ext>
+            </a:extLst>
+          </a:blip>
+          <a:stretch>
+            <a:fillRect/>
+          </a:stretch>
+        </p:blipFill>
+        <p:spPr>
+          <a:xfrm>
+            <a:off x="6194884" y="2358464"/>
+            <a:ext cx="6006605" cy="2029676"/>
+          </a:xfrm>
+          <a:prstGeom prst="rect">
+            <a:avLst/>
+          </a:prstGeom>
+          <a:effectLst>
+            <a:softEdge rad="241300"/>
+          </a:effectLst>
+        </p:spPr>
+      </p:pic>
+      <p:pic>
+        <p:nvPicPr>
+          <p:cNvPr id="1026" name="Picture 2" descr="Premium Photo | A black phone with a black background with a black  background with flowers.">
+            <a:extLst>
+              <a:ext uri="{FF2B5EF4-FFF2-40B4-BE49-F238E27FC236}">
+                <a16:creationId xmlns:a16="http://schemas.microsoft.com/office/drawing/2014/main" id="{B07670B7-3924-072E-F46E-E0F97E133332}"/>
+              </a:ext>
+            </a:extLst>
+          </p:cNvPr>
+          <p:cNvPicPr>
+            <a:picLocks noChangeAspect="1" noChangeArrowheads="1"/>
+          </p:cNvPicPr>
+          <p:nvPr/>
+        </p:nvPicPr>
+        <p:blipFill rotWithShape="1">
+          <a:blip r:embed="rId13">
+            <a:extLst>
+              <a:ext uri="{28A0092B-C50C-407E-A947-70E740481C1C}">
+                <a14:useLocalDpi xmlns:a14="http://schemas.microsoft.com/office/drawing/2010/main" val="0"/>
+              </a:ext>
+            </a:extLst>
+          </a:blip>
+          <a:srcRect l="39974" t="19705" r="38239" b="13620"/>
+          <a:stretch/>
+        </p:blipFill>
+        <p:spPr bwMode="auto">
+          <a:xfrm>
+            <a:off x="3496947" y="176677"/>
+            <a:ext cx="3032676" cy="6182258"/>
+          </a:xfrm>
+          <a:prstGeom prst="rect">
+            <a:avLst/>
+          </a:prstGeom>
+          <a:noFill/>
+          <a:effectLst>
+            <a:reflection stA="72000" endPos="8000" dist="50800" dir="5400000" sy="-100000" algn="bl" rotWithShape="0"/>
+          </a:effectLst>
+          <a:extLst>
+            <a:ext uri="{909E8E84-426E-40DD-AFC4-6F175D3DCCD1}">
+              <a14:hiddenFill xmlns:a14="http://schemas.microsoft.com/office/drawing/2010/main">
+                <a:solidFill>
+                  <a:srgbClr val="FFFFFF"/>
+                </a:solidFill>
+              </a14:hiddenFill>
+            </a:ext>
+          </a:extLst>
+        </p:spPr>
+      </p:pic>
     </p:spTree>
     <p:extLst>
       <p:ext uri="{BB962C8B-B14F-4D97-AF65-F5344CB8AC3E}">
@@ -5476,7 +5483,7 @@
               <a:t>SCATS</a:t>
             </a:r>
             <a:r>
-              <a:rPr lang="en-US" b="0" i="0" dirty="0">
+              <a:rPr lang="en-US" i="0" dirty="0">
                 <a:effectLst/>
                 <a:latin typeface="Arial" panose="020B0604020202020204" pitchFamily="34" charset="0"/>
               </a:rPr>
@@ -5489,7 +5496,7 @@
               <a:t>n existing </a:t>
             </a:r>
             <a:r>
-              <a:rPr lang="en-US" b="0" i="0" u="none" strike="noStrike" dirty="0">
+              <a:rPr lang="en-US" i="0" u="none" strike="noStrike" dirty="0">
                 <a:effectLst/>
                 <a:latin typeface="Arial" panose="020B0604020202020204" pitchFamily="34" charset="0"/>
                 <a:hlinkClick r:id="rId8" tooltip="Intelligent transportation system">
@@ -5503,14 +5510,14 @@
               <a:t>intelligent transportation system</a:t>
             </a:r>
             <a:r>
-              <a:rPr lang="en-US" b="0" i="0" dirty="0">
+              <a:rPr lang="en-US" i="0" dirty="0">
                 <a:effectLst/>
                 <a:latin typeface="Arial" panose="020B0604020202020204" pitchFamily="34" charset="0"/>
               </a:rPr>
               <a:t> that manages the dynamic (on-line, real-time) timing of signal phases at </a:t>
             </a:r>
             <a:r>
-              <a:rPr lang="en-US" b="0" i="0" u="none" strike="noStrike" dirty="0">
+              <a:rPr lang="en-US" i="0" u="none" strike="noStrike" dirty="0">
                 <a:effectLst/>
                 <a:latin typeface="Arial" panose="020B0604020202020204" pitchFamily="34" charset="0"/>
                 <a:hlinkClick r:id="rId9" tooltip="Traffic signal">
@@ -5942,140 +5949,6 @@
           </a:effectLst>
         </p:spPr>
       </p:pic>
-      <p:sp>
-        <p:nvSpPr>
-          <p:cNvPr id="5" name="TextBox 4">
-            <a:extLst>
-              <a:ext uri="{FF2B5EF4-FFF2-40B4-BE49-F238E27FC236}">
-                <a16:creationId xmlns:a16="http://schemas.microsoft.com/office/drawing/2014/main" id="{A7159774-B73E-3B53-5B9B-CA8E635AECF0}"/>
-              </a:ext>
-            </a:extLst>
-          </p:cNvPr>
-          <p:cNvSpPr txBox="1"/>
-          <p:nvPr/>
-        </p:nvSpPr>
-        <p:spPr>
-          <a:xfrm>
-            <a:off x="547601" y="494635"/>
-            <a:ext cx="11356224" cy="4124206"/>
-          </a:xfrm>
-          <a:prstGeom prst="rect">
-            <a:avLst/>
-          </a:prstGeom>
-          <a:noFill/>
-        </p:spPr>
-        <p:txBody>
-          <a:bodyPr wrap="square" rtlCol="0">
-            <a:spAutoFit/>
-          </a:bodyPr>
-          <a:lstStyle/>
-          <a:p>
-            <a:endParaRPr lang="en-AU" dirty="0"/>
-          </a:p>
-          <a:p>
-            <a:r>
-              <a:rPr lang="en-AU" sz="2800" b="1" dirty="0" err="1">
-                <a:solidFill>
-                  <a:schemeClr val="bg1"/>
-                </a:solidFill>
-              </a:rPr>
-              <a:t>Blueflare</a:t>
-            </a:r>
-            <a:r>
-              <a:rPr lang="en-AU" sz="2800" b="1" dirty="0">
-                <a:solidFill>
-                  <a:schemeClr val="bg1"/>
-                </a:solidFill>
-              </a:rPr>
-              <a:t>						</a:t>
-            </a:r>
-            <a:r>
-              <a:rPr lang="en-AU" sz="2800" b="1" dirty="0"/>
-              <a:t>aims to:</a:t>
-            </a:r>
-          </a:p>
-          <a:p>
-            <a:endParaRPr lang="en-AU" sz="2400" b="1" dirty="0"/>
-          </a:p>
-          <a:p>
-            <a:r>
-              <a:rPr lang="en-AU" sz="2400" b="1" dirty="0"/>
-              <a:t>Assist Police to achieve their </a:t>
-            </a:r>
-            <a:r>
-              <a:rPr lang="en-AU" sz="2400" b="1" dirty="0">
-                <a:solidFill>
-                  <a:srgbClr val="FFFF00"/>
-                </a:solidFill>
-              </a:rPr>
-              <a:t>12 minute Response KPI</a:t>
-            </a:r>
-            <a:r>
-              <a:rPr lang="en-AU" sz="2400" b="1" dirty="0"/>
-              <a:t> for Priority 1 &amp; 2 incidents</a:t>
-            </a:r>
-          </a:p>
-          <a:p>
-            <a:pPr lvl="1"/>
-            <a:r>
-              <a:rPr lang="en-AU" sz="2400" b="1" dirty="0"/>
-              <a:t>and,</a:t>
-            </a:r>
-          </a:p>
-          <a:p>
-            <a:r>
-              <a:rPr lang="en-AU" sz="2400" b="1" dirty="0"/>
-              <a:t>Meet </a:t>
-            </a:r>
-            <a:r>
-              <a:rPr lang="en-AU" sz="2400" b="1" dirty="0">
-                <a:solidFill>
-                  <a:srgbClr val="FFFF00"/>
-                </a:solidFill>
-              </a:rPr>
-              <a:t>Community Expectations </a:t>
-            </a:r>
-            <a:r>
-              <a:rPr lang="en-AU" sz="2400" b="1" dirty="0"/>
-              <a:t>by:</a:t>
-            </a:r>
-          </a:p>
-          <a:p>
-            <a:pPr marL="800100" lvl="1" indent="-342900">
-              <a:buFont typeface="Arial" panose="020B0604020202020204" pitchFamily="34" charset="0"/>
-              <a:buChar char="•"/>
-            </a:pPr>
-            <a:r>
-              <a:rPr lang="en-AU" sz="2400" b="1" dirty="0"/>
-              <a:t>Respond to where and when the community needs Police most</a:t>
-            </a:r>
-          </a:p>
-          <a:p>
-            <a:pPr marL="800100" lvl="1" indent="-342900">
-              <a:buFont typeface="Arial" panose="020B0604020202020204" pitchFamily="34" charset="0"/>
-              <a:buChar char="•"/>
-            </a:pPr>
-            <a:r>
-              <a:rPr lang="en-AU" sz="2400" b="1" dirty="0"/>
-              <a:t>Providing the community assurance of immediate safety and support</a:t>
-            </a:r>
-          </a:p>
-          <a:p>
-            <a:pPr lvl="1"/>
-            <a:endParaRPr lang="en-AU" b="1" dirty="0"/>
-          </a:p>
-          <a:p>
-            <a:pPr lvl="1"/>
-            <a:endParaRPr lang="en-AU" b="1" dirty="0"/>
-          </a:p>
-          <a:p>
-            <a:endParaRPr lang="en-AU" b="1" dirty="0"/>
-          </a:p>
-          <a:p>
-            <a:endParaRPr lang="en-AU" b="1" dirty="0"/>
-          </a:p>
-        </p:txBody>
-      </p:sp>
       <p:pic>
         <p:nvPicPr>
           <p:cNvPr id="7" name="Picture 6">
@@ -6098,8 +5971,8 @@
         </p:blipFill>
         <p:spPr>
           <a:xfrm>
-            <a:off x="5962996" y="3734900"/>
-            <a:ext cx="3663142" cy="2628465"/>
+            <a:off x="5962996" y="4136526"/>
+            <a:ext cx="3103419" cy="2226839"/>
           </a:xfrm>
           <a:prstGeom prst="rect">
             <a:avLst/>
@@ -6164,8 +6037,8 @@
         </p:blipFill>
         <p:spPr>
           <a:xfrm>
-            <a:off x="3191128" y="3703691"/>
-            <a:ext cx="961782" cy="2552730"/>
+            <a:off x="3341109" y="4124954"/>
+            <a:ext cx="814823" cy="2162676"/>
           </a:xfrm>
           <a:prstGeom prst="rect">
             <a:avLst/>
@@ -6194,8 +6067,8 @@
         </p:blipFill>
         <p:spPr>
           <a:xfrm>
-            <a:off x="4456759" y="3727624"/>
-            <a:ext cx="1006014" cy="2566363"/>
+            <a:off x="4456759" y="4119762"/>
+            <a:ext cx="852296" cy="2174225"/>
           </a:xfrm>
           <a:prstGeom prst="rect">
             <a:avLst/>
@@ -6230,8 +6103,8 @@
         </p:blipFill>
         <p:spPr>
           <a:xfrm>
-            <a:off x="-23127" y="180836"/>
-            <a:ext cx="4653246" cy="1572365"/>
+            <a:off x="199425" y="306626"/>
+            <a:ext cx="5177647" cy="1749564"/>
           </a:xfrm>
           <a:prstGeom prst="rect">
             <a:avLst/>
@@ -6247,6 +6120,172 @@
             </a:outerShdw>
             <a:reflection stA="45000" endPos="1000" dist="50800" dir="5400000" sy="-100000" algn="bl" rotWithShape="0"/>
             <a:softEdge rad="368300"/>
+          </a:effectLst>
+        </p:spPr>
+      </p:pic>
+      <p:sp>
+        <p:nvSpPr>
+          <p:cNvPr id="5" name="TextBox 4">
+            <a:extLst>
+              <a:ext uri="{FF2B5EF4-FFF2-40B4-BE49-F238E27FC236}">
+                <a16:creationId xmlns:a16="http://schemas.microsoft.com/office/drawing/2014/main" id="{A7159774-B73E-3B53-5B9B-CA8E635AECF0}"/>
+              </a:ext>
+            </a:extLst>
+          </p:cNvPr>
+          <p:cNvSpPr txBox="1"/>
+          <p:nvPr/>
+        </p:nvSpPr>
+        <p:spPr>
+          <a:xfrm>
+            <a:off x="636351" y="677605"/>
+            <a:ext cx="11356224" cy="4124206"/>
+          </a:xfrm>
+          <a:prstGeom prst="rect">
+            <a:avLst/>
+          </a:prstGeom>
+          <a:noFill/>
+        </p:spPr>
+        <p:txBody>
+          <a:bodyPr wrap="square" rtlCol="0">
+            <a:spAutoFit/>
+          </a:bodyPr>
+          <a:lstStyle/>
+          <a:p>
+            <a:endParaRPr lang="en-AU" dirty="0"/>
+          </a:p>
+          <a:p>
+            <a:pPr lvl="1"/>
+            <a:r>
+              <a:rPr lang="en-AU" sz="2800" b="1" dirty="0">
+                <a:solidFill>
+                  <a:schemeClr val="bg1"/>
+                </a:solidFill>
+              </a:rPr>
+              <a:t>									</a:t>
+            </a:r>
+            <a:r>
+              <a:rPr lang="en-AU" sz="2800" b="1" dirty="0"/>
+              <a:t>aims to:</a:t>
+            </a:r>
+          </a:p>
+          <a:p>
+            <a:endParaRPr lang="en-AU" sz="2400" b="1" dirty="0"/>
+          </a:p>
+          <a:p>
+            <a:r>
+              <a:rPr lang="en-AU" sz="2400" b="1" dirty="0"/>
+              <a:t>Assist Police to </a:t>
+            </a:r>
+            <a:r>
+              <a:rPr lang="en-AU" sz="2400" b="1" dirty="0">
+                <a:solidFill>
+                  <a:srgbClr val="FFFF00"/>
+                </a:solidFill>
+              </a:rPr>
+              <a:t>Respond to Priority 1 &amp; 2 calls</a:t>
+            </a:r>
+            <a:r>
+              <a:rPr lang="en-AU" sz="2400" b="1" dirty="0"/>
+              <a:t> for help within 12 minutes</a:t>
+            </a:r>
+          </a:p>
+          <a:p>
+            <a:pPr lvl="1"/>
+            <a:r>
+              <a:rPr lang="en-AU" sz="2400" dirty="0"/>
+              <a:t>and,</a:t>
+            </a:r>
+          </a:p>
+          <a:p>
+            <a:r>
+              <a:rPr lang="en-AU" sz="2400" b="1" dirty="0"/>
+              <a:t>Meet </a:t>
+            </a:r>
+            <a:r>
+              <a:rPr lang="en-AU" sz="2400" b="1" dirty="0">
+                <a:solidFill>
+                  <a:srgbClr val="FFFF00"/>
+                </a:solidFill>
+              </a:rPr>
+              <a:t>Community Expectations </a:t>
+            </a:r>
+            <a:r>
+              <a:rPr lang="en-AU" sz="2400" b="1" dirty="0"/>
+              <a:t>by:</a:t>
+            </a:r>
+          </a:p>
+          <a:p>
+            <a:pPr marL="800100" lvl="1" indent="-342900">
+              <a:buFont typeface="Arial" panose="020B0604020202020204" pitchFamily="34" charset="0"/>
+              <a:buChar char="•"/>
+            </a:pPr>
+            <a:r>
+              <a:rPr lang="en-AU" sz="2400" dirty="0"/>
+              <a:t>Respond to where and when the community needs Police most</a:t>
+            </a:r>
+          </a:p>
+          <a:p>
+            <a:pPr marL="800100" lvl="1" indent="-342900">
+              <a:buFont typeface="Arial" panose="020B0604020202020204" pitchFamily="34" charset="0"/>
+              <a:buChar char="•"/>
+            </a:pPr>
+            <a:r>
+              <a:rPr lang="en-AU" sz="2400" dirty="0"/>
+              <a:t>Providing the community assurance of immediate safety and support</a:t>
+            </a:r>
+          </a:p>
+          <a:p>
+            <a:pPr lvl="1"/>
+            <a:endParaRPr lang="en-AU" b="1" dirty="0"/>
+          </a:p>
+          <a:p>
+            <a:pPr lvl="1"/>
+            <a:endParaRPr lang="en-AU" b="1" dirty="0"/>
+          </a:p>
+          <a:p>
+            <a:endParaRPr lang="en-AU" b="1" dirty="0"/>
+          </a:p>
+          <a:p>
+            <a:endParaRPr lang="en-AU" b="1" dirty="0"/>
+          </a:p>
+        </p:txBody>
+      </p:sp>
+      <p:pic>
+        <p:nvPicPr>
+          <p:cNvPr id="9" name="Picture 8" descr="A blue text with a black background&#10;&#10;Description automatically generated">
+            <a:extLst>
+              <a:ext uri="{FF2B5EF4-FFF2-40B4-BE49-F238E27FC236}">
+                <a16:creationId xmlns:a16="http://schemas.microsoft.com/office/drawing/2014/main" id="{C6DD11AF-719E-C372-E041-41C754945F98}"/>
+              </a:ext>
+            </a:extLst>
+          </p:cNvPr>
+          <p:cNvPicPr>
+            <a:picLocks noChangeAspect="1"/>
+          </p:cNvPicPr>
+          <p:nvPr/>
+        </p:nvPicPr>
+        <p:blipFill>
+          <a:blip r:embed="rId9">
+            <a:extLst>
+              <a:ext uri="{28A0092B-C50C-407E-A947-70E740481C1C}">
+                <a14:useLocalDpi xmlns:a14="http://schemas.microsoft.com/office/drawing/2010/main" val="0"/>
+              </a:ext>
+            </a:extLst>
+          </a:blip>
+          <a:stretch>
+            <a:fillRect/>
+          </a:stretch>
+        </p:blipFill>
+        <p:spPr>
+          <a:xfrm>
+            <a:off x="0" y="220469"/>
+            <a:ext cx="5330952" cy="1801368"/>
+          </a:xfrm>
+          <a:prstGeom prst="rect">
+            <a:avLst/>
+          </a:prstGeom>
+          <a:effectLst>
+            <a:softEdge rad="241300"/>
           </a:effectLst>
         </p:spPr>
       </p:pic>

</xml_diff>